<commit_message>
Testing repulsive force for deformations
</commit_message>
<xml_diff>
--- a/Presentation/Project_Update_(8-12).pptx
+++ b/Presentation/Project_Update_(8-12).pptx
@@ -6,20 +6,17 @@
     <p:sldMasterId id="2147483674" r:id="rId2"/>
   </p:sldMasterIdLst>
   <p:notesMasterIdLst>
-    <p:notesMasterId r:id="rId14"/>
+    <p:notesMasterId r:id="rId11"/>
   </p:notesMasterIdLst>
   <p:sldIdLst>
     <p:sldId id="3588" r:id="rId3"/>
-    <p:sldId id="3609" r:id="rId4"/>
-    <p:sldId id="3610" r:id="rId5"/>
-    <p:sldId id="3607" r:id="rId6"/>
-    <p:sldId id="3611" r:id="rId7"/>
-    <p:sldId id="3612" r:id="rId8"/>
-    <p:sldId id="3613" r:id="rId9"/>
-    <p:sldId id="3603" r:id="rId10"/>
-    <p:sldId id="3605" r:id="rId11"/>
-    <p:sldId id="3608" r:id="rId12"/>
-    <p:sldId id="3606" r:id="rId13"/>
+    <p:sldId id="3593" r:id="rId4"/>
+    <p:sldId id="3617" r:id="rId5"/>
+    <p:sldId id="3618" r:id="rId6"/>
+    <p:sldId id="3621" r:id="rId7"/>
+    <p:sldId id="3619" r:id="rId8"/>
+    <p:sldId id="3620" r:id="rId9"/>
+    <p:sldId id="3622" r:id="rId10"/>
   </p:sldIdLst>
   <p:sldSz cx="9144000" cy="6858000" type="screen4x3"/>
   <p:notesSz cx="6858000" cy="9144000"/>
@@ -208,7 +205,7 @@
           <a:p>
             <a:fld id="{42297E26-78EB-8B41-8DC9-A0EBC93E0939}" type="datetimeFigureOut">
               <a:rPr lang="en-US" smtClean="0"/>
-              <a:t>8/12/2025</a:t>
+              <a:t>8/20/2025</a:t>
             </a:fld>
             <a:endParaRPr lang="en-US"/>
           </a:p>
@@ -570,6 +567,1671 @@
 </p:notes>
 </file>
 
+<file path=ppt/notesSlides/notesSlide2.xml><?xml version="1.0" encoding="utf-8"?>
+<p:notes xmlns:a="http://schemas.openxmlformats.org/drawingml/2006/main" xmlns:r="http://schemas.openxmlformats.org/officeDocument/2006/relationships" xmlns:p="http://schemas.openxmlformats.org/presentationml/2006/main">
+  <p:cSld>
+    <p:spTree>
+      <p:nvGrpSpPr>
+        <p:cNvPr id="1" name="">
+          <a:extLst>
+            <a:ext uri="{FF2B5EF4-FFF2-40B4-BE49-F238E27FC236}">
+              <a16:creationId xmlns:a16="http://schemas.microsoft.com/office/drawing/2014/main" id="{6FFE40E4-A9C2-797F-41E3-A38DEFA90D56}"/>
+            </a:ext>
+          </a:extLst>
+        </p:cNvPr>
+        <p:cNvGrpSpPr/>
+        <p:nvPr/>
+      </p:nvGrpSpPr>
+      <p:grpSpPr>
+        <a:xfrm>
+          <a:off x="0" y="0"/>
+          <a:ext cx="0" cy="0"/>
+          <a:chOff x="0" y="0"/>
+          <a:chExt cx="0" cy="0"/>
+        </a:xfrm>
+      </p:grpSpPr>
+      <p:sp>
+        <p:nvSpPr>
+          <p:cNvPr id="2" name="Slide Image Placeholder 1">
+            <a:extLst>
+              <a:ext uri="{FF2B5EF4-FFF2-40B4-BE49-F238E27FC236}">
+                <a16:creationId xmlns:a16="http://schemas.microsoft.com/office/drawing/2014/main" id="{C79A7236-0BEC-0071-66BE-3FEF19AC6F38}"/>
+              </a:ext>
+            </a:extLst>
+          </p:cNvPr>
+          <p:cNvSpPr>
+            <a:spLocks noGrp="1" noRot="1" noChangeAspect="1"/>
+          </p:cNvSpPr>
+          <p:nvPr>
+            <p:ph type="sldImg"/>
+          </p:nvPr>
+        </p:nvSpPr>
+        <p:spPr/>
+      </p:sp>
+      <p:sp>
+        <p:nvSpPr>
+          <p:cNvPr id="3" name="Notes Placeholder 2">
+            <a:extLst>
+              <a:ext uri="{FF2B5EF4-FFF2-40B4-BE49-F238E27FC236}">
+                <a16:creationId xmlns:a16="http://schemas.microsoft.com/office/drawing/2014/main" id="{65ADF69B-A154-0205-8E11-ECBD89250411}"/>
+              </a:ext>
+            </a:extLst>
+          </p:cNvPr>
+          <p:cNvSpPr>
+            <a:spLocks noGrp="1"/>
+          </p:cNvSpPr>
+          <p:nvPr>
+            <p:ph type="body" idx="1"/>
+          </p:nvPr>
+        </p:nvSpPr>
+        <p:spPr/>
+        <p:txBody>
+          <a:bodyPr/>
+          <a:lstStyle/>
+          <a:p>
+            <a:pPr marL="0" marR="0" lvl="0" indent="0" algn="l" defTabSz="914400" rtl="0" eaLnBrk="1" fontAlgn="auto" latinLnBrk="0" hangingPunct="1">
+              <a:lnSpc>
+                <a:spcPct val="100000"/>
+              </a:lnSpc>
+              <a:spcBef>
+                <a:spcPts val="0"/>
+              </a:spcBef>
+              <a:spcAft>
+                <a:spcPts val="0"/>
+              </a:spcAft>
+              <a:buClrTx/>
+              <a:buSzTx/>
+              <a:buFontTx/>
+              <a:buNone/>
+              <a:tabLst/>
+              <a:defRPr/>
+            </a:pPr>
+            <a:r>
+              <a:rPr lang="en-US" dirty="0"/>
+              <a:t>Pancreatic Ductal Adenocarcinoma is the most common subtype of pancreatic cancer, constituting about 90% of all pancreatic cancer. PDAC is the third leading cause of cancer-related deaths in the U.S., with a 5-year survival rate of only 13.3%. It is also known to have extremely poor prognosis, with nearly 90% of tumors already metastasized at diagnosis. </a:t>
+            </a:r>
+          </a:p>
+          <a:p>
+            <a:pPr marL="0" marR="0" lvl="0" indent="0" algn="l" defTabSz="914400" rtl="0" eaLnBrk="1" fontAlgn="auto" latinLnBrk="0" hangingPunct="1">
+              <a:lnSpc>
+                <a:spcPct val="100000"/>
+              </a:lnSpc>
+              <a:spcBef>
+                <a:spcPts val="0"/>
+              </a:spcBef>
+              <a:spcAft>
+                <a:spcPts val="0"/>
+              </a:spcAft>
+              <a:buClrTx/>
+              <a:buSzTx/>
+              <a:buFontTx/>
+              <a:buNone/>
+              <a:tabLst/>
+              <a:defRPr/>
+            </a:pPr>
+            <a:endParaRPr lang="en-US" dirty="0"/>
+          </a:p>
+          <a:p>
+            <a:pPr marL="0" marR="0" lvl="0" indent="0" algn="l" defTabSz="914400" rtl="0" eaLnBrk="1" fontAlgn="auto" latinLnBrk="0" hangingPunct="1">
+              <a:lnSpc>
+                <a:spcPct val="100000"/>
+              </a:lnSpc>
+              <a:spcBef>
+                <a:spcPts val="0"/>
+              </a:spcBef>
+              <a:spcAft>
+                <a:spcPts val="0"/>
+              </a:spcAft>
+              <a:buClrTx/>
+              <a:buSzTx/>
+              <a:buFontTx/>
+              <a:buNone/>
+              <a:tabLst/>
+              <a:defRPr/>
+            </a:pPr>
+            <a:endParaRPr lang="en-US" dirty="0"/>
+          </a:p>
+          <a:p>
+            <a:pPr marL="0" marR="0" lvl="0" indent="0" algn="l" defTabSz="914400" rtl="0" eaLnBrk="1" fontAlgn="auto" latinLnBrk="0" hangingPunct="1">
+              <a:lnSpc>
+                <a:spcPct val="100000"/>
+              </a:lnSpc>
+              <a:spcBef>
+                <a:spcPts val="0"/>
+              </a:spcBef>
+              <a:spcAft>
+                <a:spcPts val="0"/>
+              </a:spcAft>
+              <a:buClrTx/>
+              <a:buSzTx/>
+              <a:buFontTx/>
+              <a:buNone/>
+              <a:tabLst/>
+              <a:defRPr/>
+            </a:pPr>
+            <a:endParaRPr lang="en-US" dirty="0"/>
+          </a:p>
+          <a:p>
+            <a:pPr marL="0" marR="0" lvl="0" indent="0" algn="l" defTabSz="914400" rtl="0" eaLnBrk="1" fontAlgn="auto" latinLnBrk="0" hangingPunct="1">
+              <a:lnSpc>
+                <a:spcPct val="100000"/>
+              </a:lnSpc>
+              <a:spcBef>
+                <a:spcPts val="0"/>
+              </a:spcBef>
+              <a:spcAft>
+                <a:spcPts val="0"/>
+              </a:spcAft>
+              <a:buClrTx/>
+              <a:buSzTx/>
+              <a:buFontTx/>
+              <a:buNone/>
+              <a:tabLst/>
+              <a:defRPr/>
+            </a:pPr>
+            <a:endParaRPr lang="en-US" dirty="0"/>
+          </a:p>
+          <a:p>
+            <a:pPr marL="0" marR="0" lvl="0" indent="0" algn="l" defTabSz="914400" rtl="0" eaLnBrk="1" fontAlgn="auto" latinLnBrk="0" hangingPunct="1">
+              <a:lnSpc>
+                <a:spcPct val="100000"/>
+              </a:lnSpc>
+              <a:spcBef>
+                <a:spcPts val="0"/>
+              </a:spcBef>
+              <a:spcAft>
+                <a:spcPts val="0"/>
+              </a:spcAft>
+              <a:buClrTx/>
+              <a:buSzTx/>
+              <a:buFontTx/>
+              <a:buNone/>
+              <a:tabLst/>
+              <a:defRPr/>
+            </a:pPr>
+            <a:r>
+              <a:rPr lang="en-US" dirty="0"/>
+              <a:t>PDAC begins in the epithelial cells lining the pancreatic ducts, which are normally responsible for regulating secretion of digestive enzymes into the small intestine. In PDAC, these cells acquire mutations that cause them to proliferate uncontrollably and eventually rupture the ductal membrane. After spreading into the stroma, cancer-associated fibroblasts develop dense networks of collogen fibers, known as desmoplasia, around the previous pancreatic ducts. This creates almost like a shield around the tumor, protecting it from immune attack and drug penetration. </a:t>
+            </a:r>
+          </a:p>
+          <a:p>
+            <a:pPr marL="0" marR="0" lvl="0" indent="0" algn="l" defTabSz="914400" rtl="0" eaLnBrk="1" fontAlgn="auto" latinLnBrk="0" hangingPunct="1">
+              <a:lnSpc>
+                <a:spcPct val="100000"/>
+              </a:lnSpc>
+              <a:spcBef>
+                <a:spcPts val="0"/>
+              </a:spcBef>
+              <a:spcAft>
+                <a:spcPts val="0"/>
+              </a:spcAft>
+              <a:buClrTx/>
+              <a:buSzTx/>
+              <a:buFontTx/>
+              <a:buNone/>
+              <a:tabLst/>
+              <a:defRPr/>
+            </a:pPr>
+            <a:endParaRPr lang="en-US" dirty="0"/>
+          </a:p>
+          <a:p>
+            <a:pPr marL="0" marR="0" lvl="0" indent="0" algn="l" defTabSz="914400" rtl="0" eaLnBrk="1" fontAlgn="auto" latinLnBrk="0" hangingPunct="1">
+              <a:lnSpc>
+                <a:spcPct val="100000"/>
+              </a:lnSpc>
+              <a:spcBef>
+                <a:spcPts val="0"/>
+              </a:spcBef>
+              <a:spcAft>
+                <a:spcPts val="0"/>
+              </a:spcAft>
+              <a:buClrTx/>
+              <a:buSzTx/>
+              <a:buFontTx/>
+              <a:buNone/>
+              <a:tabLst/>
+              <a:defRPr/>
+            </a:pPr>
+            <a:r>
+              <a:rPr lang="en-US" dirty="0"/>
+              <a:t>Pancreatic ductal adenocarcinoma is the most common subtype of pancreatic cancer, with a 5 year survival rate of only 13%. The low survival rate is thought to be due to multiple challenges to treatment such as the difficulty of detecting PDAC before it has metastasized. (add graphic) A hallmark of PDAC is what’s called a “desmoplastic” tumor microenvironment. Compared to healthy tissue on the left, PDAC on the right has masses of cell growth in places that used to be healthy ducts, and is infiltrated by a greater diversity of immune and stromal cells while being crisscrossed and encapsulated in this network of collagen fibers, which are deposited by cancer-associated fibroblasts. </a:t>
+            </a:r>
+            <a:r>
+              <a:rPr lang="en-US" sz="1200" dirty="0"/>
+              <a:t>The dense fibrotic network of collagen is referred to as desmoplasia and is seen in certain types of tumors.</a:t>
+            </a:r>
+            <a:endParaRPr lang="en-US" dirty="0"/>
+          </a:p>
+          <a:p>
+            <a:pPr marL="0" marR="0" lvl="0" indent="0" algn="l" defTabSz="914400" rtl="0" eaLnBrk="1" fontAlgn="auto" latinLnBrk="0" hangingPunct="1">
+              <a:lnSpc>
+                <a:spcPct val="100000"/>
+              </a:lnSpc>
+              <a:spcBef>
+                <a:spcPts val="0"/>
+              </a:spcBef>
+              <a:spcAft>
+                <a:spcPts val="0"/>
+              </a:spcAft>
+              <a:buClrTx/>
+              <a:buSzTx/>
+              <a:buFontTx/>
+              <a:buNone/>
+              <a:tabLst/>
+              <a:defRPr/>
+            </a:pPr>
+            <a:endParaRPr lang="en-US" dirty="0"/>
+          </a:p>
+          <a:p>
+            <a:pPr marL="0" marR="0" lvl="0" indent="0" algn="l" defTabSz="914400" rtl="0" eaLnBrk="1" fontAlgn="auto" latinLnBrk="0" hangingPunct="1">
+              <a:lnSpc>
+                <a:spcPct val="100000"/>
+              </a:lnSpc>
+              <a:spcBef>
+                <a:spcPts val="0"/>
+              </a:spcBef>
+              <a:spcAft>
+                <a:spcPts val="0"/>
+              </a:spcAft>
+              <a:buClrTx/>
+              <a:buSzTx/>
+              <a:buFontTx/>
+              <a:buNone/>
+              <a:tabLst/>
+              <a:defRPr/>
+            </a:pPr>
+            <a:r>
+              <a:rPr lang="en-US" dirty="0"/>
+              <a:t>Those immune cells that are found in this microenvironment are often suppressive such as T regulatory cells and suppressive macrophages. Some of the immune cells are “residents” that were probably there in the healthy tissue, but others are recruited from the periphery (</a:t>
+            </a:r>
+            <a:r>
+              <a:rPr lang="en-US" dirty="0" err="1"/>
+              <a:t>BM+blood</a:t>
+            </a:r>
+            <a:r>
+              <a:rPr lang="en-US" dirty="0"/>
+              <a:t>)</a:t>
+            </a:r>
+          </a:p>
+          <a:p>
+            <a:endParaRPr lang="en-US" dirty="0"/>
+          </a:p>
+        </p:txBody>
+      </p:sp>
+      <p:sp>
+        <p:nvSpPr>
+          <p:cNvPr id="4" name="Slide Number Placeholder 3">
+            <a:extLst>
+              <a:ext uri="{FF2B5EF4-FFF2-40B4-BE49-F238E27FC236}">
+                <a16:creationId xmlns:a16="http://schemas.microsoft.com/office/drawing/2014/main" id="{CE5A314A-4355-DAD8-D642-7F31D255D914}"/>
+              </a:ext>
+            </a:extLst>
+          </p:cNvPr>
+          <p:cNvSpPr>
+            <a:spLocks noGrp="1"/>
+          </p:cNvSpPr>
+          <p:nvPr>
+            <p:ph type="sldNum" sz="quarter" idx="5"/>
+          </p:nvPr>
+        </p:nvSpPr>
+        <p:spPr/>
+        <p:txBody>
+          <a:bodyPr/>
+          <a:lstStyle/>
+          <a:p>
+            <a:fld id="{B314B106-72D9-394B-AE7F-13630EA62899}" type="slidenum">
+              <a:rPr lang="en-US" smtClean="0"/>
+              <a:t>2</a:t>
+            </a:fld>
+            <a:endParaRPr lang="en-US"/>
+          </a:p>
+        </p:txBody>
+      </p:sp>
+    </p:spTree>
+    <p:extLst>
+      <p:ext uri="{BB962C8B-B14F-4D97-AF65-F5344CB8AC3E}">
+        <p14:creationId xmlns:p14="http://schemas.microsoft.com/office/powerpoint/2010/main" val="380097560"/>
+      </p:ext>
+    </p:extLst>
+  </p:cSld>
+  <p:clrMapOvr>
+    <a:masterClrMapping/>
+  </p:clrMapOvr>
+</p:notes>
+</file>
+
+<file path=ppt/notesSlides/notesSlide3.xml><?xml version="1.0" encoding="utf-8"?>
+<p:notes xmlns:a="http://schemas.openxmlformats.org/drawingml/2006/main" xmlns:r="http://schemas.openxmlformats.org/officeDocument/2006/relationships" xmlns:p="http://schemas.openxmlformats.org/presentationml/2006/main">
+  <p:cSld>
+    <p:spTree>
+      <p:nvGrpSpPr>
+        <p:cNvPr id="1" name="">
+          <a:extLst>
+            <a:ext uri="{FF2B5EF4-FFF2-40B4-BE49-F238E27FC236}">
+              <a16:creationId xmlns:a16="http://schemas.microsoft.com/office/drawing/2014/main" id="{649C2ACC-79C5-EF53-C92C-9C41D0C8960D}"/>
+            </a:ext>
+          </a:extLst>
+        </p:cNvPr>
+        <p:cNvGrpSpPr/>
+        <p:nvPr/>
+      </p:nvGrpSpPr>
+      <p:grpSpPr>
+        <a:xfrm>
+          <a:off x="0" y="0"/>
+          <a:ext cx="0" cy="0"/>
+          <a:chOff x="0" y="0"/>
+          <a:chExt cx="0" cy="0"/>
+        </a:xfrm>
+      </p:grpSpPr>
+      <p:sp>
+        <p:nvSpPr>
+          <p:cNvPr id="2" name="Slide Image Placeholder 1">
+            <a:extLst>
+              <a:ext uri="{FF2B5EF4-FFF2-40B4-BE49-F238E27FC236}">
+                <a16:creationId xmlns:a16="http://schemas.microsoft.com/office/drawing/2014/main" id="{7E29F928-EE96-2071-2B3F-A7E92D88CB69}"/>
+              </a:ext>
+            </a:extLst>
+          </p:cNvPr>
+          <p:cNvSpPr>
+            <a:spLocks noGrp="1" noRot="1" noChangeAspect="1"/>
+          </p:cNvSpPr>
+          <p:nvPr>
+            <p:ph type="sldImg"/>
+          </p:nvPr>
+        </p:nvSpPr>
+        <p:spPr/>
+      </p:sp>
+      <p:sp>
+        <p:nvSpPr>
+          <p:cNvPr id="3" name="Notes Placeholder 2">
+            <a:extLst>
+              <a:ext uri="{FF2B5EF4-FFF2-40B4-BE49-F238E27FC236}">
+                <a16:creationId xmlns:a16="http://schemas.microsoft.com/office/drawing/2014/main" id="{5666E213-BFE1-BD45-5A3B-16C5DAB63DEA}"/>
+              </a:ext>
+            </a:extLst>
+          </p:cNvPr>
+          <p:cNvSpPr>
+            <a:spLocks noGrp="1"/>
+          </p:cNvSpPr>
+          <p:nvPr>
+            <p:ph type="body" idx="1"/>
+          </p:nvPr>
+        </p:nvSpPr>
+        <p:spPr/>
+        <p:txBody>
+          <a:bodyPr/>
+          <a:lstStyle/>
+          <a:p>
+            <a:pPr marL="0" marR="0" lvl="0" indent="0" algn="l" defTabSz="914400" rtl="0" eaLnBrk="1" fontAlgn="auto" latinLnBrk="0" hangingPunct="1">
+              <a:lnSpc>
+                <a:spcPct val="100000"/>
+              </a:lnSpc>
+              <a:spcBef>
+                <a:spcPts val="0"/>
+              </a:spcBef>
+              <a:spcAft>
+                <a:spcPts val="0"/>
+              </a:spcAft>
+              <a:buClrTx/>
+              <a:buSzTx/>
+              <a:buFontTx/>
+              <a:buNone/>
+              <a:tabLst/>
+              <a:defRPr/>
+            </a:pPr>
+            <a:r>
+              <a:rPr lang="en-US" dirty="0"/>
+              <a:t>Pancreatic Ductal Adenocarcinoma is the most common subtype of pancreatic cancer, constituting about 90% of all pancreatic cancer. PDAC is the third leading cause of cancer-related deaths in the U.S., with a 5-year survival rate of only 13.3%. It is also known to have extremely poor prognosis, with nearly 90% of tumors already metastasized at diagnosis. </a:t>
+            </a:r>
+          </a:p>
+          <a:p>
+            <a:pPr marL="0" marR="0" lvl="0" indent="0" algn="l" defTabSz="914400" rtl="0" eaLnBrk="1" fontAlgn="auto" latinLnBrk="0" hangingPunct="1">
+              <a:lnSpc>
+                <a:spcPct val="100000"/>
+              </a:lnSpc>
+              <a:spcBef>
+                <a:spcPts val="0"/>
+              </a:spcBef>
+              <a:spcAft>
+                <a:spcPts val="0"/>
+              </a:spcAft>
+              <a:buClrTx/>
+              <a:buSzTx/>
+              <a:buFontTx/>
+              <a:buNone/>
+              <a:tabLst/>
+              <a:defRPr/>
+            </a:pPr>
+            <a:endParaRPr lang="en-US" dirty="0"/>
+          </a:p>
+          <a:p>
+            <a:pPr marL="0" marR="0" lvl="0" indent="0" algn="l" defTabSz="914400" rtl="0" eaLnBrk="1" fontAlgn="auto" latinLnBrk="0" hangingPunct="1">
+              <a:lnSpc>
+                <a:spcPct val="100000"/>
+              </a:lnSpc>
+              <a:spcBef>
+                <a:spcPts val="0"/>
+              </a:spcBef>
+              <a:spcAft>
+                <a:spcPts val="0"/>
+              </a:spcAft>
+              <a:buClrTx/>
+              <a:buSzTx/>
+              <a:buFontTx/>
+              <a:buNone/>
+              <a:tabLst/>
+              <a:defRPr/>
+            </a:pPr>
+            <a:endParaRPr lang="en-US" dirty="0"/>
+          </a:p>
+          <a:p>
+            <a:pPr marL="0" marR="0" lvl="0" indent="0" algn="l" defTabSz="914400" rtl="0" eaLnBrk="1" fontAlgn="auto" latinLnBrk="0" hangingPunct="1">
+              <a:lnSpc>
+                <a:spcPct val="100000"/>
+              </a:lnSpc>
+              <a:spcBef>
+                <a:spcPts val="0"/>
+              </a:spcBef>
+              <a:spcAft>
+                <a:spcPts val="0"/>
+              </a:spcAft>
+              <a:buClrTx/>
+              <a:buSzTx/>
+              <a:buFontTx/>
+              <a:buNone/>
+              <a:tabLst/>
+              <a:defRPr/>
+            </a:pPr>
+            <a:endParaRPr lang="en-US" dirty="0"/>
+          </a:p>
+          <a:p>
+            <a:pPr marL="0" marR="0" lvl="0" indent="0" algn="l" defTabSz="914400" rtl="0" eaLnBrk="1" fontAlgn="auto" latinLnBrk="0" hangingPunct="1">
+              <a:lnSpc>
+                <a:spcPct val="100000"/>
+              </a:lnSpc>
+              <a:spcBef>
+                <a:spcPts val="0"/>
+              </a:spcBef>
+              <a:spcAft>
+                <a:spcPts val="0"/>
+              </a:spcAft>
+              <a:buClrTx/>
+              <a:buSzTx/>
+              <a:buFontTx/>
+              <a:buNone/>
+              <a:tabLst/>
+              <a:defRPr/>
+            </a:pPr>
+            <a:endParaRPr lang="en-US" dirty="0"/>
+          </a:p>
+          <a:p>
+            <a:pPr marL="0" marR="0" lvl="0" indent="0" algn="l" defTabSz="914400" rtl="0" eaLnBrk="1" fontAlgn="auto" latinLnBrk="0" hangingPunct="1">
+              <a:lnSpc>
+                <a:spcPct val="100000"/>
+              </a:lnSpc>
+              <a:spcBef>
+                <a:spcPts val="0"/>
+              </a:spcBef>
+              <a:spcAft>
+                <a:spcPts val="0"/>
+              </a:spcAft>
+              <a:buClrTx/>
+              <a:buSzTx/>
+              <a:buFontTx/>
+              <a:buNone/>
+              <a:tabLst/>
+              <a:defRPr/>
+            </a:pPr>
+            <a:r>
+              <a:rPr lang="en-US" dirty="0"/>
+              <a:t>PDAC begins in the epithelial cells lining the pancreatic ducts, which are normally responsible for regulating secretion of digestive enzymes into the small intestine. In PDAC, these cells acquire mutations that cause them to proliferate uncontrollably and eventually rupture the ductal membrane. After spreading into the stroma, cancer-associated fibroblasts develop dense networks of collogen fibers, known as desmoplasia, around the previous pancreatic ducts. This creates almost like a shield around the tumor, protecting it from immune attack and drug penetration. </a:t>
+            </a:r>
+          </a:p>
+          <a:p>
+            <a:pPr marL="0" marR="0" lvl="0" indent="0" algn="l" defTabSz="914400" rtl="0" eaLnBrk="1" fontAlgn="auto" latinLnBrk="0" hangingPunct="1">
+              <a:lnSpc>
+                <a:spcPct val="100000"/>
+              </a:lnSpc>
+              <a:spcBef>
+                <a:spcPts val="0"/>
+              </a:spcBef>
+              <a:spcAft>
+                <a:spcPts val="0"/>
+              </a:spcAft>
+              <a:buClrTx/>
+              <a:buSzTx/>
+              <a:buFontTx/>
+              <a:buNone/>
+              <a:tabLst/>
+              <a:defRPr/>
+            </a:pPr>
+            <a:endParaRPr lang="en-US" dirty="0"/>
+          </a:p>
+          <a:p>
+            <a:pPr marL="0" marR="0" lvl="0" indent="0" algn="l" defTabSz="914400" rtl="0" eaLnBrk="1" fontAlgn="auto" latinLnBrk="0" hangingPunct="1">
+              <a:lnSpc>
+                <a:spcPct val="100000"/>
+              </a:lnSpc>
+              <a:spcBef>
+                <a:spcPts val="0"/>
+              </a:spcBef>
+              <a:spcAft>
+                <a:spcPts val="0"/>
+              </a:spcAft>
+              <a:buClrTx/>
+              <a:buSzTx/>
+              <a:buFontTx/>
+              <a:buNone/>
+              <a:tabLst/>
+              <a:defRPr/>
+            </a:pPr>
+            <a:r>
+              <a:rPr lang="en-US" dirty="0"/>
+              <a:t>Pancreatic ductal adenocarcinoma is the most common subtype of pancreatic cancer, with a 5 year survival rate of only 13%. The low survival rate is thought to be due to multiple challenges to treatment such as the difficulty of detecting PDAC before it has metastasized. (add graphic) A hallmark of PDAC is what’s called a “desmoplastic” tumor microenvironment. Compared to healthy tissue on the left, PDAC on the right has masses of cell growth in places that used to be healthy ducts, and is infiltrated by a greater diversity of immune and stromal cells while being crisscrossed and encapsulated in this network of collagen fibers, which are deposited by cancer-associated fibroblasts. </a:t>
+            </a:r>
+            <a:r>
+              <a:rPr lang="en-US" sz="1200" dirty="0"/>
+              <a:t>The dense fibrotic network of collagen is referred to as desmoplasia and is seen in certain types of tumors.</a:t>
+            </a:r>
+            <a:endParaRPr lang="en-US" dirty="0"/>
+          </a:p>
+          <a:p>
+            <a:pPr marL="0" marR="0" lvl="0" indent="0" algn="l" defTabSz="914400" rtl="0" eaLnBrk="1" fontAlgn="auto" latinLnBrk="0" hangingPunct="1">
+              <a:lnSpc>
+                <a:spcPct val="100000"/>
+              </a:lnSpc>
+              <a:spcBef>
+                <a:spcPts val="0"/>
+              </a:spcBef>
+              <a:spcAft>
+                <a:spcPts val="0"/>
+              </a:spcAft>
+              <a:buClrTx/>
+              <a:buSzTx/>
+              <a:buFontTx/>
+              <a:buNone/>
+              <a:tabLst/>
+              <a:defRPr/>
+            </a:pPr>
+            <a:endParaRPr lang="en-US" dirty="0"/>
+          </a:p>
+          <a:p>
+            <a:pPr marL="0" marR="0" lvl="0" indent="0" algn="l" defTabSz="914400" rtl="0" eaLnBrk="1" fontAlgn="auto" latinLnBrk="0" hangingPunct="1">
+              <a:lnSpc>
+                <a:spcPct val="100000"/>
+              </a:lnSpc>
+              <a:spcBef>
+                <a:spcPts val="0"/>
+              </a:spcBef>
+              <a:spcAft>
+                <a:spcPts val="0"/>
+              </a:spcAft>
+              <a:buClrTx/>
+              <a:buSzTx/>
+              <a:buFontTx/>
+              <a:buNone/>
+              <a:tabLst/>
+              <a:defRPr/>
+            </a:pPr>
+            <a:r>
+              <a:rPr lang="en-US" dirty="0"/>
+              <a:t>Those immune cells that are found in this microenvironment are often suppressive such as T regulatory cells and suppressive macrophages. Some of the immune cells are “residents” that were probably there in the healthy tissue, but others are recruited from the periphery (</a:t>
+            </a:r>
+            <a:r>
+              <a:rPr lang="en-US" dirty="0" err="1"/>
+              <a:t>BM+blood</a:t>
+            </a:r>
+            <a:r>
+              <a:rPr lang="en-US" dirty="0"/>
+              <a:t>)</a:t>
+            </a:r>
+          </a:p>
+          <a:p>
+            <a:endParaRPr lang="en-US" dirty="0"/>
+          </a:p>
+        </p:txBody>
+      </p:sp>
+      <p:sp>
+        <p:nvSpPr>
+          <p:cNvPr id="4" name="Slide Number Placeholder 3">
+            <a:extLst>
+              <a:ext uri="{FF2B5EF4-FFF2-40B4-BE49-F238E27FC236}">
+                <a16:creationId xmlns:a16="http://schemas.microsoft.com/office/drawing/2014/main" id="{6703A737-37C9-2788-B6B1-D3EBB0A93579}"/>
+              </a:ext>
+            </a:extLst>
+          </p:cNvPr>
+          <p:cNvSpPr>
+            <a:spLocks noGrp="1"/>
+          </p:cNvSpPr>
+          <p:nvPr>
+            <p:ph type="sldNum" sz="quarter" idx="5"/>
+          </p:nvPr>
+        </p:nvSpPr>
+        <p:spPr/>
+        <p:txBody>
+          <a:bodyPr/>
+          <a:lstStyle/>
+          <a:p>
+            <a:fld id="{B314B106-72D9-394B-AE7F-13630EA62899}" type="slidenum">
+              <a:rPr lang="en-US" smtClean="0"/>
+              <a:t>3</a:t>
+            </a:fld>
+            <a:endParaRPr lang="en-US"/>
+          </a:p>
+        </p:txBody>
+      </p:sp>
+    </p:spTree>
+    <p:extLst>
+      <p:ext uri="{BB962C8B-B14F-4D97-AF65-F5344CB8AC3E}">
+        <p14:creationId xmlns:p14="http://schemas.microsoft.com/office/powerpoint/2010/main" val="3902385321"/>
+      </p:ext>
+    </p:extLst>
+  </p:cSld>
+  <p:clrMapOvr>
+    <a:masterClrMapping/>
+  </p:clrMapOvr>
+</p:notes>
+</file>
+
+<file path=ppt/notesSlides/notesSlide4.xml><?xml version="1.0" encoding="utf-8"?>
+<p:notes xmlns:a="http://schemas.openxmlformats.org/drawingml/2006/main" xmlns:r="http://schemas.openxmlformats.org/officeDocument/2006/relationships" xmlns:p="http://schemas.openxmlformats.org/presentationml/2006/main">
+  <p:cSld>
+    <p:spTree>
+      <p:nvGrpSpPr>
+        <p:cNvPr id="1" name="">
+          <a:extLst>
+            <a:ext uri="{FF2B5EF4-FFF2-40B4-BE49-F238E27FC236}">
+              <a16:creationId xmlns:a16="http://schemas.microsoft.com/office/drawing/2014/main" id="{DA7DE17C-D287-E4F2-9555-B5260611FAF8}"/>
+            </a:ext>
+          </a:extLst>
+        </p:cNvPr>
+        <p:cNvGrpSpPr/>
+        <p:nvPr/>
+      </p:nvGrpSpPr>
+      <p:grpSpPr>
+        <a:xfrm>
+          <a:off x="0" y="0"/>
+          <a:ext cx="0" cy="0"/>
+          <a:chOff x="0" y="0"/>
+          <a:chExt cx="0" cy="0"/>
+        </a:xfrm>
+      </p:grpSpPr>
+      <p:sp>
+        <p:nvSpPr>
+          <p:cNvPr id="2" name="Slide Image Placeholder 1">
+            <a:extLst>
+              <a:ext uri="{FF2B5EF4-FFF2-40B4-BE49-F238E27FC236}">
+                <a16:creationId xmlns:a16="http://schemas.microsoft.com/office/drawing/2014/main" id="{EADDFC36-31DD-7A29-0F59-727D342135DC}"/>
+              </a:ext>
+            </a:extLst>
+          </p:cNvPr>
+          <p:cNvSpPr>
+            <a:spLocks noGrp="1" noRot="1" noChangeAspect="1"/>
+          </p:cNvSpPr>
+          <p:nvPr>
+            <p:ph type="sldImg"/>
+          </p:nvPr>
+        </p:nvSpPr>
+        <p:spPr/>
+      </p:sp>
+      <p:sp>
+        <p:nvSpPr>
+          <p:cNvPr id="3" name="Notes Placeholder 2">
+            <a:extLst>
+              <a:ext uri="{FF2B5EF4-FFF2-40B4-BE49-F238E27FC236}">
+                <a16:creationId xmlns:a16="http://schemas.microsoft.com/office/drawing/2014/main" id="{06AC8DC6-79BB-B129-F078-8D090C31624C}"/>
+              </a:ext>
+            </a:extLst>
+          </p:cNvPr>
+          <p:cNvSpPr>
+            <a:spLocks noGrp="1"/>
+          </p:cNvSpPr>
+          <p:nvPr>
+            <p:ph type="body" idx="1"/>
+          </p:nvPr>
+        </p:nvSpPr>
+        <p:spPr/>
+        <p:txBody>
+          <a:bodyPr/>
+          <a:lstStyle/>
+          <a:p>
+            <a:pPr marL="0" marR="0" lvl="0" indent="0" algn="l" defTabSz="914400" rtl="0" eaLnBrk="1" fontAlgn="auto" latinLnBrk="0" hangingPunct="1">
+              <a:lnSpc>
+                <a:spcPct val="100000"/>
+              </a:lnSpc>
+              <a:spcBef>
+                <a:spcPts val="0"/>
+              </a:spcBef>
+              <a:spcAft>
+                <a:spcPts val="0"/>
+              </a:spcAft>
+              <a:buClrTx/>
+              <a:buSzTx/>
+              <a:buFontTx/>
+              <a:buNone/>
+              <a:tabLst/>
+              <a:defRPr/>
+            </a:pPr>
+            <a:r>
+              <a:rPr lang="en-US" dirty="0"/>
+              <a:t>Pancreatic Ductal Adenocarcinoma is the most common subtype of pancreatic cancer, constituting about 90% of all pancreatic cancer. PDAC is the third leading cause of cancer-related deaths in the U.S., with a 5-year survival rate of only 13.3%. It is also known to have extremely poor prognosis, with nearly 90% of tumors already metastasized at diagnosis. </a:t>
+            </a:r>
+          </a:p>
+          <a:p>
+            <a:pPr marL="0" marR="0" lvl="0" indent="0" algn="l" defTabSz="914400" rtl="0" eaLnBrk="1" fontAlgn="auto" latinLnBrk="0" hangingPunct="1">
+              <a:lnSpc>
+                <a:spcPct val="100000"/>
+              </a:lnSpc>
+              <a:spcBef>
+                <a:spcPts val="0"/>
+              </a:spcBef>
+              <a:spcAft>
+                <a:spcPts val="0"/>
+              </a:spcAft>
+              <a:buClrTx/>
+              <a:buSzTx/>
+              <a:buFontTx/>
+              <a:buNone/>
+              <a:tabLst/>
+              <a:defRPr/>
+            </a:pPr>
+            <a:endParaRPr lang="en-US" dirty="0"/>
+          </a:p>
+          <a:p>
+            <a:pPr marL="0" marR="0" lvl="0" indent="0" algn="l" defTabSz="914400" rtl="0" eaLnBrk="1" fontAlgn="auto" latinLnBrk="0" hangingPunct="1">
+              <a:lnSpc>
+                <a:spcPct val="100000"/>
+              </a:lnSpc>
+              <a:spcBef>
+                <a:spcPts val="0"/>
+              </a:spcBef>
+              <a:spcAft>
+                <a:spcPts val="0"/>
+              </a:spcAft>
+              <a:buClrTx/>
+              <a:buSzTx/>
+              <a:buFontTx/>
+              <a:buNone/>
+              <a:tabLst/>
+              <a:defRPr/>
+            </a:pPr>
+            <a:endParaRPr lang="en-US" dirty="0"/>
+          </a:p>
+          <a:p>
+            <a:pPr marL="0" marR="0" lvl="0" indent="0" algn="l" defTabSz="914400" rtl="0" eaLnBrk="1" fontAlgn="auto" latinLnBrk="0" hangingPunct="1">
+              <a:lnSpc>
+                <a:spcPct val="100000"/>
+              </a:lnSpc>
+              <a:spcBef>
+                <a:spcPts val="0"/>
+              </a:spcBef>
+              <a:spcAft>
+                <a:spcPts val="0"/>
+              </a:spcAft>
+              <a:buClrTx/>
+              <a:buSzTx/>
+              <a:buFontTx/>
+              <a:buNone/>
+              <a:tabLst/>
+              <a:defRPr/>
+            </a:pPr>
+            <a:endParaRPr lang="en-US" dirty="0"/>
+          </a:p>
+          <a:p>
+            <a:pPr marL="0" marR="0" lvl="0" indent="0" algn="l" defTabSz="914400" rtl="0" eaLnBrk="1" fontAlgn="auto" latinLnBrk="0" hangingPunct="1">
+              <a:lnSpc>
+                <a:spcPct val="100000"/>
+              </a:lnSpc>
+              <a:spcBef>
+                <a:spcPts val="0"/>
+              </a:spcBef>
+              <a:spcAft>
+                <a:spcPts val="0"/>
+              </a:spcAft>
+              <a:buClrTx/>
+              <a:buSzTx/>
+              <a:buFontTx/>
+              <a:buNone/>
+              <a:tabLst/>
+              <a:defRPr/>
+            </a:pPr>
+            <a:endParaRPr lang="en-US" dirty="0"/>
+          </a:p>
+          <a:p>
+            <a:pPr marL="0" marR="0" lvl="0" indent="0" algn="l" defTabSz="914400" rtl="0" eaLnBrk="1" fontAlgn="auto" latinLnBrk="0" hangingPunct="1">
+              <a:lnSpc>
+                <a:spcPct val="100000"/>
+              </a:lnSpc>
+              <a:spcBef>
+                <a:spcPts val="0"/>
+              </a:spcBef>
+              <a:spcAft>
+                <a:spcPts val="0"/>
+              </a:spcAft>
+              <a:buClrTx/>
+              <a:buSzTx/>
+              <a:buFontTx/>
+              <a:buNone/>
+              <a:tabLst/>
+              <a:defRPr/>
+            </a:pPr>
+            <a:r>
+              <a:rPr lang="en-US" dirty="0"/>
+              <a:t>PDAC begins in the epithelial cells lining the pancreatic ducts, which are normally responsible for regulating secretion of digestive enzymes into the small intestine. In PDAC, these cells acquire mutations that cause them to proliferate uncontrollably and eventually rupture the ductal membrane. After spreading into the stroma, cancer-associated fibroblasts develop dense networks of collogen fibers, known as desmoplasia, around the previous pancreatic ducts. This creates almost like a shield around the tumor, protecting it from immune attack and drug penetration. </a:t>
+            </a:r>
+          </a:p>
+          <a:p>
+            <a:pPr marL="0" marR="0" lvl="0" indent="0" algn="l" defTabSz="914400" rtl="0" eaLnBrk="1" fontAlgn="auto" latinLnBrk="0" hangingPunct="1">
+              <a:lnSpc>
+                <a:spcPct val="100000"/>
+              </a:lnSpc>
+              <a:spcBef>
+                <a:spcPts val="0"/>
+              </a:spcBef>
+              <a:spcAft>
+                <a:spcPts val="0"/>
+              </a:spcAft>
+              <a:buClrTx/>
+              <a:buSzTx/>
+              <a:buFontTx/>
+              <a:buNone/>
+              <a:tabLst/>
+              <a:defRPr/>
+            </a:pPr>
+            <a:endParaRPr lang="en-US" dirty="0"/>
+          </a:p>
+          <a:p>
+            <a:pPr marL="0" marR="0" lvl="0" indent="0" algn="l" defTabSz="914400" rtl="0" eaLnBrk="1" fontAlgn="auto" latinLnBrk="0" hangingPunct="1">
+              <a:lnSpc>
+                <a:spcPct val="100000"/>
+              </a:lnSpc>
+              <a:spcBef>
+                <a:spcPts val="0"/>
+              </a:spcBef>
+              <a:spcAft>
+                <a:spcPts val="0"/>
+              </a:spcAft>
+              <a:buClrTx/>
+              <a:buSzTx/>
+              <a:buFontTx/>
+              <a:buNone/>
+              <a:tabLst/>
+              <a:defRPr/>
+            </a:pPr>
+            <a:r>
+              <a:rPr lang="en-US" dirty="0"/>
+              <a:t>Pancreatic ductal adenocarcinoma is the most common subtype of pancreatic cancer, with a 5 year survival rate of only 13%. The low survival rate is thought to be due to multiple challenges to treatment such as the difficulty of detecting PDAC before it has metastasized. (add graphic) A hallmark of PDAC is what’s called a “desmoplastic” tumor microenvironment. Compared to healthy tissue on the left, PDAC on the right has masses of cell growth in places that used to be healthy ducts, and is infiltrated by a greater diversity of immune and stromal cells while being crisscrossed and encapsulated in this network of collagen fibers, which are deposited by cancer-associated fibroblasts. </a:t>
+            </a:r>
+            <a:r>
+              <a:rPr lang="en-US" sz="1200" dirty="0"/>
+              <a:t>The dense fibrotic network of collagen is referred to as desmoplasia and is seen in certain types of tumors.</a:t>
+            </a:r>
+            <a:endParaRPr lang="en-US" dirty="0"/>
+          </a:p>
+          <a:p>
+            <a:pPr marL="0" marR="0" lvl="0" indent="0" algn="l" defTabSz="914400" rtl="0" eaLnBrk="1" fontAlgn="auto" latinLnBrk="0" hangingPunct="1">
+              <a:lnSpc>
+                <a:spcPct val="100000"/>
+              </a:lnSpc>
+              <a:spcBef>
+                <a:spcPts val="0"/>
+              </a:spcBef>
+              <a:spcAft>
+                <a:spcPts val="0"/>
+              </a:spcAft>
+              <a:buClrTx/>
+              <a:buSzTx/>
+              <a:buFontTx/>
+              <a:buNone/>
+              <a:tabLst/>
+              <a:defRPr/>
+            </a:pPr>
+            <a:endParaRPr lang="en-US" dirty="0"/>
+          </a:p>
+          <a:p>
+            <a:pPr marL="0" marR="0" lvl="0" indent="0" algn="l" defTabSz="914400" rtl="0" eaLnBrk="1" fontAlgn="auto" latinLnBrk="0" hangingPunct="1">
+              <a:lnSpc>
+                <a:spcPct val="100000"/>
+              </a:lnSpc>
+              <a:spcBef>
+                <a:spcPts val="0"/>
+              </a:spcBef>
+              <a:spcAft>
+                <a:spcPts val="0"/>
+              </a:spcAft>
+              <a:buClrTx/>
+              <a:buSzTx/>
+              <a:buFontTx/>
+              <a:buNone/>
+              <a:tabLst/>
+              <a:defRPr/>
+            </a:pPr>
+            <a:r>
+              <a:rPr lang="en-US" dirty="0"/>
+              <a:t>Those immune cells that are found in this microenvironment are often suppressive such as T regulatory cells and suppressive macrophages. Some of the immune cells are “residents” that were probably there in the healthy tissue, but others are recruited from the periphery (</a:t>
+            </a:r>
+            <a:r>
+              <a:rPr lang="en-US" dirty="0" err="1"/>
+              <a:t>BM+blood</a:t>
+            </a:r>
+            <a:r>
+              <a:rPr lang="en-US" dirty="0"/>
+              <a:t>)</a:t>
+            </a:r>
+          </a:p>
+          <a:p>
+            <a:endParaRPr lang="en-US" dirty="0"/>
+          </a:p>
+        </p:txBody>
+      </p:sp>
+      <p:sp>
+        <p:nvSpPr>
+          <p:cNvPr id="4" name="Slide Number Placeholder 3">
+            <a:extLst>
+              <a:ext uri="{FF2B5EF4-FFF2-40B4-BE49-F238E27FC236}">
+                <a16:creationId xmlns:a16="http://schemas.microsoft.com/office/drawing/2014/main" id="{B8DB3696-31BE-B389-1A3D-95B4F3D431A4}"/>
+              </a:ext>
+            </a:extLst>
+          </p:cNvPr>
+          <p:cNvSpPr>
+            <a:spLocks noGrp="1"/>
+          </p:cNvSpPr>
+          <p:nvPr>
+            <p:ph type="sldNum" sz="quarter" idx="5"/>
+          </p:nvPr>
+        </p:nvSpPr>
+        <p:spPr/>
+        <p:txBody>
+          <a:bodyPr/>
+          <a:lstStyle/>
+          <a:p>
+            <a:fld id="{B314B106-72D9-394B-AE7F-13630EA62899}" type="slidenum">
+              <a:rPr lang="en-US" smtClean="0"/>
+              <a:t>4</a:t>
+            </a:fld>
+            <a:endParaRPr lang="en-US"/>
+          </a:p>
+        </p:txBody>
+      </p:sp>
+    </p:spTree>
+    <p:extLst>
+      <p:ext uri="{BB962C8B-B14F-4D97-AF65-F5344CB8AC3E}">
+        <p14:creationId xmlns:p14="http://schemas.microsoft.com/office/powerpoint/2010/main" val="2208492687"/>
+      </p:ext>
+    </p:extLst>
+  </p:cSld>
+  <p:clrMapOvr>
+    <a:masterClrMapping/>
+  </p:clrMapOvr>
+</p:notes>
+</file>
+
+<file path=ppt/notesSlides/notesSlide5.xml><?xml version="1.0" encoding="utf-8"?>
+<p:notes xmlns:a="http://schemas.openxmlformats.org/drawingml/2006/main" xmlns:r="http://schemas.openxmlformats.org/officeDocument/2006/relationships" xmlns:p="http://schemas.openxmlformats.org/presentationml/2006/main">
+  <p:cSld>
+    <p:spTree>
+      <p:nvGrpSpPr>
+        <p:cNvPr id="1" name="">
+          <a:extLst>
+            <a:ext uri="{FF2B5EF4-FFF2-40B4-BE49-F238E27FC236}">
+              <a16:creationId xmlns:a16="http://schemas.microsoft.com/office/drawing/2014/main" id="{9EB8E748-4CAE-78F3-D237-5CBCAFF3EFD2}"/>
+            </a:ext>
+          </a:extLst>
+        </p:cNvPr>
+        <p:cNvGrpSpPr/>
+        <p:nvPr/>
+      </p:nvGrpSpPr>
+      <p:grpSpPr>
+        <a:xfrm>
+          <a:off x="0" y="0"/>
+          <a:ext cx="0" cy="0"/>
+          <a:chOff x="0" y="0"/>
+          <a:chExt cx="0" cy="0"/>
+        </a:xfrm>
+      </p:grpSpPr>
+      <p:sp>
+        <p:nvSpPr>
+          <p:cNvPr id="2" name="Slide Image Placeholder 1">
+            <a:extLst>
+              <a:ext uri="{FF2B5EF4-FFF2-40B4-BE49-F238E27FC236}">
+                <a16:creationId xmlns:a16="http://schemas.microsoft.com/office/drawing/2014/main" id="{7D016BBE-F17F-BB50-F8BB-B387427B9685}"/>
+              </a:ext>
+            </a:extLst>
+          </p:cNvPr>
+          <p:cNvSpPr>
+            <a:spLocks noGrp="1" noRot="1" noChangeAspect="1"/>
+          </p:cNvSpPr>
+          <p:nvPr>
+            <p:ph type="sldImg"/>
+          </p:nvPr>
+        </p:nvSpPr>
+        <p:spPr/>
+      </p:sp>
+      <p:sp>
+        <p:nvSpPr>
+          <p:cNvPr id="3" name="Notes Placeholder 2">
+            <a:extLst>
+              <a:ext uri="{FF2B5EF4-FFF2-40B4-BE49-F238E27FC236}">
+                <a16:creationId xmlns:a16="http://schemas.microsoft.com/office/drawing/2014/main" id="{7DE0EDB9-D6C2-0612-7C82-EA8CBD544236}"/>
+              </a:ext>
+            </a:extLst>
+          </p:cNvPr>
+          <p:cNvSpPr>
+            <a:spLocks noGrp="1"/>
+          </p:cNvSpPr>
+          <p:nvPr>
+            <p:ph type="body" idx="1"/>
+          </p:nvPr>
+        </p:nvSpPr>
+        <p:spPr/>
+        <p:txBody>
+          <a:bodyPr/>
+          <a:lstStyle/>
+          <a:p>
+            <a:pPr marL="0" marR="0" lvl="0" indent="0" algn="l" defTabSz="914400" rtl="0" eaLnBrk="1" fontAlgn="auto" latinLnBrk="0" hangingPunct="1">
+              <a:lnSpc>
+                <a:spcPct val="100000"/>
+              </a:lnSpc>
+              <a:spcBef>
+                <a:spcPts val="0"/>
+              </a:spcBef>
+              <a:spcAft>
+                <a:spcPts val="0"/>
+              </a:spcAft>
+              <a:buClrTx/>
+              <a:buSzTx/>
+              <a:buFontTx/>
+              <a:buNone/>
+              <a:tabLst/>
+              <a:defRPr/>
+            </a:pPr>
+            <a:r>
+              <a:rPr lang="en-US" dirty="0"/>
+              <a:t>Pancreatic Ductal Adenocarcinoma is the most common subtype of pancreatic cancer, constituting about 90% of all pancreatic cancer. PDAC is the third leading cause of cancer-related deaths in the U.S., with a 5-year survival rate of only 13.3%. It is also known to have extremely poor prognosis, with nearly 90% of tumors already metastasized at diagnosis. </a:t>
+            </a:r>
+          </a:p>
+          <a:p>
+            <a:pPr marL="0" marR="0" lvl="0" indent="0" algn="l" defTabSz="914400" rtl="0" eaLnBrk="1" fontAlgn="auto" latinLnBrk="0" hangingPunct="1">
+              <a:lnSpc>
+                <a:spcPct val="100000"/>
+              </a:lnSpc>
+              <a:spcBef>
+                <a:spcPts val="0"/>
+              </a:spcBef>
+              <a:spcAft>
+                <a:spcPts val="0"/>
+              </a:spcAft>
+              <a:buClrTx/>
+              <a:buSzTx/>
+              <a:buFontTx/>
+              <a:buNone/>
+              <a:tabLst/>
+              <a:defRPr/>
+            </a:pPr>
+            <a:endParaRPr lang="en-US" dirty="0"/>
+          </a:p>
+          <a:p>
+            <a:pPr marL="0" marR="0" lvl="0" indent="0" algn="l" defTabSz="914400" rtl="0" eaLnBrk="1" fontAlgn="auto" latinLnBrk="0" hangingPunct="1">
+              <a:lnSpc>
+                <a:spcPct val="100000"/>
+              </a:lnSpc>
+              <a:spcBef>
+                <a:spcPts val="0"/>
+              </a:spcBef>
+              <a:spcAft>
+                <a:spcPts val="0"/>
+              </a:spcAft>
+              <a:buClrTx/>
+              <a:buSzTx/>
+              <a:buFontTx/>
+              <a:buNone/>
+              <a:tabLst/>
+              <a:defRPr/>
+            </a:pPr>
+            <a:endParaRPr lang="en-US" dirty="0"/>
+          </a:p>
+          <a:p>
+            <a:pPr marL="0" marR="0" lvl="0" indent="0" algn="l" defTabSz="914400" rtl="0" eaLnBrk="1" fontAlgn="auto" latinLnBrk="0" hangingPunct="1">
+              <a:lnSpc>
+                <a:spcPct val="100000"/>
+              </a:lnSpc>
+              <a:spcBef>
+                <a:spcPts val="0"/>
+              </a:spcBef>
+              <a:spcAft>
+                <a:spcPts val="0"/>
+              </a:spcAft>
+              <a:buClrTx/>
+              <a:buSzTx/>
+              <a:buFontTx/>
+              <a:buNone/>
+              <a:tabLst/>
+              <a:defRPr/>
+            </a:pPr>
+            <a:endParaRPr lang="en-US" dirty="0"/>
+          </a:p>
+          <a:p>
+            <a:pPr marL="0" marR="0" lvl="0" indent="0" algn="l" defTabSz="914400" rtl="0" eaLnBrk="1" fontAlgn="auto" latinLnBrk="0" hangingPunct="1">
+              <a:lnSpc>
+                <a:spcPct val="100000"/>
+              </a:lnSpc>
+              <a:spcBef>
+                <a:spcPts val="0"/>
+              </a:spcBef>
+              <a:spcAft>
+                <a:spcPts val="0"/>
+              </a:spcAft>
+              <a:buClrTx/>
+              <a:buSzTx/>
+              <a:buFontTx/>
+              <a:buNone/>
+              <a:tabLst/>
+              <a:defRPr/>
+            </a:pPr>
+            <a:endParaRPr lang="en-US" dirty="0"/>
+          </a:p>
+          <a:p>
+            <a:pPr marL="0" marR="0" lvl="0" indent="0" algn="l" defTabSz="914400" rtl="0" eaLnBrk="1" fontAlgn="auto" latinLnBrk="0" hangingPunct="1">
+              <a:lnSpc>
+                <a:spcPct val="100000"/>
+              </a:lnSpc>
+              <a:spcBef>
+                <a:spcPts val="0"/>
+              </a:spcBef>
+              <a:spcAft>
+                <a:spcPts val="0"/>
+              </a:spcAft>
+              <a:buClrTx/>
+              <a:buSzTx/>
+              <a:buFontTx/>
+              <a:buNone/>
+              <a:tabLst/>
+              <a:defRPr/>
+            </a:pPr>
+            <a:r>
+              <a:rPr lang="en-US" dirty="0"/>
+              <a:t>PDAC begins in the epithelial cells lining the pancreatic ducts, which are normally responsible for regulating secretion of digestive enzymes into the small intestine. In PDAC, these cells acquire mutations that cause them to proliferate uncontrollably and eventually rupture the ductal membrane. After spreading into the stroma, cancer-associated fibroblasts develop dense networks of collogen fibers, known as desmoplasia, around the previous pancreatic ducts. This creates almost like a shield around the tumor, protecting it from immune attack and drug penetration. </a:t>
+            </a:r>
+          </a:p>
+          <a:p>
+            <a:pPr marL="0" marR="0" lvl="0" indent="0" algn="l" defTabSz="914400" rtl="0" eaLnBrk="1" fontAlgn="auto" latinLnBrk="0" hangingPunct="1">
+              <a:lnSpc>
+                <a:spcPct val="100000"/>
+              </a:lnSpc>
+              <a:spcBef>
+                <a:spcPts val="0"/>
+              </a:spcBef>
+              <a:spcAft>
+                <a:spcPts val="0"/>
+              </a:spcAft>
+              <a:buClrTx/>
+              <a:buSzTx/>
+              <a:buFontTx/>
+              <a:buNone/>
+              <a:tabLst/>
+              <a:defRPr/>
+            </a:pPr>
+            <a:endParaRPr lang="en-US" dirty="0"/>
+          </a:p>
+          <a:p>
+            <a:pPr marL="0" marR="0" lvl="0" indent="0" algn="l" defTabSz="914400" rtl="0" eaLnBrk="1" fontAlgn="auto" latinLnBrk="0" hangingPunct="1">
+              <a:lnSpc>
+                <a:spcPct val="100000"/>
+              </a:lnSpc>
+              <a:spcBef>
+                <a:spcPts val="0"/>
+              </a:spcBef>
+              <a:spcAft>
+                <a:spcPts val="0"/>
+              </a:spcAft>
+              <a:buClrTx/>
+              <a:buSzTx/>
+              <a:buFontTx/>
+              <a:buNone/>
+              <a:tabLst/>
+              <a:defRPr/>
+            </a:pPr>
+            <a:r>
+              <a:rPr lang="en-US" dirty="0"/>
+              <a:t>Pancreatic ductal adenocarcinoma is the most common subtype of pancreatic cancer, with a 5 year survival rate of only 13%. The low survival rate is thought to be due to multiple challenges to treatment such as the difficulty of detecting PDAC before it has metastasized. (add graphic) A hallmark of PDAC is what’s called a “desmoplastic” tumor microenvironment. Compared to healthy tissue on the left, PDAC on the right has masses of cell growth in places that used to be healthy ducts, and is infiltrated by a greater diversity of immune and stromal cells while being crisscrossed and encapsulated in this network of collagen fibers, which are deposited by cancer-associated fibroblasts. </a:t>
+            </a:r>
+            <a:r>
+              <a:rPr lang="en-US" sz="1200" dirty="0"/>
+              <a:t>The dense fibrotic network of collagen is referred to as desmoplasia and is seen in certain types of tumors.</a:t>
+            </a:r>
+            <a:endParaRPr lang="en-US" dirty="0"/>
+          </a:p>
+          <a:p>
+            <a:pPr marL="0" marR="0" lvl="0" indent="0" algn="l" defTabSz="914400" rtl="0" eaLnBrk="1" fontAlgn="auto" latinLnBrk="0" hangingPunct="1">
+              <a:lnSpc>
+                <a:spcPct val="100000"/>
+              </a:lnSpc>
+              <a:spcBef>
+                <a:spcPts val="0"/>
+              </a:spcBef>
+              <a:spcAft>
+                <a:spcPts val="0"/>
+              </a:spcAft>
+              <a:buClrTx/>
+              <a:buSzTx/>
+              <a:buFontTx/>
+              <a:buNone/>
+              <a:tabLst/>
+              <a:defRPr/>
+            </a:pPr>
+            <a:endParaRPr lang="en-US" dirty="0"/>
+          </a:p>
+          <a:p>
+            <a:pPr marL="0" marR="0" lvl="0" indent="0" algn="l" defTabSz="914400" rtl="0" eaLnBrk="1" fontAlgn="auto" latinLnBrk="0" hangingPunct="1">
+              <a:lnSpc>
+                <a:spcPct val="100000"/>
+              </a:lnSpc>
+              <a:spcBef>
+                <a:spcPts val="0"/>
+              </a:spcBef>
+              <a:spcAft>
+                <a:spcPts val="0"/>
+              </a:spcAft>
+              <a:buClrTx/>
+              <a:buSzTx/>
+              <a:buFontTx/>
+              <a:buNone/>
+              <a:tabLst/>
+              <a:defRPr/>
+            </a:pPr>
+            <a:r>
+              <a:rPr lang="en-US" dirty="0"/>
+              <a:t>Those immune cells that are found in this microenvironment are often suppressive such as T regulatory cells and suppressive macrophages. Some of the immune cells are “residents” that were probably there in the healthy tissue, but others are recruited from the periphery (</a:t>
+            </a:r>
+            <a:r>
+              <a:rPr lang="en-US" dirty="0" err="1"/>
+              <a:t>BM+blood</a:t>
+            </a:r>
+            <a:r>
+              <a:rPr lang="en-US" dirty="0"/>
+              <a:t>)</a:t>
+            </a:r>
+          </a:p>
+          <a:p>
+            <a:endParaRPr lang="en-US" dirty="0"/>
+          </a:p>
+        </p:txBody>
+      </p:sp>
+      <p:sp>
+        <p:nvSpPr>
+          <p:cNvPr id="4" name="Slide Number Placeholder 3">
+            <a:extLst>
+              <a:ext uri="{FF2B5EF4-FFF2-40B4-BE49-F238E27FC236}">
+                <a16:creationId xmlns:a16="http://schemas.microsoft.com/office/drawing/2014/main" id="{65935998-F14E-7885-A99C-29F5E8ECCBF7}"/>
+              </a:ext>
+            </a:extLst>
+          </p:cNvPr>
+          <p:cNvSpPr>
+            <a:spLocks noGrp="1"/>
+          </p:cNvSpPr>
+          <p:nvPr>
+            <p:ph type="sldNum" sz="quarter" idx="5"/>
+          </p:nvPr>
+        </p:nvSpPr>
+        <p:spPr/>
+        <p:txBody>
+          <a:bodyPr/>
+          <a:lstStyle/>
+          <a:p>
+            <a:fld id="{B314B106-72D9-394B-AE7F-13630EA62899}" type="slidenum">
+              <a:rPr lang="en-US" smtClean="0"/>
+              <a:t>6</a:t>
+            </a:fld>
+            <a:endParaRPr lang="en-US"/>
+          </a:p>
+        </p:txBody>
+      </p:sp>
+    </p:spTree>
+    <p:extLst>
+      <p:ext uri="{BB962C8B-B14F-4D97-AF65-F5344CB8AC3E}">
+        <p14:creationId xmlns:p14="http://schemas.microsoft.com/office/powerpoint/2010/main" val="1548959108"/>
+      </p:ext>
+    </p:extLst>
+  </p:cSld>
+  <p:clrMapOvr>
+    <a:masterClrMapping/>
+  </p:clrMapOvr>
+</p:notes>
+</file>
+
+<file path=ppt/notesSlides/notesSlide6.xml><?xml version="1.0" encoding="utf-8"?>
+<p:notes xmlns:a="http://schemas.openxmlformats.org/drawingml/2006/main" xmlns:r="http://schemas.openxmlformats.org/officeDocument/2006/relationships" xmlns:p="http://schemas.openxmlformats.org/presentationml/2006/main">
+  <p:cSld>
+    <p:spTree>
+      <p:nvGrpSpPr>
+        <p:cNvPr id="1" name="">
+          <a:extLst>
+            <a:ext uri="{FF2B5EF4-FFF2-40B4-BE49-F238E27FC236}">
+              <a16:creationId xmlns:a16="http://schemas.microsoft.com/office/drawing/2014/main" id="{48979CB3-A21A-DE50-0904-6AA80D8C2B2C}"/>
+            </a:ext>
+          </a:extLst>
+        </p:cNvPr>
+        <p:cNvGrpSpPr/>
+        <p:nvPr/>
+      </p:nvGrpSpPr>
+      <p:grpSpPr>
+        <a:xfrm>
+          <a:off x="0" y="0"/>
+          <a:ext cx="0" cy="0"/>
+          <a:chOff x="0" y="0"/>
+          <a:chExt cx="0" cy="0"/>
+        </a:xfrm>
+      </p:grpSpPr>
+      <p:sp>
+        <p:nvSpPr>
+          <p:cNvPr id="2" name="Slide Image Placeholder 1">
+            <a:extLst>
+              <a:ext uri="{FF2B5EF4-FFF2-40B4-BE49-F238E27FC236}">
+                <a16:creationId xmlns:a16="http://schemas.microsoft.com/office/drawing/2014/main" id="{B8EF8597-08D6-674A-D533-50F013ADF1AE}"/>
+              </a:ext>
+            </a:extLst>
+          </p:cNvPr>
+          <p:cNvSpPr>
+            <a:spLocks noGrp="1" noRot="1" noChangeAspect="1"/>
+          </p:cNvSpPr>
+          <p:nvPr>
+            <p:ph type="sldImg"/>
+          </p:nvPr>
+        </p:nvSpPr>
+        <p:spPr/>
+      </p:sp>
+      <p:sp>
+        <p:nvSpPr>
+          <p:cNvPr id="3" name="Notes Placeholder 2">
+            <a:extLst>
+              <a:ext uri="{FF2B5EF4-FFF2-40B4-BE49-F238E27FC236}">
+                <a16:creationId xmlns:a16="http://schemas.microsoft.com/office/drawing/2014/main" id="{4A02F682-F949-EFC3-C6B2-20CF0E2DF4F5}"/>
+              </a:ext>
+            </a:extLst>
+          </p:cNvPr>
+          <p:cNvSpPr>
+            <a:spLocks noGrp="1"/>
+          </p:cNvSpPr>
+          <p:nvPr>
+            <p:ph type="body" idx="1"/>
+          </p:nvPr>
+        </p:nvSpPr>
+        <p:spPr/>
+        <p:txBody>
+          <a:bodyPr/>
+          <a:lstStyle/>
+          <a:p>
+            <a:pPr marL="0" marR="0" lvl="0" indent="0" algn="l" defTabSz="914400" rtl="0" eaLnBrk="1" fontAlgn="auto" latinLnBrk="0" hangingPunct="1">
+              <a:lnSpc>
+                <a:spcPct val="100000"/>
+              </a:lnSpc>
+              <a:spcBef>
+                <a:spcPts val="0"/>
+              </a:spcBef>
+              <a:spcAft>
+                <a:spcPts val="0"/>
+              </a:spcAft>
+              <a:buClrTx/>
+              <a:buSzTx/>
+              <a:buFontTx/>
+              <a:buNone/>
+              <a:tabLst/>
+              <a:defRPr/>
+            </a:pPr>
+            <a:r>
+              <a:rPr lang="en-US" dirty="0"/>
+              <a:t>Pancreatic Ductal Adenocarcinoma is the most common subtype of pancreatic cancer, constituting about 90% of all pancreatic cancer. PDAC is the third leading cause of cancer-related deaths in the U.S., with a 5-year survival rate of only 13.3%. It is also known to have extremely poor prognosis, with nearly 90% of tumors already metastasized at diagnosis. </a:t>
+            </a:r>
+          </a:p>
+          <a:p>
+            <a:pPr marL="0" marR="0" lvl="0" indent="0" algn="l" defTabSz="914400" rtl="0" eaLnBrk="1" fontAlgn="auto" latinLnBrk="0" hangingPunct="1">
+              <a:lnSpc>
+                <a:spcPct val="100000"/>
+              </a:lnSpc>
+              <a:spcBef>
+                <a:spcPts val="0"/>
+              </a:spcBef>
+              <a:spcAft>
+                <a:spcPts val="0"/>
+              </a:spcAft>
+              <a:buClrTx/>
+              <a:buSzTx/>
+              <a:buFontTx/>
+              <a:buNone/>
+              <a:tabLst/>
+              <a:defRPr/>
+            </a:pPr>
+            <a:endParaRPr lang="en-US" dirty="0"/>
+          </a:p>
+          <a:p>
+            <a:pPr marL="0" marR="0" lvl="0" indent="0" algn="l" defTabSz="914400" rtl="0" eaLnBrk="1" fontAlgn="auto" latinLnBrk="0" hangingPunct="1">
+              <a:lnSpc>
+                <a:spcPct val="100000"/>
+              </a:lnSpc>
+              <a:spcBef>
+                <a:spcPts val="0"/>
+              </a:spcBef>
+              <a:spcAft>
+                <a:spcPts val="0"/>
+              </a:spcAft>
+              <a:buClrTx/>
+              <a:buSzTx/>
+              <a:buFontTx/>
+              <a:buNone/>
+              <a:tabLst/>
+              <a:defRPr/>
+            </a:pPr>
+            <a:endParaRPr lang="en-US" dirty="0"/>
+          </a:p>
+          <a:p>
+            <a:pPr marL="0" marR="0" lvl="0" indent="0" algn="l" defTabSz="914400" rtl="0" eaLnBrk="1" fontAlgn="auto" latinLnBrk="0" hangingPunct="1">
+              <a:lnSpc>
+                <a:spcPct val="100000"/>
+              </a:lnSpc>
+              <a:spcBef>
+                <a:spcPts val="0"/>
+              </a:spcBef>
+              <a:spcAft>
+                <a:spcPts val="0"/>
+              </a:spcAft>
+              <a:buClrTx/>
+              <a:buSzTx/>
+              <a:buFontTx/>
+              <a:buNone/>
+              <a:tabLst/>
+              <a:defRPr/>
+            </a:pPr>
+            <a:endParaRPr lang="en-US" dirty="0"/>
+          </a:p>
+          <a:p>
+            <a:pPr marL="0" marR="0" lvl="0" indent="0" algn="l" defTabSz="914400" rtl="0" eaLnBrk="1" fontAlgn="auto" latinLnBrk="0" hangingPunct="1">
+              <a:lnSpc>
+                <a:spcPct val="100000"/>
+              </a:lnSpc>
+              <a:spcBef>
+                <a:spcPts val="0"/>
+              </a:spcBef>
+              <a:spcAft>
+                <a:spcPts val="0"/>
+              </a:spcAft>
+              <a:buClrTx/>
+              <a:buSzTx/>
+              <a:buFontTx/>
+              <a:buNone/>
+              <a:tabLst/>
+              <a:defRPr/>
+            </a:pPr>
+            <a:endParaRPr lang="en-US" dirty="0"/>
+          </a:p>
+          <a:p>
+            <a:pPr marL="0" marR="0" lvl="0" indent="0" algn="l" defTabSz="914400" rtl="0" eaLnBrk="1" fontAlgn="auto" latinLnBrk="0" hangingPunct="1">
+              <a:lnSpc>
+                <a:spcPct val="100000"/>
+              </a:lnSpc>
+              <a:spcBef>
+                <a:spcPts val="0"/>
+              </a:spcBef>
+              <a:spcAft>
+                <a:spcPts val="0"/>
+              </a:spcAft>
+              <a:buClrTx/>
+              <a:buSzTx/>
+              <a:buFontTx/>
+              <a:buNone/>
+              <a:tabLst/>
+              <a:defRPr/>
+            </a:pPr>
+            <a:r>
+              <a:rPr lang="en-US" dirty="0"/>
+              <a:t>PDAC begins in the epithelial cells lining the pancreatic ducts, which are normally responsible for regulating secretion of digestive enzymes into the small intestine. In PDAC, these cells acquire mutations that cause them to proliferate uncontrollably and eventually rupture the ductal membrane. After spreading into the stroma, cancer-associated fibroblasts develop dense networks of collogen fibers, known as desmoplasia, around the previous pancreatic ducts. This creates almost like a shield around the tumor, protecting it from immune attack and drug penetration. </a:t>
+            </a:r>
+          </a:p>
+          <a:p>
+            <a:pPr marL="0" marR="0" lvl="0" indent="0" algn="l" defTabSz="914400" rtl="0" eaLnBrk="1" fontAlgn="auto" latinLnBrk="0" hangingPunct="1">
+              <a:lnSpc>
+                <a:spcPct val="100000"/>
+              </a:lnSpc>
+              <a:spcBef>
+                <a:spcPts val="0"/>
+              </a:spcBef>
+              <a:spcAft>
+                <a:spcPts val="0"/>
+              </a:spcAft>
+              <a:buClrTx/>
+              <a:buSzTx/>
+              <a:buFontTx/>
+              <a:buNone/>
+              <a:tabLst/>
+              <a:defRPr/>
+            </a:pPr>
+            <a:endParaRPr lang="en-US" dirty="0"/>
+          </a:p>
+          <a:p>
+            <a:pPr marL="0" marR="0" lvl="0" indent="0" algn="l" defTabSz="914400" rtl="0" eaLnBrk="1" fontAlgn="auto" latinLnBrk="0" hangingPunct="1">
+              <a:lnSpc>
+                <a:spcPct val="100000"/>
+              </a:lnSpc>
+              <a:spcBef>
+                <a:spcPts val="0"/>
+              </a:spcBef>
+              <a:spcAft>
+                <a:spcPts val="0"/>
+              </a:spcAft>
+              <a:buClrTx/>
+              <a:buSzTx/>
+              <a:buFontTx/>
+              <a:buNone/>
+              <a:tabLst/>
+              <a:defRPr/>
+            </a:pPr>
+            <a:r>
+              <a:rPr lang="en-US" dirty="0"/>
+              <a:t>Pancreatic ductal adenocarcinoma is the most common subtype of pancreatic cancer, with a 5 year survival rate of only 13%. The low survival rate is thought to be due to multiple challenges to treatment such as the difficulty of detecting PDAC before it has metastasized. (add graphic) A hallmark of PDAC is what’s called a “desmoplastic” tumor microenvironment. Compared to healthy tissue on the left, PDAC on the right has masses of cell growth in places that used to be healthy ducts, and is infiltrated by a greater diversity of immune and stromal cells while being crisscrossed and encapsulated in this network of collagen fibers, which are deposited by cancer-associated fibroblasts. </a:t>
+            </a:r>
+            <a:r>
+              <a:rPr lang="en-US" sz="1200" dirty="0"/>
+              <a:t>The dense fibrotic network of collagen is referred to as desmoplasia and is seen in certain types of tumors.</a:t>
+            </a:r>
+            <a:endParaRPr lang="en-US" dirty="0"/>
+          </a:p>
+          <a:p>
+            <a:pPr marL="0" marR="0" lvl="0" indent="0" algn="l" defTabSz="914400" rtl="0" eaLnBrk="1" fontAlgn="auto" latinLnBrk="0" hangingPunct="1">
+              <a:lnSpc>
+                <a:spcPct val="100000"/>
+              </a:lnSpc>
+              <a:spcBef>
+                <a:spcPts val="0"/>
+              </a:spcBef>
+              <a:spcAft>
+                <a:spcPts val="0"/>
+              </a:spcAft>
+              <a:buClrTx/>
+              <a:buSzTx/>
+              <a:buFontTx/>
+              <a:buNone/>
+              <a:tabLst/>
+              <a:defRPr/>
+            </a:pPr>
+            <a:endParaRPr lang="en-US" dirty="0"/>
+          </a:p>
+          <a:p>
+            <a:pPr marL="0" marR="0" lvl="0" indent="0" algn="l" defTabSz="914400" rtl="0" eaLnBrk="1" fontAlgn="auto" latinLnBrk="0" hangingPunct="1">
+              <a:lnSpc>
+                <a:spcPct val="100000"/>
+              </a:lnSpc>
+              <a:spcBef>
+                <a:spcPts val="0"/>
+              </a:spcBef>
+              <a:spcAft>
+                <a:spcPts val="0"/>
+              </a:spcAft>
+              <a:buClrTx/>
+              <a:buSzTx/>
+              <a:buFontTx/>
+              <a:buNone/>
+              <a:tabLst/>
+              <a:defRPr/>
+            </a:pPr>
+            <a:r>
+              <a:rPr lang="en-US" dirty="0"/>
+              <a:t>Those immune cells that are found in this microenvironment are often suppressive such as T regulatory cells and suppressive macrophages. Some of the immune cells are “residents” that were probably there in the healthy tissue, but others are recruited from the periphery (</a:t>
+            </a:r>
+            <a:r>
+              <a:rPr lang="en-US" dirty="0" err="1"/>
+              <a:t>BM+blood</a:t>
+            </a:r>
+            <a:r>
+              <a:rPr lang="en-US" dirty="0"/>
+              <a:t>)</a:t>
+            </a:r>
+          </a:p>
+          <a:p>
+            <a:endParaRPr lang="en-US" dirty="0"/>
+          </a:p>
+        </p:txBody>
+      </p:sp>
+      <p:sp>
+        <p:nvSpPr>
+          <p:cNvPr id="4" name="Slide Number Placeholder 3">
+            <a:extLst>
+              <a:ext uri="{FF2B5EF4-FFF2-40B4-BE49-F238E27FC236}">
+                <a16:creationId xmlns:a16="http://schemas.microsoft.com/office/drawing/2014/main" id="{5BC16D41-3CD0-2053-0DDC-56987738770A}"/>
+              </a:ext>
+            </a:extLst>
+          </p:cNvPr>
+          <p:cNvSpPr>
+            <a:spLocks noGrp="1"/>
+          </p:cNvSpPr>
+          <p:nvPr>
+            <p:ph type="sldNum" sz="quarter" idx="5"/>
+          </p:nvPr>
+        </p:nvSpPr>
+        <p:spPr/>
+        <p:txBody>
+          <a:bodyPr/>
+          <a:lstStyle/>
+          <a:p>
+            <a:fld id="{B314B106-72D9-394B-AE7F-13630EA62899}" type="slidenum">
+              <a:rPr lang="en-US" smtClean="0"/>
+              <a:t>7</a:t>
+            </a:fld>
+            <a:endParaRPr lang="en-US"/>
+          </a:p>
+        </p:txBody>
+      </p:sp>
+    </p:spTree>
+    <p:extLst>
+      <p:ext uri="{BB962C8B-B14F-4D97-AF65-F5344CB8AC3E}">
+        <p14:creationId xmlns:p14="http://schemas.microsoft.com/office/powerpoint/2010/main" val="926004251"/>
+      </p:ext>
+    </p:extLst>
+  </p:cSld>
+  <p:clrMapOvr>
+    <a:masterClrMapping/>
+  </p:clrMapOvr>
+</p:notes>
+</file>
+
 <file path=ppt/slideLayouts/slideLayout1.xml><?xml version="1.0" encoding="utf-8"?>
 <p:sldLayout xmlns:a="http://schemas.openxmlformats.org/drawingml/2006/main" xmlns:r="http://schemas.openxmlformats.org/officeDocument/2006/relationships" xmlns:p="http://schemas.openxmlformats.org/presentationml/2006/main" type="title" preserve="1">
   <p:cSld name="Title Slide">
@@ -951,7 +2613,7 @@
             <a:fld id="{2B799761-2EBC-ED48-8421-93C3DA969FB7}" type="datetimeFigureOut">
               <a:rPr lang="en-US" smtClean="0"/>
               <a:pPr/>
-              <a:t>8/12/2025</a:t>
+              <a:t>8/20/2025</a:t>
             </a:fld>
             <a:endParaRPr lang="en-US"/>
           </a:p>
@@ -1182,7 +2844,7 @@
             <a:fld id="{60F76AEE-5F7C-0C4E-AB7D-BADB32FF08A3}" type="datetimeFigureOut">
               <a:rPr lang="en-US" smtClean="0"/>
               <a:pPr/>
-              <a:t>8/12/2025</a:t>
+              <a:t>8/20/2025</a:t>
             </a:fld>
             <a:endParaRPr lang="en-US"/>
           </a:p>
@@ -2331,12 +3993,18 @@
 </p:sld>
 </file>
 
-<file path=ppt/slides/slide10.xml><?xml version="1.0" encoding="utf-8"?>
+<file path=ppt/slides/slide2.xml><?xml version="1.0" encoding="utf-8"?>
 <p:sld xmlns:a="http://schemas.openxmlformats.org/drawingml/2006/main" xmlns:r="http://schemas.openxmlformats.org/officeDocument/2006/relationships" xmlns:p="http://schemas.openxmlformats.org/presentationml/2006/main">
   <p:cSld>
     <p:spTree>
       <p:nvGrpSpPr>
-        <p:cNvPr id="1" name=""/>
+        <p:cNvPr id="1" name="">
+          <a:extLst>
+            <a:ext uri="{FF2B5EF4-FFF2-40B4-BE49-F238E27FC236}">
+              <a16:creationId xmlns:a16="http://schemas.microsoft.com/office/drawing/2014/main" id="{228476CE-4A05-3F29-B27A-1F11ECFE935C}"/>
+            </a:ext>
+          </a:extLst>
+        </p:cNvPr>
         <p:cNvGrpSpPr/>
         <p:nvPr/>
       </p:nvGrpSpPr>
@@ -2348,21 +4016,98 @@
           <a:chExt cx="0" cy="0"/>
         </a:xfrm>
       </p:grpSpPr>
+      <p:sp>
+        <p:nvSpPr>
+          <p:cNvPr id="10" name="Title 9">
+            <a:extLst>
+              <a:ext uri="{FF2B5EF4-FFF2-40B4-BE49-F238E27FC236}">
+                <a16:creationId xmlns:a16="http://schemas.microsoft.com/office/drawing/2014/main" id="{0157906B-C597-E573-2E2B-896AA1FF365E}"/>
+              </a:ext>
+            </a:extLst>
+          </p:cNvPr>
+          <p:cNvSpPr>
+            <a:spLocks noGrp="1"/>
+          </p:cNvSpPr>
+          <p:nvPr>
+            <p:ph type="title"/>
+          </p:nvPr>
+        </p:nvSpPr>
+        <p:spPr>
+          <a:xfrm>
+            <a:off x="457200" y="234751"/>
+            <a:ext cx="7886700" cy="994172"/>
+          </a:xfrm>
+        </p:spPr>
+        <p:txBody>
+          <a:bodyPr>
+            <a:noAutofit/>
+          </a:bodyPr>
+          <a:lstStyle/>
+          <a:p>
+            <a:r>
+              <a:rPr lang="en-US" sz="3200" b="1" dirty="0">
+                <a:solidFill>
+                  <a:srgbClr val="171C8C"/>
+                </a:solidFill>
+                <a:latin typeface="Arial" panose="020B0604020202020204" pitchFamily="34" charset="0"/>
+                <a:cs typeface="Arial" panose="020B0604020202020204" pitchFamily="34" charset="0"/>
+              </a:rPr>
+              <a:t>Updated Gradients: BM-to-Cell Force</a:t>
+            </a:r>
+          </a:p>
+        </p:txBody>
+      </p:sp>
+      <p:cxnSp>
+        <p:nvCxnSpPr>
+          <p:cNvPr id="5" name="Straight Connector 4">
+            <a:extLst>
+              <a:ext uri="{FF2B5EF4-FFF2-40B4-BE49-F238E27FC236}">
+                <a16:creationId xmlns:a16="http://schemas.microsoft.com/office/drawing/2014/main" id="{448FF531-164A-F5D3-7B43-2BA968303F43}"/>
+              </a:ext>
+            </a:extLst>
+          </p:cNvPr>
+          <p:cNvCxnSpPr/>
+          <p:nvPr/>
+        </p:nvCxnSpPr>
+        <p:spPr>
+          <a:xfrm>
+            <a:off x="191528" y="1224990"/>
+            <a:ext cx="8760941" cy="0"/>
+          </a:xfrm>
+          <a:prstGeom prst="line">
+            <a:avLst/>
+          </a:prstGeom>
+          <a:ln w="38100"/>
+        </p:spPr>
+        <p:style>
+          <a:lnRef idx="1">
+            <a:schemeClr val="accent1"/>
+          </a:lnRef>
+          <a:fillRef idx="0">
+            <a:schemeClr val="accent1"/>
+          </a:fillRef>
+          <a:effectRef idx="0">
+            <a:schemeClr val="accent1"/>
+          </a:effectRef>
+          <a:fontRef idx="minor">
+            <a:schemeClr val="tx1"/>
+          </a:fontRef>
+        </p:style>
+      </p:cxnSp>
       <p:pic>
         <p:nvPicPr>
-          <p:cNvPr id="4" name="EP_Force">
+          <p:cNvPr id="2" name="Cell_Force_Demo">
             <a:hlinkClick r:id="" action="ppaction://media"/>
             <a:extLst>
               <a:ext uri="{FF2B5EF4-FFF2-40B4-BE49-F238E27FC236}">
-                <a16:creationId xmlns:a16="http://schemas.microsoft.com/office/drawing/2014/main" id="{67BAAA5C-401D-9BFB-E2A2-03F2EB1F6857}"/>
+                <a16:creationId xmlns:a16="http://schemas.microsoft.com/office/drawing/2014/main" id="{E0E505D2-3715-3A7A-E0F8-58DCE4FF1F54}"/>
               </a:ext>
             </a:extLst>
           </p:cNvPr>
           <p:cNvPicPr>
-            <a:picLocks noGrp="1" noChangeAspect="1"/>
+            <a:picLocks noChangeAspect="1"/>
           </p:cNvPicPr>
           <p:nvPr>
-            <p:ph idx="1"/>
             <a:videoFile r:link="rId2"/>
             <p:extLst>
               <p:ext uri="{DAA4B4D4-6D71-4841-9C94-3DE7FCFB9230}">
@@ -2372,427 +4117,26 @@
           </p:nvPr>
         </p:nvPicPr>
         <p:blipFill>
-          <a:blip r:embed="rId4"/>
-          <a:srcRect l="20952" t="11140" r="28190" b="19948"/>
+          <a:blip r:embed="rId5"/>
+          <a:srcRect l="19136" t="10765" r="28465" b="21021"/>
           <a:stretch>
             <a:fillRect/>
           </a:stretch>
         </p:blipFill>
         <p:spPr>
           <a:xfrm>
-            <a:off x="1841326" y="338201"/>
-            <a:ext cx="5461348" cy="5550511"/>
+            <a:off x="3419061" y="1510748"/>
+            <a:ext cx="4791286" cy="4678018"/>
           </a:xfrm>
+          <a:prstGeom prst="rect">
+            <a:avLst/>
+          </a:prstGeom>
         </p:spPr>
       </p:pic>
     </p:spTree>
     <p:extLst>
       <p:ext uri="{BB962C8B-B14F-4D97-AF65-F5344CB8AC3E}">
-        <p14:creationId xmlns:p14="http://schemas.microsoft.com/office/powerpoint/2010/main" val="2090505577"/>
-      </p:ext>
-    </p:extLst>
-  </p:cSld>
-  <p:clrMapOvr>
-    <a:masterClrMapping/>
-  </p:clrMapOvr>
-  <p:timing>
-    <p:tnLst>
-      <p:par>
-        <p:cTn id="1" dur="indefinite" restart="never" nodeType="tmRoot">
-          <p:childTnLst>
-            <p:seq concurrent="1" nextAc="seek">
-              <p:cTn id="2" dur="indefinite" nodeType="mainSeq">
-                <p:childTnLst>
-                  <p:par>
-                    <p:cTn id="3" fill="hold">
-                      <p:stCondLst>
-                        <p:cond delay="indefinite"/>
-                      </p:stCondLst>
-                      <p:childTnLst>
-                        <p:par>
-                          <p:cTn id="4" fill="hold">
-                            <p:stCondLst>
-                              <p:cond delay="0"/>
-                            </p:stCondLst>
-                            <p:childTnLst>
-                              <p:par>
-                                <p:cTn id="5" presetID="1" presetClass="mediacall" presetSubtype="0" fill="hold" nodeType="clickEffect">
-                                  <p:stCondLst>
-                                    <p:cond delay="0"/>
-                                  </p:stCondLst>
-                                  <p:childTnLst>
-                                    <p:cmd type="call" cmd="playFrom(0.0)">
-                                      <p:cBhvr>
-                                        <p:cTn id="6" dur="1900" fill="hold"/>
-                                        <p:tgtEl>
-                                          <p:spTgt spid="4"/>
-                                        </p:tgtEl>
-                                      </p:cBhvr>
-                                    </p:cmd>
-                                  </p:childTnLst>
-                                </p:cTn>
-                              </p:par>
-                            </p:childTnLst>
-                          </p:cTn>
-                        </p:par>
-                      </p:childTnLst>
-                    </p:cTn>
-                  </p:par>
-                </p:childTnLst>
-              </p:cTn>
-              <p:prevCondLst>
-                <p:cond evt="onPrev" delay="0">
-                  <p:tgtEl>
-                    <p:sldTgt/>
-                  </p:tgtEl>
-                </p:cond>
-              </p:prevCondLst>
-              <p:nextCondLst>
-                <p:cond evt="onNext" delay="0">
-                  <p:tgtEl>
-                    <p:sldTgt/>
-                  </p:tgtEl>
-                </p:cond>
-              </p:nextCondLst>
-            </p:seq>
-            <p:video>
-              <p:cMediaNode vol="80000">
-                <p:cTn id="7" repeatCount="indefinite" fill="hold" display="0">
-                  <p:stCondLst>
-                    <p:cond delay="indefinite"/>
-                  </p:stCondLst>
-                </p:cTn>
-                <p:tgtEl>
-                  <p:spTgt spid="4"/>
-                </p:tgtEl>
-              </p:cMediaNode>
-            </p:video>
-            <p:seq concurrent="1" nextAc="seek">
-              <p:cTn id="8" restart="whenNotActive" fill="hold" evtFilter="cancelBubble" nodeType="interactiveSeq">
-                <p:stCondLst>
-                  <p:cond evt="onClick" delay="0">
-                    <p:tgtEl>
-                      <p:spTgt spid="4"/>
-                    </p:tgtEl>
-                  </p:cond>
-                </p:stCondLst>
-                <p:endSync evt="end" delay="0">
-                  <p:rtn val="all"/>
-                </p:endSync>
-                <p:childTnLst>
-                  <p:par>
-                    <p:cTn id="9" fill="hold">
-                      <p:stCondLst>
-                        <p:cond delay="0"/>
-                      </p:stCondLst>
-                      <p:childTnLst>
-                        <p:par>
-                          <p:cTn id="10" fill="hold">
-                            <p:stCondLst>
-                              <p:cond delay="0"/>
-                            </p:stCondLst>
-                            <p:childTnLst>
-                              <p:par>
-                                <p:cTn id="11" presetID="2" presetClass="mediacall" presetSubtype="0" fill="hold" nodeType="clickEffect">
-                                  <p:stCondLst>
-                                    <p:cond delay="0"/>
-                                  </p:stCondLst>
-                                  <p:childTnLst>
-                                    <p:cmd type="call" cmd="togglePause">
-                                      <p:cBhvr>
-                                        <p:cTn id="12" dur="1" fill="hold"/>
-                                        <p:tgtEl>
-                                          <p:spTgt spid="4"/>
-                                        </p:tgtEl>
-                                      </p:cBhvr>
-                                    </p:cmd>
-                                  </p:childTnLst>
-                                </p:cTn>
-                              </p:par>
-                            </p:childTnLst>
-                          </p:cTn>
-                        </p:par>
-                      </p:childTnLst>
-                    </p:cTn>
-                  </p:par>
-                </p:childTnLst>
-              </p:cTn>
-              <p:nextCondLst>
-                <p:cond evt="onClick" delay="0">
-                  <p:tgtEl>
-                    <p:spTgt spid="4"/>
-                  </p:tgtEl>
-                </p:cond>
-              </p:nextCondLst>
-            </p:seq>
-          </p:childTnLst>
-        </p:cTn>
-      </p:par>
-    </p:tnLst>
-  </p:timing>
-</p:sld>
-</file>
-
-<file path=ppt/slides/slide11.xml><?xml version="1.0" encoding="utf-8"?>
-<p:sld xmlns:a="http://schemas.openxmlformats.org/drawingml/2006/main" xmlns:r="http://schemas.openxmlformats.org/officeDocument/2006/relationships" xmlns:p="http://schemas.openxmlformats.org/presentationml/2006/main">
-  <p:cSld>
-    <p:spTree>
-      <p:nvGrpSpPr>
-        <p:cNvPr id="1" name=""/>
-        <p:cNvGrpSpPr/>
-        <p:nvPr/>
-      </p:nvGrpSpPr>
-      <p:grpSpPr>
-        <a:xfrm>
-          <a:off x="0" y="0"/>
-          <a:ext cx="0" cy="0"/>
-          <a:chOff x="0" y="0"/>
-          <a:chExt cx="0" cy="0"/>
-        </a:xfrm>
-      </p:grpSpPr>
-      <p:pic>
-        <p:nvPicPr>
-          <p:cNvPr id="4" name="No_Force">
-            <a:hlinkClick r:id="" action="ppaction://media"/>
-            <a:extLst>
-              <a:ext uri="{FF2B5EF4-FFF2-40B4-BE49-F238E27FC236}">
-                <a16:creationId xmlns:a16="http://schemas.microsoft.com/office/drawing/2014/main" id="{A9AE7BDB-95D9-0993-10B8-32E5AC4C3CE9}"/>
-              </a:ext>
-            </a:extLst>
-          </p:cNvPr>
-          <p:cNvPicPr>
-            <a:picLocks noGrp="1" noChangeAspect="1"/>
-          </p:cNvPicPr>
-          <p:nvPr>
-            <p:ph idx="1"/>
-            <a:videoFile r:link="rId2"/>
-            <p:extLst>
-              <p:ext uri="{DAA4B4D4-6D71-4841-9C94-3DE7FCFB9230}">
-                <p14:media xmlns:p14="http://schemas.microsoft.com/office/powerpoint/2010/main" r:embed="rId1"/>
-              </p:ext>
-            </p:extLst>
-          </p:nvPr>
-        </p:nvPicPr>
-        <p:blipFill>
-          <a:blip r:embed="rId4"/>
-          <a:srcRect l="22196" t="10863" r="28813" b="19671"/>
-          <a:stretch>
-            <a:fillRect/>
-          </a:stretch>
-        </p:blipFill>
-        <p:spPr>
-          <a:xfrm>
-            <a:off x="1842172" y="284968"/>
-            <a:ext cx="5459655" cy="5683346"/>
-          </a:xfrm>
-        </p:spPr>
-      </p:pic>
-    </p:spTree>
-    <p:extLst>
-      <p:ext uri="{BB962C8B-B14F-4D97-AF65-F5344CB8AC3E}">
-        <p14:creationId xmlns:p14="http://schemas.microsoft.com/office/powerpoint/2010/main" val="1592292160"/>
-      </p:ext>
-    </p:extLst>
-  </p:cSld>
-  <p:clrMapOvr>
-    <a:masterClrMapping/>
-  </p:clrMapOvr>
-  <p:timing>
-    <p:tnLst>
-      <p:par>
-        <p:cTn id="1" dur="indefinite" restart="never" nodeType="tmRoot">
-          <p:childTnLst>
-            <p:seq concurrent="1" nextAc="seek">
-              <p:cTn id="2" dur="indefinite" nodeType="mainSeq">
-                <p:childTnLst>
-                  <p:par>
-                    <p:cTn id="3" fill="hold">
-                      <p:stCondLst>
-                        <p:cond delay="indefinite"/>
-                      </p:stCondLst>
-                      <p:childTnLst>
-                        <p:par>
-                          <p:cTn id="4" fill="hold">
-                            <p:stCondLst>
-                              <p:cond delay="0"/>
-                            </p:stCondLst>
-                            <p:childTnLst>
-                              <p:par>
-                                <p:cTn id="5" presetID="1" presetClass="mediacall" presetSubtype="0" fill="hold" nodeType="clickEffect">
-                                  <p:stCondLst>
-                                    <p:cond delay="0"/>
-                                  </p:stCondLst>
-                                  <p:childTnLst>
-                                    <p:cmd type="call" cmd="playFrom(0.0)">
-                                      <p:cBhvr>
-                                        <p:cTn id="6" dur="1900" fill="hold"/>
-                                        <p:tgtEl>
-                                          <p:spTgt spid="4"/>
-                                        </p:tgtEl>
-                                      </p:cBhvr>
-                                    </p:cmd>
-                                  </p:childTnLst>
-                                </p:cTn>
-                              </p:par>
-                            </p:childTnLst>
-                          </p:cTn>
-                        </p:par>
-                      </p:childTnLst>
-                    </p:cTn>
-                  </p:par>
-                </p:childTnLst>
-              </p:cTn>
-              <p:prevCondLst>
-                <p:cond evt="onPrev" delay="0">
-                  <p:tgtEl>
-                    <p:sldTgt/>
-                  </p:tgtEl>
-                </p:cond>
-              </p:prevCondLst>
-              <p:nextCondLst>
-                <p:cond evt="onNext" delay="0">
-                  <p:tgtEl>
-                    <p:sldTgt/>
-                  </p:tgtEl>
-                </p:cond>
-              </p:nextCondLst>
-            </p:seq>
-            <p:video>
-              <p:cMediaNode vol="80000">
-                <p:cTn id="7" repeatCount="indefinite" fill="hold" display="0">
-                  <p:stCondLst>
-                    <p:cond delay="indefinite"/>
-                  </p:stCondLst>
-                </p:cTn>
-                <p:tgtEl>
-                  <p:spTgt spid="4"/>
-                </p:tgtEl>
-              </p:cMediaNode>
-            </p:video>
-            <p:seq concurrent="1" nextAc="seek">
-              <p:cTn id="8" restart="whenNotActive" fill="hold" evtFilter="cancelBubble" nodeType="interactiveSeq">
-                <p:stCondLst>
-                  <p:cond evt="onClick" delay="0">
-                    <p:tgtEl>
-                      <p:spTgt spid="4"/>
-                    </p:tgtEl>
-                  </p:cond>
-                </p:stCondLst>
-                <p:endSync evt="end" delay="0">
-                  <p:rtn val="all"/>
-                </p:endSync>
-                <p:childTnLst>
-                  <p:par>
-                    <p:cTn id="9" fill="hold">
-                      <p:stCondLst>
-                        <p:cond delay="0"/>
-                      </p:stCondLst>
-                      <p:childTnLst>
-                        <p:par>
-                          <p:cTn id="10" fill="hold">
-                            <p:stCondLst>
-                              <p:cond delay="0"/>
-                            </p:stCondLst>
-                            <p:childTnLst>
-                              <p:par>
-                                <p:cTn id="11" presetID="2" presetClass="mediacall" presetSubtype="0" fill="hold" nodeType="clickEffect">
-                                  <p:stCondLst>
-                                    <p:cond delay="0"/>
-                                  </p:stCondLst>
-                                  <p:childTnLst>
-                                    <p:cmd type="call" cmd="togglePause">
-                                      <p:cBhvr>
-                                        <p:cTn id="12" dur="1" fill="hold"/>
-                                        <p:tgtEl>
-                                          <p:spTgt spid="4"/>
-                                        </p:tgtEl>
-                                      </p:cBhvr>
-                                    </p:cmd>
-                                  </p:childTnLst>
-                                </p:cTn>
-                              </p:par>
-                            </p:childTnLst>
-                          </p:cTn>
-                        </p:par>
-                      </p:childTnLst>
-                    </p:cTn>
-                  </p:par>
-                </p:childTnLst>
-              </p:cTn>
-              <p:nextCondLst>
-                <p:cond evt="onClick" delay="0">
-                  <p:tgtEl>
-                    <p:spTgt spid="4"/>
-                  </p:tgtEl>
-                </p:cond>
-              </p:nextCondLst>
-            </p:seq>
-          </p:childTnLst>
-        </p:cTn>
-      </p:par>
-    </p:tnLst>
-  </p:timing>
-</p:sld>
-</file>
-
-<file path=ppt/slides/slide2.xml><?xml version="1.0" encoding="utf-8"?>
-<p:sld xmlns:a="http://schemas.openxmlformats.org/drawingml/2006/main" xmlns:r="http://schemas.openxmlformats.org/officeDocument/2006/relationships" xmlns:p="http://schemas.openxmlformats.org/presentationml/2006/main">
-  <p:cSld>
-    <p:spTree>
-      <p:nvGrpSpPr>
-        <p:cNvPr id="1" name=""/>
-        <p:cNvGrpSpPr/>
-        <p:nvPr/>
-      </p:nvGrpSpPr>
-      <p:grpSpPr>
-        <a:xfrm>
-          <a:off x="0" y="0"/>
-          <a:ext cx="0" cy="0"/>
-          <a:chOff x="0" y="0"/>
-          <a:chExt cx="0" cy="0"/>
-        </a:xfrm>
-      </p:grpSpPr>
-      <p:pic>
-        <p:nvPicPr>
-          <p:cNvPr id="4" name="200_Kern">
-            <a:hlinkClick r:id="" action="ppaction://media"/>
-            <a:extLst>
-              <a:ext uri="{FF2B5EF4-FFF2-40B4-BE49-F238E27FC236}">
-                <a16:creationId xmlns:a16="http://schemas.microsoft.com/office/drawing/2014/main" id="{4FDCB195-752C-941D-4896-AFEB12B5A79E}"/>
-              </a:ext>
-            </a:extLst>
-          </p:cNvPr>
-          <p:cNvPicPr>
-            <a:picLocks noGrp="1" noChangeAspect="1"/>
-          </p:cNvPicPr>
-          <p:nvPr>
-            <p:ph idx="1"/>
-            <a:videoFile r:link="rId2"/>
-            <p:extLst>
-              <p:ext uri="{DAA4B4D4-6D71-4841-9C94-3DE7FCFB9230}">
-                <p14:media xmlns:p14="http://schemas.microsoft.com/office/powerpoint/2010/main" r:embed="rId1"/>
-              </p:ext>
-            </p:extLst>
-          </p:nvPr>
-        </p:nvPicPr>
-        <p:blipFill>
-          <a:blip r:embed="rId4"/>
-          <a:srcRect l="19706" t="10863" r="27775" b="19671"/>
-          <a:stretch>
-            <a:fillRect/>
-          </a:stretch>
-        </p:blipFill>
-        <p:spPr>
-          <a:xfrm>
-            <a:off x="1703539" y="284799"/>
-            <a:ext cx="5736921" cy="5691568"/>
-          </a:xfrm>
-        </p:spPr>
-      </p:pic>
-    </p:spTree>
-    <p:extLst>
-      <p:ext uri="{BB962C8B-B14F-4D97-AF65-F5344CB8AC3E}">
-        <p14:creationId xmlns:p14="http://schemas.microsoft.com/office/powerpoint/2010/main" val="3352540534"/>
+        <p14:creationId xmlns:p14="http://schemas.microsoft.com/office/powerpoint/2010/main" val="776799174"/>
       </p:ext>
     </p:extLst>
   </p:cSld>
@@ -2829,7 +4173,7 @@
                                       <p:cBhvr>
                                         <p:cTn id="6" dur="3700" fill="hold"/>
                                         <p:tgtEl>
-                                          <p:spTgt spid="4"/>
+                                          <p:spTgt spid="2"/>
                                         </p:tgtEl>
                                       </p:cBhvr>
                                     </p:cmd>
@@ -2861,13 +4205,13 @@
             </p:seq>
             <p:video>
               <p:cMediaNode vol="80000">
-                <p:cTn id="7" repeatCount="indefinite" fill="hold" display="0">
+                <p:cTn id="7" fill="hold" display="0">
                   <p:stCondLst>
                     <p:cond delay="indefinite"/>
                   </p:stCondLst>
                 </p:cTn>
                 <p:tgtEl>
-                  <p:spTgt spid="4"/>
+                  <p:spTgt spid="2"/>
                 </p:tgtEl>
               </p:cMediaNode>
             </p:video>
@@ -2876,7 +4220,7 @@
                 <p:stCondLst>
                   <p:cond evt="onClick" delay="0">
                     <p:tgtEl>
-                      <p:spTgt spid="4"/>
+                      <p:spTgt spid="2"/>
                     </p:tgtEl>
                   </p:cond>
                 </p:stCondLst>
@@ -2906,7 +4250,7 @@
                                       <p:cBhvr>
                                         <p:cTn id="12" dur="1" fill="hold"/>
                                         <p:tgtEl>
-                                          <p:spTgt spid="4"/>
+                                          <p:spTgt spid="2"/>
                                         </p:tgtEl>
                                       </p:cBhvr>
                                     </p:cmd>
@@ -2924,7 +4268,7 @@
               <p:nextCondLst>
                 <p:cond evt="onClick" delay="0">
                   <p:tgtEl>
-                    <p:spTgt spid="4"/>
+                    <p:spTgt spid="2"/>
                   </p:tgtEl>
                 </p:cond>
               </p:nextCondLst>
@@ -2942,7 +4286,13 @@
   <p:cSld>
     <p:spTree>
       <p:nvGrpSpPr>
-        <p:cNvPr id="1" name=""/>
+        <p:cNvPr id="1" name="">
+          <a:extLst>
+            <a:ext uri="{FF2B5EF4-FFF2-40B4-BE49-F238E27FC236}">
+              <a16:creationId xmlns:a16="http://schemas.microsoft.com/office/drawing/2014/main" id="{9CACB396-58E0-7624-BA5F-AEB96F688381}"/>
+            </a:ext>
+          </a:extLst>
+        </p:cNvPr>
         <p:cNvGrpSpPr/>
         <p:nvPr/>
       </p:nvGrpSpPr>
@@ -2954,21 +4304,98 @@
           <a:chExt cx="0" cy="0"/>
         </a:xfrm>
       </p:grpSpPr>
+      <p:sp>
+        <p:nvSpPr>
+          <p:cNvPr id="10" name="Title 9">
+            <a:extLst>
+              <a:ext uri="{FF2B5EF4-FFF2-40B4-BE49-F238E27FC236}">
+                <a16:creationId xmlns:a16="http://schemas.microsoft.com/office/drawing/2014/main" id="{58092917-9ECC-841C-C5C9-F2F117BA30D4}"/>
+              </a:ext>
+            </a:extLst>
+          </p:cNvPr>
+          <p:cNvSpPr>
+            <a:spLocks noGrp="1"/>
+          </p:cNvSpPr>
+          <p:nvPr>
+            <p:ph type="title"/>
+          </p:nvPr>
+        </p:nvSpPr>
+        <p:spPr>
+          <a:xfrm>
+            <a:off x="457200" y="234751"/>
+            <a:ext cx="7886700" cy="994172"/>
+          </a:xfrm>
+        </p:spPr>
+        <p:txBody>
+          <a:bodyPr>
+            <a:noAutofit/>
+          </a:bodyPr>
+          <a:lstStyle/>
+          <a:p>
+            <a:r>
+              <a:rPr lang="en-US" sz="3200" b="1" dirty="0">
+                <a:solidFill>
+                  <a:srgbClr val="171C8C"/>
+                </a:solidFill>
+                <a:latin typeface="Arial" panose="020B0604020202020204" pitchFamily="34" charset="0"/>
+                <a:cs typeface="Arial" panose="020B0604020202020204" pitchFamily="34" charset="0"/>
+              </a:rPr>
+              <a:t>Updated Gradients: Cell-to-BM Force</a:t>
+            </a:r>
+          </a:p>
+        </p:txBody>
+      </p:sp>
+      <p:cxnSp>
+        <p:nvCxnSpPr>
+          <p:cNvPr id="5" name="Straight Connector 4">
+            <a:extLst>
+              <a:ext uri="{FF2B5EF4-FFF2-40B4-BE49-F238E27FC236}">
+                <a16:creationId xmlns:a16="http://schemas.microsoft.com/office/drawing/2014/main" id="{F119AE36-74A6-40F7-4470-D6D4E080E84B}"/>
+              </a:ext>
+            </a:extLst>
+          </p:cNvPr>
+          <p:cNvCxnSpPr/>
+          <p:nvPr/>
+        </p:nvCxnSpPr>
+        <p:spPr>
+          <a:xfrm>
+            <a:off x="191528" y="1224990"/>
+            <a:ext cx="8760941" cy="0"/>
+          </a:xfrm>
+          <a:prstGeom prst="line">
+            <a:avLst/>
+          </a:prstGeom>
+          <a:ln w="38100"/>
+        </p:spPr>
+        <p:style>
+          <a:lnRef idx="1">
+            <a:schemeClr val="accent1"/>
+          </a:lnRef>
+          <a:fillRef idx="0">
+            <a:schemeClr val="accent1"/>
+          </a:fillRef>
+          <a:effectRef idx="0">
+            <a:schemeClr val="accent1"/>
+          </a:effectRef>
+          <a:fontRef idx="minor">
+            <a:schemeClr val="tx1"/>
+          </a:fontRef>
+        </p:style>
+      </p:cxnSp>
       <p:pic>
         <p:nvPicPr>
-          <p:cNvPr id="4" name="500_Kern">
+          <p:cNvPr id="4" name="Deform_Demo">
             <a:hlinkClick r:id="" action="ppaction://media"/>
             <a:extLst>
               <a:ext uri="{FF2B5EF4-FFF2-40B4-BE49-F238E27FC236}">
-                <a16:creationId xmlns:a16="http://schemas.microsoft.com/office/drawing/2014/main" id="{746B597C-58A0-66DD-C794-57B6D47D8961}"/>
+                <a16:creationId xmlns:a16="http://schemas.microsoft.com/office/drawing/2014/main" id="{B4F02FB7-EDFB-6FC5-3695-2C92A6D18DFD}"/>
               </a:ext>
             </a:extLst>
           </p:cNvPr>
           <p:cNvPicPr>
-            <a:picLocks noGrp="1" noChangeAspect="1"/>
+            <a:picLocks noChangeAspect="1"/>
           </p:cNvPicPr>
           <p:nvPr>
-            <p:ph idx="1"/>
             <a:videoFile r:link="rId2"/>
             <p:extLst>
               <p:ext uri="{DAA4B4D4-6D71-4841-9C94-3DE7FCFB9230}">
@@ -2978,23 +4405,26 @@
           </p:nvPr>
         </p:nvPicPr>
         <p:blipFill>
-          <a:blip r:embed="rId4"/>
-          <a:srcRect l="20951" t="12247" r="28397" b="20501"/>
+          <a:blip r:embed="rId5"/>
+          <a:srcRect l="20660" t="10938" r="27456" b="19496"/>
           <a:stretch>
             <a:fillRect/>
           </a:stretch>
         </p:blipFill>
         <p:spPr>
           <a:xfrm>
-            <a:off x="1991638" y="658798"/>
-            <a:ext cx="5160723" cy="5139571"/>
+            <a:off x="3599621" y="1550506"/>
+            <a:ext cx="4744279" cy="4770771"/>
           </a:xfrm>
+          <a:prstGeom prst="rect">
+            <a:avLst/>
+          </a:prstGeom>
         </p:spPr>
       </p:pic>
     </p:spTree>
     <p:extLst>
       <p:ext uri="{BB962C8B-B14F-4D97-AF65-F5344CB8AC3E}">
-        <p14:creationId xmlns:p14="http://schemas.microsoft.com/office/powerpoint/2010/main" val="3696743366"/>
+        <p14:creationId xmlns:p14="http://schemas.microsoft.com/office/powerpoint/2010/main" val="942722353"/>
       </p:ext>
     </p:extLst>
   </p:cSld>
@@ -3029,1219 +4459,7 @@
                                   <p:childTnLst>
                                     <p:cmd type="call" cmd="playFrom(0.0)">
                                       <p:cBhvr>
-                                        <p:cTn id="6" dur="1900" fill="hold"/>
-                                        <p:tgtEl>
-                                          <p:spTgt spid="4"/>
-                                        </p:tgtEl>
-                                      </p:cBhvr>
-                                    </p:cmd>
-                                  </p:childTnLst>
-                                </p:cTn>
-                              </p:par>
-                            </p:childTnLst>
-                          </p:cTn>
-                        </p:par>
-                      </p:childTnLst>
-                    </p:cTn>
-                  </p:par>
-                </p:childTnLst>
-              </p:cTn>
-              <p:prevCondLst>
-                <p:cond evt="onPrev" delay="0">
-                  <p:tgtEl>
-                    <p:sldTgt/>
-                  </p:tgtEl>
-                </p:cond>
-              </p:prevCondLst>
-              <p:nextCondLst>
-                <p:cond evt="onNext" delay="0">
-                  <p:tgtEl>
-                    <p:sldTgt/>
-                  </p:tgtEl>
-                </p:cond>
-              </p:nextCondLst>
-            </p:seq>
-            <p:video>
-              <p:cMediaNode vol="80000">
-                <p:cTn id="7" repeatCount="indefinite" fill="hold" display="0">
-                  <p:stCondLst>
-                    <p:cond delay="indefinite"/>
-                  </p:stCondLst>
-                </p:cTn>
-                <p:tgtEl>
-                  <p:spTgt spid="4"/>
-                </p:tgtEl>
-              </p:cMediaNode>
-            </p:video>
-            <p:seq concurrent="1" nextAc="seek">
-              <p:cTn id="8" restart="whenNotActive" fill="hold" evtFilter="cancelBubble" nodeType="interactiveSeq">
-                <p:stCondLst>
-                  <p:cond evt="onClick" delay="0">
-                    <p:tgtEl>
-                      <p:spTgt spid="4"/>
-                    </p:tgtEl>
-                  </p:cond>
-                </p:stCondLst>
-                <p:endSync evt="end" delay="0">
-                  <p:rtn val="all"/>
-                </p:endSync>
-                <p:childTnLst>
-                  <p:par>
-                    <p:cTn id="9" fill="hold">
-                      <p:stCondLst>
-                        <p:cond delay="0"/>
-                      </p:stCondLst>
-                      <p:childTnLst>
-                        <p:par>
-                          <p:cTn id="10" fill="hold">
-                            <p:stCondLst>
-                              <p:cond delay="0"/>
-                            </p:stCondLst>
-                            <p:childTnLst>
-                              <p:par>
-                                <p:cTn id="11" presetID="2" presetClass="mediacall" presetSubtype="0" fill="hold" nodeType="clickEffect">
-                                  <p:stCondLst>
-                                    <p:cond delay="0"/>
-                                  </p:stCondLst>
-                                  <p:childTnLst>
-                                    <p:cmd type="call" cmd="togglePause">
-                                      <p:cBhvr>
-                                        <p:cTn id="12" dur="1" fill="hold"/>
-                                        <p:tgtEl>
-                                          <p:spTgt spid="4"/>
-                                        </p:tgtEl>
-                                      </p:cBhvr>
-                                    </p:cmd>
-                                  </p:childTnLst>
-                                </p:cTn>
-                              </p:par>
-                            </p:childTnLst>
-                          </p:cTn>
-                        </p:par>
-                      </p:childTnLst>
-                    </p:cTn>
-                  </p:par>
-                </p:childTnLst>
-              </p:cTn>
-              <p:nextCondLst>
-                <p:cond evt="onClick" delay="0">
-                  <p:tgtEl>
-                    <p:spTgt spid="4"/>
-                  </p:tgtEl>
-                </p:cond>
-              </p:nextCondLst>
-            </p:seq>
-          </p:childTnLst>
-        </p:cTn>
-      </p:par>
-    </p:tnLst>
-  </p:timing>
-</p:sld>
-</file>
-
-<file path=ppt/slides/slide4.xml><?xml version="1.0" encoding="utf-8"?>
-<p:sld xmlns:a="http://schemas.openxmlformats.org/drawingml/2006/main" xmlns:r="http://schemas.openxmlformats.org/officeDocument/2006/relationships" xmlns:p="http://schemas.openxmlformats.org/presentationml/2006/main">
-  <p:cSld>
-    <p:spTree>
-      <p:nvGrpSpPr>
-        <p:cNvPr id="1" name=""/>
-        <p:cNvGrpSpPr/>
-        <p:nvPr/>
-      </p:nvGrpSpPr>
-      <p:grpSpPr>
-        <a:xfrm>
-          <a:off x="0" y="0"/>
-          <a:ext cx="0" cy="0"/>
-          <a:chOff x="0" y="0"/>
-          <a:chExt cx="0" cy="0"/>
-        </a:xfrm>
-      </p:grpSpPr>
-      <p:pic>
-        <p:nvPicPr>
-          <p:cNvPr id="4" name="1_Spike">
-            <a:hlinkClick r:id="" action="ppaction://media"/>
-            <a:extLst>
-              <a:ext uri="{FF2B5EF4-FFF2-40B4-BE49-F238E27FC236}">
-                <a16:creationId xmlns:a16="http://schemas.microsoft.com/office/drawing/2014/main" id="{95319B1B-CC4E-165B-531A-B200076595A1}"/>
-              </a:ext>
-            </a:extLst>
-          </p:cNvPr>
-          <p:cNvPicPr>
-            <a:picLocks noGrp="1" noChangeAspect="1"/>
-          </p:cNvPicPr>
-          <p:nvPr>
-            <p:ph idx="1"/>
-            <a:videoFile r:link="rId2"/>
-            <p:extLst>
-              <p:ext uri="{DAA4B4D4-6D71-4841-9C94-3DE7FCFB9230}">
-                <p14:media xmlns:p14="http://schemas.microsoft.com/office/powerpoint/2010/main" r:embed="rId1"/>
-              </p:ext>
-            </p:extLst>
-          </p:nvPr>
-        </p:nvPicPr>
-        <p:blipFill>
-          <a:blip r:embed="rId4"/>
-          <a:srcRect l="18667" t="10862" r="28190" b="18841"/>
-          <a:stretch>
-            <a:fillRect/>
-          </a:stretch>
-        </p:blipFill>
-        <p:spPr>
-          <a:xfrm>
-            <a:off x="1741117" y="400833"/>
-            <a:ext cx="5661765" cy="5617532"/>
-          </a:xfrm>
-        </p:spPr>
-      </p:pic>
-    </p:spTree>
-    <p:extLst>
-      <p:ext uri="{BB962C8B-B14F-4D97-AF65-F5344CB8AC3E}">
-        <p14:creationId xmlns:p14="http://schemas.microsoft.com/office/powerpoint/2010/main" val="3738532048"/>
-      </p:ext>
-    </p:extLst>
-  </p:cSld>
-  <p:clrMapOvr>
-    <a:masterClrMapping/>
-  </p:clrMapOvr>
-  <p:timing>
-    <p:tnLst>
-      <p:par>
-        <p:cTn id="1" dur="indefinite" restart="never" nodeType="tmRoot">
-          <p:childTnLst>
-            <p:seq concurrent="1" nextAc="seek">
-              <p:cTn id="2" dur="indefinite" nodeType="mainSeq">
-                <p:childTnLst>
-                  <p:par>
-                    <p:cTn id="3" fill="hold">
-                      <p:stCondLst>
-                        <p:cond delay="indefinite"/>
-                      </p:stCondLst>
-                      <p:childTnLst>
-                        <p:par>
-                          <p:cTn id="4" fill="hold">
-                            <p:stCondLst>
-                              <p:cond delay="0"/>
-                            </p:stCondLst>
-                            <p:childTnLst>
-                              <p:par>
-                                <p:cTn id="5" presetID="1" presetClass="mediacall" presetSubtype="0" fill="hold" nodeType="clickEffect">
-                                  <p:stCondLst>
-                                    <p:cond delay="0"/>
-                                  </p:stCondLst>
-                                  <p:childTnLst>
-                                    <p:cmd type="call" cmd="playFrom(0.0)">
-                                      <p:cBhvr>
-                                        <p:cTn id="6" dur="1700" fill="hold"/>
-                                        <p:tgtEl>
-                                          <p:spTgt spid="4"/>
-                                        </p:tgtEl>
-                                      </p:cBhvr>
-                                    </p:cmd>
-                                  </p:childTnLst>
-                                </p:cTn>
-                              </p:par>
-                            </p:childTnLst>
-                          </p:cTn>
-                        </p:par>
-                      </p:childTnLst>
-                    </p:cTn>
-                  </p:par>
-                </p:childTnLst>
-              </p:cTn>
-              <p:prevCondLst>
-                <p:cond evt="onPrev" delay="0">
-                  <p:tgtEl>
-                    <p:sldTgt/>
-                  </p:tgtEl>
-                </p:cond>
-              </p:prevCondLst>
-              <p:nextCondLst>
-                <p:cond evt="onNext" delay="0">
-                  <p:tgtEl>
-                    <p:sldTgt/>
-                  </p:tgtEl>
-                </p:cond>
-              </p:nextCondLst>
-            </p:seq>
-            <p:video>
-              <p:cMediaNode vol="80000">
-                <p:cTn id="7" repeatCount="indefinite" fill="hold" display="0">
-                  <p:stCondLst>
-                    <p:cond delay="indefinite"/>
-                  </p:stCondLst>
-                </p:cTn>
-                <p:tgtEl>
-                  <p:spTgt spid="4"/>
-                </p:tgtEl>
-              </p:cMediaNode>
-            </p:video>
-            <p:seq concurrent="1" nextAc="seek">
-              <p:cTn id="8" restart="whenNotActive" fill="hold" evtFilter="cancelBubble" nodeType="interactiveSeq">
-                <p:stCondLst>
-                  <p:cond evt="onClick" delay="0">
-                    <p:tgtEl>
-                      <p:spTgt spid="4"/>
-                    </p:tgtEl>
-                  </p:cond>
-                </p:stCondLst>
-                <p:endSync evt="end" delay="0">
-                  <p:rtn val="all"/>
-                </p:endSync>
-                <p:childTnLst>
-                  <p:par>
-                    <p:cTn id="9" fill="hold">
-                      <p:stCondLst>
-                        <p:cond delay="0"/>
-                      </p:stCondLst>
-                      <p:childTnLst>
-                        <p:par>
-                          <p:cTn id="10" fill="hold">
-                            <p:stCondLst>
-                              <p:cond delay="0"/>
-                            </p:stCondLst>
-                            <p:childTnLst>
-                              <p:par>
-                                <p:cTn id="11" presetID="2" presetClass="mediacall" presetSubtype="0" fill="hold" nodeType="clickEffect">
-                                  <p:stCondLst>
-                                    <p:cond delay="0"/>
-                                  </p:stCondLst>
-                                  <p:childTnLst>
-                                    <p:cmd type="call" cmd="togglePause">
-                                      <p:cBhvr>
-                                        <p:cTn id="12" dur="1" fill="hold"/>
-                                        <p:tgtEl>
-                                          <p:spTgt spid="4"/>
-                                        </p:tgtEl>
-                                      </p:cBhvr>
-                                    </p:cmd>
-                                  </p:childTnLst>
-                                </p:cTn>
-                              </p:par>
-                            </p:childTnLst>
-                          </p:cTn>
-                        </p:par>
-                      </p:childTnLst>
-                    </p:cTn>
-                  </p:par>
-                </p:childTnLst>
-              </p:cTn>
-              <p:nextCondLst>
-                <p:cond evt="onClick" delay="0">
-                  <p:tgtEl>
-                    <p:spTgt spid="4"/>
-                  </p:tgtEl>
-                </p:cond>
-              </p:nextCondLst>
-            </p:seq>
-          </p:childTnLst>
-        </p:cTn>
-      </p:par>
-    </p:tnLst>
-  </p:timing>
-</p:sld>
-</file>
-
-<file path=ppt/slides/slide5.xml><?xml version="1.0" encoding="utf-8"?>
-<p:sld xmlns:a="http://schemas.openxmlformats.org/drawingml/2006/main" xmlns:r="http://schemas.openxmlformats.org/officeDocument/2006/relationships" xmlns:p="http://schemas.openxmlformats.org/presentationml/2006/main">
-  <p:cSld>
-    <p:spTree>
-      <p:nvGrpSpPr>
-        <p:cNvPr id="1" name=""/>
-        <p:cNvGrpSpPr/>
-        <p:nvPr/>
-      </p:nvGrpSpPr>
-      <p:grpSpPr>
-        <a:xfrm>
-          <a:off x="0" y="0"/>
-          <a:ext cx="0" cy="0"/>
-          <a:chOff x="0" y="0"/>
-          <a:chExt cx="0" cy="0"/>
-        </a:xfrm>
-      </p:grpSpPr>
-      <p:pic>
-        <p:nvPicPr>
-          <p:cNvPr id="4" name="1_Smooth">
-            <a:hlinkClick r:id="" action="ppaction://media"/>
-            <a:extLst>
-              <a:ext uri="{FF2B5EF4-FFF2-40B4-BE49-F238E27FC236}">
-                <a16:creationId xmlns:a16="http://schemas.microsoft.com/office/drawing/2014/main" id="{0E6CF9D1-E6BC-E39D-1C6B-CA4625F7C223}"/>
-              </a:ext>
-            </a:extLst>
-          </p:cNvPr>
-          <p:cNvPicPr>
-            <a:picLocks noGrp="1" noChangeAspect="1"/>
-          </p:cNvPicPr>
-          <p:nvPr>
-            <p:ph idx="1"/>
-            <a:videoFile r:link="rId2"/>
-            <p:extLst>
-              <p:ext uri="{DAA4B4D4-6D71-4841-9C94-3DE7FCFB9230}">
-                <p14:media xmlns:p14="http://schemas.microsoft.com/office/powerpoint/2010/main" r:embed="rId1"/>
-              </p:ext>
-            </p:extLst>
-          </p:nvPr>
-        </p:nvPicPr>
-        <p:blipFill>
-          <a:blip r:embed="rId4"/>
-          <a:srcRect l="20120" t="11140" r="27983" b="18563"/>
-          <a:stretch>
-            <a:fillRect/>
-          </a:stretch>
-        </p:blipFill>
-        <p:spPr>
-          <a:xfrm>
-            <a:off x="1828800" y="363256"/>
-            <a:ext cx="5486400" cy="5574182"/>
-          </a:xfrm>
-        </p:spPr>
-      </p:pic>
-    </p:spTree>
-    <p:extLst>
-      <p:ext uri="{BB962C8B-B14F-4D97-AF65-F5344CB8AC3E}">
-        <p14:creationId xmlns:p14="http://schemas.microsoft.com/office/powerpoint/2010/main" val="3240860403"/>
-      </p:ext>
-    </p:extLst>
-  </p:cSld>
-  <p:clrMapOvr>
-    <a:masterClrMapping/>
-  </p:clrMapOvr>
-  <p:timing>
-    <p:tnLst>
-      <p:par>
-        <p:cTn id="1" dur="indefinite" restart="never" nodeType="tmRoot">
-          <p:childTnLst>
-            <p:seq concurrent="1" nextAc="seek">
-              <p:cTn id="2" dur="indefinite" nodeType="mainSeq">
-                <p:childTnLst>
-                  <p:par>
-                    <p:cTn id="3" fill="hold">
-                      <p:stCondLst>
-                        <p:cond delay="indefinite"/>
-                      </p:stCondLst>
-                      <p:childTnLst>
-                        <p:par>
-                          <p:cTn id="4" fill="hold">
-                            <p:stCondLst>
-                              <p:cond delay="0"/>
-                            </p:stCondLst>
-                            <p:childTnLst>
-                              <p:par>
-                                <p:cTn id="5" presetID="1" presetClass="mediacall" presetSubtype="0" fill="hold" nodeType="clickEffect">
-                                  <p:stCondLst>
-                                    <p:cond delay="0"/>
-                                  </p:stCondLst>
-                                  <p:childTnLst>
-                                    <p:cmd type="call" cmd="playFrom(0.0)">
-                                      <p:cBhvr>
-                                        <p:cTn id="6" dur="3000" fill="hold"/>
-                                        <p:tgtEl>
-                                          <p:spTgt spid="4"/>
-                                        </p:tgtEl>
-                                      </p:cBhvr>
-                                    </p:cmd>
-                                  </p:childTnLst>
-                                </p:cTn>
-                              </p:par>
-                            </p:childTnLst>
-                          </p:cTn>
-                        </p:par>
-                      </p:childTnLst>
-                    </p:cTn>
-                  </p:par>
-                </p:childTnLst>
-              </p:cTn>
-              <p:prevCondLst>
-                <p:cond evt="onPrev" delay="0">
-                  <p:tgtEl>
-                    <p:sldTgt/>
-                  </p:tgtEl>
-                </p:cond>
-              </p:prevCondLst>
-              <p:nextCondLst>
-                <p:cond evt="onNext" delay="0">
-                  <p:tgtEl>
-                    <p:sldTgt/>
-                  </p:tgtEl>
-                </p:cond>
-              </p:nextCondLst>
-            </p:seq>
-            <p:video>
-              <p:cMediaNode vol="80000">
-                <p:cTn id="7" repeatCount="indefinite" fill="hold" display="0">
-                  <p:stCondLst>
-                    <p:cond delay="indefinite"/>
-                  </p:stCondLst>
-                </p:cTn>
-                <p:tgtEl>
-                  <p:spTgt spid="4"/>
-                </p:tgtEl>
-              </p:cMediaNode>
-            </p:video>
-            <p:seq concurrent="1" nextAc="seek">
-              <p:cTn id="8" restart="whenNotActive" fill="hold" evtFilter="cancelBubble" nodeType="interactiveSeq">
-                <p:stCondLst>
-                  <p:cond evt="onClick" delay="0">
-                    <p:tgtEl>
-                      <p:spTgt spid="4"/>
-                    </p:tgtEl>
-                  </p:cond>
-                </p:stCondLst>
-                <p:endSync evt="end" delay="0">
-                  <p:rtn val="all"/>
-                </p:endSync>
-                <p:childTnLst>
-                  <p:par>
-                    <p:cTn id="9" fill="hold">
-                      <p:stCondLst>
-                        <p:cond delay="0"/>
-                      </p:stCondLst>
-                      <p:childTnLst>
-                        <p:par>
-                          <p:cTn id="10" fill="hold">
-                            <p:stCondLst>
-                              <p:cond delay="0"/>
-                            </p:stCondLst>
-                            <p:childTnLst>
-                              <p:par>
-                                <p:cTn id="11" presetID="2" presetClass="mediacall" presetSubtype="0" fill="hold" nodeType="clickEffect">
-                                  <p:stCondLst>
-                                    <p:cond delay="0"/>
-                                  </p:stCondLst>
-                                  <p:childTnLst>
-                                    <p:cmd type="call" cmd="togglePause">
-                                      <p:cBhvr>
-                                        <p:cTn id="12" dur="1" fill="hold"/>
-                                        <p:tgtEl>
-                                          <p:spTgt spid="4"/>
-                                        </p:tgtEl>
-                                      </p:cBhvr>
-                                    </p:cmd>
-                                  </p:childTnLst>
-                                </p:cTn>
-                              </p:par>
-                            </p:childTnLst>
-                          </p:cTn>
-                        </p:par>
-                      </p:childTnLst>
-                    </p:cTn>
-                  </p:par>
-                </p:childTnLst>
-              </p:cTn>
-              <p:nextCondLst>
-                <p:cond evt="onClick" delay="0">
-                  <p:tgtEl>
-                    <p:spTgt spid="4"/>
-                  </p:tgtEl>
-                </p:cond>
-              </p:nextCondLst>
-            </p:seq>
-          </p:childTnLst>
-        </p:cTn>
-      </p:par>
-    </p:tnLst>
-  </p:timing>
-</p:sld>
-</file>
-
-<file path=ppt/slides/slide6.xml><?xml version="1.0" encoding="utf-8"?>
-<p:sld xmlns:a="http://schemas.openxmlformats.org/drawingml/2006/main" xmlns:r="http://schemas.openxmlformats.org/officeDocument/2006/relationships" xmlns:p="http://schemas.openxmlformats.org/presentationml/2006/main">
-  <p:cSld>
-    <p:spTree>
-      <p:nvGrpSpPr>
-        <p:cNvPr id="1" name=""/>
-        <p:cNvGrpSpPr/>
-        <p:nvPr/>
-      </p:nvGrpSpPr>
-      <p:grpSpPr>
-        <a:xfrm>
-          <a:off x="0" y="0"/>
-          <a:ext cx="0" cy="0"/>
-          <a:chOff x="0" y="0"/>
-          <a:chExt cx="0" cy="0"/>
-        </a:xfrm>
-      </p:grpSpPr>
-      <p:pic>
-        <p:nvPicPr>
-          <p:cNvPr id="4" name="1_Spike_V2">
-            <a:hlinkClick r:id="" action="ppaction://media"/>
-            <a:extLst>
-              <a:ext uri="{FF2B5EF4-FFF2-40B4-BE49-F238E27FC236}">
-                <a16:creationId xmlns:a16="http://schemas.microsoft.com/office/drawing/2014/main" id="{BA5F2435-3D54-8F93-9647-AE4B6239ACFB}"/>
-              </a:ext>
-            </a:extLst>
-          </p:cNvPr>
-          <p:cNvPicPr>
-            <a:picLocks noGrp="1" noChangeAspect="1"/>
-          </p:cNvPicPr>
-          <p:nvPr>
-            <p:ph idx="1"/>
-            <a:videoFile r:link="rId2"/>
-            <p:extLst>
-              <p:ext uri="{DAA4B4D4-6D71-4841-9C94-3DE7FCFB9230}">
-                <p14:media xmlns:p14="http://schemas.microsoft.com/office/powerpoint/2010/main" r:embed="rId1"/>
-              </p:ext>
-            </p:extLst>
-          </p:nvPr>
-        </p:nvPicPr>
-        <p:blipFill>
-          <a:blip r:embed="rId4"/>
-          <a:srcRect l="20328" t="10863" r="26945" b="19394"/>
-          <a:stretch>
-            <a:fillRect/>
-          </a:stretch>
-        </p:blipFill>
-        <p:spPr>
-          <a:xfrm>
-            <a:off x="1797485" y="513567"/>
-            <a:ext cx="5549030" cy="5505335"/>
-          </a:xfrm>
-        </p:spPr>
-      </p:pic>
-    </p:spTree>
-    <p:extLst>
-      <p:ext uri="{BB962C8B-B14F-4D97-AF65-F5344CB8AC3E}">
-        <p14:creationId xmlns:p14="http://schemas.microsoft.com/office/powerpoint/2010/main" val="4171770457"/>
-      </p:ext>
-    </p:extLst>
-  </p:cSld>
-  <p:clrMapOvr>
-    <a:masterClrMapping/>
-  </p:clrMapOvr>
-  <p:timing>
-    <p:tnLst>
-      <p:par>
-        <p:cTn id="1" dur="indefinite" restart="never" nodeType="tmRoot">
-          <p:childTnLst>
-            <p:seq concurrent="1" nextAc="seek">
-              <p:cTn id="2" dur="indefinite" nodeType="mainSeq">
-                <p:childTnLst>
-                  <p:par>
-                    <p:cTn id="3" fill="hold">
-                      <p:stCondLst>
-                        <p:cond delay="indefinite"/>
-                      </p:stCondLst>
-                      <p:childTnLst>
-                        <p:par>
-                          <p:cTn id="4" fill="hold">
-                            <p:stCondLst>
-                              <p:cond delay="0"/>
-                            </p:stCondLst>
-                            <p:childTnLst>
-                              <p:par>
-                                <p:cTn id="5" presetID="1" presetClass="mediacall" presetSubtype="0" fill="hold" nodeType="clickEffect">
-                                  <p:stCondLst>
-                                    <p:cond delay="0"/>
-                                  </p:stCondLst>
-                                  <p:childTnLst>
-                                    <p:cmd type="call" cmd="playFrom(0.0)">
-                                      <p:cBhvr>
-                                        <p:cTn id="6" dur="1500" fill="hold"/>
-                                        <p:tgtEl>
-                                          <p:spTgt spid="4"/>
-                                        </p:tgtEl>
-                                      </p:cBhvr>
-                                    </p:cmd>
-                                  </p:childTnLst>
-                                </p:cTn>
-                              </p:par>
-                            </p:childTnLst>
-                          </p:cTn>
-                        </p:par>
-                      </p:childTnLst>
-                    </p:cTn>
-                  </p:par>
-                </p:childTnLst>
-              </p:cTn>
-              <p:prevCondLst>
-                <p:cond evt="onPrev" delay="0">
-                  <p:tgtEl>
-                    <p:sldTgt/>
-                  </p:tgtEl>
-                </p:cond>
-              </p:prevCondLst>
-              <p:nextCondLst>
-                <p:cond evt="onNext" delay="0">
-                  <p:tgtEl>
-                    <p:sldTgt/>
-                  </p:tgtEl>
-                </p:cond>
-              </p:nextCondLst>
-            </p:seq>
-            <p:video>
-              <p:cMediaNode vol="80000">
-                <p:cTn id="7" repeatCount="indefinite" fill="hold" display="0">
-                  <p:stCondLst>
-                    <p:cond delay="indefinite"/>
-                  </p:stCondLst>
-                </p:cTn>
-                <p:tgtEl>
-                  <p:spTgt spid="4"/>
-                </p:tgtEl>
-              </p:cMediaNode>
-            </p:video>
-            <p:seq concurrent="1" nextAc="seek">
-              <p:cTn id="8" restart="whenNotActive" fill="hold" evtFilter="cancelBubble" nodeType="interactiveSeq">
-                <p:stCondLst>
-                  <p:cond evt="onClick" delay="0">
-                    <p:tgtEl>
-                      <p:spTgt spid="4"/>
-                    </p:tgtEl>
-                  </p:cond>
-                </p:stCondLst>
-                <p:endSync evt="end" delay="0">
-                  <p:rtn val="all"/>
-                </p:endSync>
-                <p:childTnLst>
-                  <p:par>
-                    <p:cTn id="9" fill="hold">
-                      <p:stCondLst>
-                        <p:cond delay="0"/>
-                      </p:stCondLst>
-                      <p:childTnLst>
-                        <p:par>
-                          <p:cTn id="10" fill="hold">
-                            <p:stCondLst>
-                              <p:cond delay="0"/>
-                            </p:stCondLst>
-                            <p:childTnLst>
-                              <p:par>
-                                <p:cTn id="11" presetID="2" presetClass="mediacall" presetSubtype="0" fill="hold" nodeType="clickEffect">
-                                  <p:stCondLst>
-                                    <p:cond delay="0"/>
-                                  </p:stCondLst>
-                                  <p:childTnLst>
-                                    <p:cmd type="call" cmd="togglePause">
-                                      <p:cBhvr>
-                                        <p:cTn id="12" dur="1" fill="hold"/>
-                                        <p:tgtEl>
-                                          <p:spTgt spid="4"/>
-                                        </p:tgtEl>
-                                      </p:cBhvr>
-                                    </p:cmd>
-                                  </p:childTnLst>
-                                </p:cTn>
-                              </p:par>
-                            </p:childTnLst>
-                          </p:cTn>
-                        </p:par>
-                      </p:childTnLst>
-                    </p:cTn>
-                  </p:par>
-                </p:childTnLst>
-              </p:cTn>
-              <p:nextCondLst>
-                <p:cond evt="onClick" delay="0">
-                  <p:tgtEl>
-                    <p:spTgt spid="4"/>
-                  </p:tgtEl>
-                </p:cond>
-              </p:nextCondLst>
-            </p:seq>
-          </p:childTnLst>
-        </p:cTn>
-      </p:par>
-    </p:tnLst>
-  </p:timing>
-</p:sld>
-</file>
-
-<file path=ppt/slides/slide7.xml><?xml version="1.0" encoding="utf-8"?>
-<p:sld xmlns:a="http://schemas.openxmlformats.org/drawingml/2006/main" xmlns:r="http://schemas.openxmlformats.org/officeDocument/2006/relationships" xmlns:p="http://schemas.openxmlformats.org/presentationml/2006/main">
-  <p:cSld>
-    <p:spTree>
-      <p:nvGrpSpPr>
-        <p:cNvPr id="1" name=""/>
-        <p:cNvGrpSpPr/>
-        <p:nvPr/>
-      </p:nvGrpSpPr>
-      <p:grpSpPr>
-        <a:xfrm>
-          <a:off x="0" y="0"/>
-          <a:ext cx="0" cy="0"/>
-          <a:chOff x="0" y="0"/>
-          <a:chExt cx="0" cy="0"/>
-        </a:xfrm>
-      </p:grpSpPr>
-      <p:pic>
-        <p:nvPicPr>
-          <p:cNvPr id="4" name="1_Smooth_V2">
-            <a:hlinkClick r:id="" action="ppaction://media"/>
-            <a:extLst>
-              <a:ext uri="{FF2B5EF4-FFF2-40B4-BE49-F238E27FC236}">
-                <a16:creationId xmlns:a16="http://schemas.microsoft.com/office/drawing/2014/main" id="{7170C593-08EF-EA07-9EAC-9CA1AF95C495}"/>
-              </a:ext>
-            </a:extLst>
-          </p:cNvPr>
-          <p:cNvPicPr>
-            <a:picLocks noGrp="1" noChangeAspect="1"/>
-          </p:cNvPicPr>
-          <p:nvPr>
-            <p:ph idx="1"/>
-            <a:videoFile r:link="rId2"/>
-            <p:extLst>
-              <p:ext uri="{DAA4B4D4-6D71-4841-9C94-3DE7FCFB9230}">
-                <p14:media xmlns:p14="http://schemas.microsoft.com/office/powerpoint/2010/main" r:embed="rId1"/>
-              </p:ext>
-            </p:extLst>
-          </p:nvPr>
-        </p:nvPicPr>
-        <p:blipFill>
-          <a:blip r:embed="rId4"/>
-          <a:srcRect l="18667" t="11694" r="27981" b="18287"/>
-          <a:stretch>
-            <a:fillRect/>
-          </a:stretch>
-        </p:blipFill>
-        <p:spPr>
-          <a:xfrm>
-            <a:off x="1835063" y="496667"/>
-            <a:ext cx="5473874" cy="5388678"/>
-          </a:xfrm>
-        </p:spPr>
-      </p:pic>
-    </p:spTree>
-    <p:extLst>
-      <p:ext uri="{BB962C8B-B14F-4D97-AF65-F5344CB8AC3E}">
-        <p14:creationId xmlns:p14="http://schemas.microsoft.com/office/powerpoint/2010/main" val="1619864174"/>
-      </p:ext>
-    </p:extLst>
-  </p:cSld>
-  <p:clrMapOvr>
-    <a:masterClrMapping/>
-  </p:clrMapOvr>
-  <p:timing>
-    <p:tnLst>
-      <p:par>
-        <p:cTn id="1" dur="indefinite" restart="never" nodeType="tmRoot">
-          <p:childTnLst>
-            <p:seq concurrent="1" nextAc="seek">
-              <p:cTn id="2" dur="indefinite" nodeType="mainSeq">
-                <p:childTnLst>
-                  <p:par>
-                    <p:cTn id="3" fill="hold">
-                      <p:stCondLst>
-                        <p:cond delay="indefinite"/>
-                      </p:stCondLst>
-                      <p:childTnLst>
-                        <p:par>
-                          <p:cTn id="4" fill="hold">
-                            <p:stCondLst>
-                              <p:cond delay="0"/>
-                            </p:stCondLst>
-                            <p:childTnLst>
-                              <p:par>
-                                <p:cTn id="5" presetID="1" presetClass="mediacall" presetSubtype="0" fill="hold" nodeType="clickEffect">
-                                  <p:stCondLst>
-                                    <p:cond delay="0"/>
-                                  </p:stCondLst>
-                                  <p:childTnLst>
-                                    <p:cmd type="call" cmd="playFrom(0.0)">
-                                      <p:cBhvr>
-                                        <p:cTn id="6" dur="6200" fill="hold"/>
-                                        <p:tgtEl>
-                                          <p:spTgt spid="4"/>
-                                        </p:tgtEl>
-                                      </p:cBhvr>
-                                    </p:cmd>
-                                  </p:childTnLst>
-                                </p:cTn>
-                              </p:par>
-                            </p:childTnLst>
-                          </p:cTn>
-                        </p:par>
-                      </p:childTnLst>
-                    </p:cTn>
-                  </p:par>
-                </p:childTnLst>
-              </p:cTn>
-              <p:prevCondLst>
-                <p:cond evt="onPrev" delay="0">
-                  <p:tgtEl>
-                    <p:sldTgt/>
-                  </p:tgtEl>
-                </p:cond>
-              </p:prevCondLst>
-              <p:nextCondLst>
-                <p:cond evt="onNext" delay="0">
-                  <p:tgtEl>
-                    <p:sldTgt/>
-                  </p:tgtEl>
-                </p:cond>
-              </p:nextCondLst>
-            </p:seq>
-            <p:video>
-              <p:cMediaNode vol="80000">
-                <p:cTn id="7" repeatCount="indefinite" fill="hold" display="0">
-                  <p:stCondLst>
-                    <p:cond delay="indefinite"/>
-                  </p:stCondLst>
-                </p:cTn>
-                <p:tgtEl>
-                  <p:spTgt spid="4"/>
-                </p:tgtEl>
-              </p:cMediaNode>
-            </p:video>
-            <p:seq concurrent="1" nextAc="seek">
-              <p:cTn id="8" restart="whenNotActive" fill="hold" evtFilter="cancelBubble" nodeType="interactiveSeq">
-                <p:stCondLst>
-                  <p:cond evt="onClick" delay="0">
-                    <p:tgtEl>
-                      <p:spTgt spid="4"/>
-                    </p:tgtEl>
-                  </p:cond>
-                </p:stCondLst>
-                <p:endSync evt="end" delay="0">
-                  <p:rtn val="all"/>
-                </p:endSync>
-                <p:childTnLst>
-                  <p:par>
-                    <p:cTn id="9" fill="hold">
-                      <p:stCondLst>
-                        <p:cond delay="0"/>
-                      </p:stCondLst>
-                      <p:childTnLst>
-                        <p:par>
-                          <p:cTn id="10" fill="hold">
-                            <p:stCondLst>
-                              <p:cond delay="0"/>
-                            </p:stCondLst>
-                            <p:childTnLst>
-                              <p:par>
-                                <p:cTn id="11" presetID="2" presetClass="mediacall" presetSubtype="0" fill="hold" nodeType="clickEffect">
-                                  <p:stCondLst>
-                                    <p:cond delay="0"/>
-                                  </p:stCondLst>
-                                  <p:childTnLst>
-                                    <p:cmd type="call" cmd="togglePause">
-                                      <p:cBhvr>
-                                        <p:cTn id="12" dur="1" fill="hold"/>
-                                        <p:tgtEl>
-                                          <p:spTgt spid="4"/>
-                                        </p:tgtEl>
-                                      </p:cBhvr>
-                                    </p:cmd>
-                                  </p:childTnLst>
-                                </p:cTn>
-                              </p:par>
-                            </p:childTnLst>
-                          </p:cTn>
-                        </p:par>
-                      </p:childTnLst>
-                    </p:cTn>
-                  </p:par>
-                </p:childTnLst>
-              </p:cTn>
-              <p:nextCondLst>
-                <p:cond evt="onClick" delay="0">
-                  <p:tgtEl>
-                    <p:spTgt spid="4"/>
-                  </p:tgtEl>
-                </p:cond>
-              </p:nextCondLst>
-            </p:seq>
-          </p:childTnLst>
-        </p:cTn>
-      </p:par>
-    </p:tnLst>
-  </p:timing>
-</p:sld>
-</file>
-
-<file path=ppt/slides/slide8.xml><?xml version="1.0" encoding="utf-8"?>
-<p:sld xmlns:a="http://schemas.openxmlformats.org/drawingml/2006/main" xmlns:r="http://schemas.openxmlformats.org/officeDocument/2006/relationships" xmlns:p="http://schemas.openxmlformats.org/presentationml/2006/main">
-  <p:cSld>
-    <p:spTree>
-      <p:nvGrpSpPr>
-        <p:cNvPr id="1" name=""/>
-        <p:cNvGrpSpPr/>
-        <p:nvPr/>
-      </p:nvGrpSpPr>
-      <p:grpSpPr>
-        <a:xfrm>
-          <a:off x="0" y="0"/>
-          <a:ext cx="0" cy="0"/>
-          <a:chOff x="0" y="0"/>
-          <a:chExt cx="0" cy="0"/>
-        </a:xfrm>
-      </p:grpSpPr>
-      <p:pic>
-        <p:nvPicPr>
-          <p:cNvPr id="4" name="Spike">
-            <a:hlinkClick r:id="" action="ppaction://media"/>
-            <a:extLst>
-              <a:ext uri="{FF2B5EF4-FFF2-40B4-BE49-F238E27FC236}">
-                <a16:creationId xmlns:a16="http://schemas.microsoft.com/office/drawing/2014/main" id="{B4BDADD3-9CBF-E0C9-C087-0EF71FF75167}"/>
-              </a:ext>
-            </a:extLst>
-          </p:cNvPr>
-          <p:cNvPicPr>
-            <a:picLocks noGrp="1" noChangeAspect="1"/>
-          </p:cNvPicPr>
-          <p:nvPr>
-            <p:ph idx="1"/>
-            <a:videoFile r:link="rId2"/>
-            <p:extLst>
-              <p:ext uri="{DAA4B4D4-6D71-4841-9C94-3DE7FCFB9230}">
-                <p14:media xmlns:p14="http://schemas.microsoft.com/office/powerpoint/2010/main" r:embed="rId1"/>
-              </p:ext>
-            </p:extLst>
-          </p:nvPr>
-        </p:nvPicPr>
-        <p:blipFill>
-          <a:blip r:embed="rId4"/>
-          <a:srcRect l="20569" t="11919" r="27944" b="19660"/>
-          <a:stretch>
-            <a:fillRect/>
-          </a:stretch>
-        </p:blipFill>
-        <p:spPr>
-          <a:xfrm>
-            <a:off x="1797485" y="313150"/>
-            <a:ext cx="5549030" cy="5531188"/>
-          </a:xfrm>
-        </p:spPr>
-      </p:pic>
-    </p:spTree>
-    <p:extLst>
-      <p:ext uri="{BB962C8B-B14F-4D97-AF65-F5344CB8AC3E}">
-        <p14:creationId xmlns:p14="http://schemas.microsoft.com/office/powerpoint/2010/main" val="1579948359"/>
-      </p:ext>
-    </p:extLst>
-  </p:cSld>
-  <p:clrMapOvr>
-    <a:masterClrMapping/>
-  </p:clrMapOvr>
-  <p:timing>
-    <p:tnLst>
-      <p:par>
-        <p:cTn id="1" dur="indefinite" restart="never" nodeType="tmRoot">
-          <p:childTnLst>
-            <p:seq concurrent="1" nextAc="seek">
-              <p:cTn id="2" dur="indefinite" nodeType="mainSeq">
-                <p:childTnLst>
-                  <p:par>
-                    <p:cTn id="3" fill="hold">
-                      <p:stCondLst>
-                        <p:cond delay="indefinite"/>
-                      </p:stCondLst>
-                      <p:childTnLst>
-                        <p:par>
-                          <p:cTn id="4" fill="hold">
-                            <p:stCondLst>
-                              <p:cond delay="0"/>
-                            </p:stCondLst>
-                            <p:childTnLst>
-                              <p:par>
-                                <p:cTn id="5" presetID="1" presetClass="mediacall" presetSubtype="0" fill="hold" nodeType="clickEffect">
-                                  <p:stCondLst>
-                                    <p:cond delay="0"/>
-                                  </p:stCondLst>
-                                  <p:childTnLst>
-                                    <p:cmd type="call" cmd="playFrom(0.0)">
-                                      <p:cBhvr>
-                                        <p:cTn id="6" dur="200" fill="hold"/>
-                                        <p:tgtEl>
-                                          <p:spTgt spid="4"/>
-                                        </p:tgtEl>
-                                      </p:cBhvr>
-                                    </p:cmd>
-                                  </p:childTnLst>
-                                </p:cTn>
-                              </p:par>
-                            </p:childTnLst>
-                          </p:cTn>
-                        </p:par>
-                      </p:childTnLst>
-                    </p:cTn>
-                  </p:par>
-                </p:childTnLst>
-              </p:cTn>
-              <p:prevCondLst>
-                <p:cond evt="onPrev" delay="0">
-                  <p:tgtEl>
-                    <p:sldTgt/>
-                  </p:tgtEl>
-                </p:cond>
-              </p:prevCondLst>
-              <p:nextCondLst>
-                <p:cond evt="onNext" delay="0">
-                  <p:tgtEl>
-                    <p:sldTgt/>
-                  </p:tgtEl>
-                </p:cond>
-              </p:nextCondLst>
-            </p:seq>
-            <p:video>
-              <p:cMediaNode vol="80000">
-                <p:cTn id="7" repeatCount="indefinite" fill="hold" display="0">
-                  <p:stCondLst>
-                    <p:cond delay="indefinite"/>
-                  </p:stCondLst>
-                </p:cTn>
-                <p:tgtEl>
-                  <p:spTgt spid="4"/>
-                </p:tgtEl>
-              </p:cMediaNode>
-            </p:video>
-            <p:seq concurrent="1" nextAc="seek">
-              <p:cTn id="8" restart="whenNotActive" fill="hold" evtFilter="cancelBubble" nodeType="interactiveSeq">
-                <p:stCondLst>
-                  <p:cond evt="onClick" delay="0">
-                    <p:tgtEl>
-                      <p:spTgt spid="4"/>
-                    </p:tgtEl>
-                  </p:cond>
-                </p:stCondLst>
-                <p:endSync evt="end" delay="0">
-                  <p:rtn val="all"/>
-                </p:endSync>
-                <p:childTnLst>
-                  <p:par>
-                    <p:cTn id="9" fill="hold">
-                      <p:stCondLst>
-                        <p:cond delay="0"/>
-                      </p:stCondLst>
-                      <p:childTnLst>
-                        <p:par>
-                          <p:cTn id="10" fill="hold">
-                            <p:stCondLst>
-                              <p:cond delay="0"/>
-                            </p:stCondLst>
-                            <p:childTnLst>
-                              <p:par>
-                                <p:cTn id="11" presetID="2" presetClass="mediacall" presetSubtype="0" fill="hold" nodeType="clickEffect">
-                                  <p:stCondLst>
-                                    <p:cond delay="0"/>
-                                  </p:stCondLst>
-                                  <p:childTnLst>
-                                    <p:cmd type="call" cmd="togglePause">
-                                      <p:cBhvr>
-                                        <p:cTn id="12" dur="1" fill="hold"/>
-                                        <p:tgtEl>
-                                          <p:spTgt spid="4"/>
-                                        </p:tgtEl>
-                                      </p:cBhvr>
-                                    </p:cmd>
-                                  </p:childTnLst>
-                                </p:cTn>
-                              </p:par>
-                            </p:childTnLst>
-                          </p:cTn>
-                        </p:par>
-                      </p:childTnLst>
-                    </p:cTn>
-                  </p:par>
-                </p:childTnLst>
-              </p:cTn>
-              <p:nextCondLst>
-                <p:cond evt="onClick" delay="0">
-                  <p:tgtEl>
-                    <p:spTgt spid="4"/>
-                  </p:tgtEl>
-                </p:cond>
-              </p:nextCondLst>
-            </p:seq>
-          </p:childTnLst>
-        </p:cTn>
-      </p:par>
-    </p:tnLst>
-  </p:timing>
-</p:sld>
-</file>
-
-<file path=ppt/slides/slide9.xml><?xml version="1.0" encoding="utf-8"?>
-<p:sld xmlns:a="http://schemas.openxmlformats.org/drawingml/2006/main" xmlns:r="http://schemas.openxmlformats.org/officeDocument/2006/relationships" xmlns:p="http://schemas.openxmlformats.org/presentationml/2006/main">
-  <p:cSld>
-    <p:spTree>
-      <p:nvGrpSpPr>
-        <p:cNvPr id="1" name=""/>
-        <p:cNvGrpSpPr/>
-        <p:nvPr/>
-      </p:nvGrpSpPr>
-      <p:grpSpPr>
-        <a:xfrm>
-          <a:off x="0" y="0"/>
-          <a:ext cx="0" cy="0"/>
-          <a:chOff x="0" y="0"/>
-          <a:chExt cx="0" cy="0"/>
-        </a:xfrm>
-      </p:grpSpPr>
-      <p:pic>
-        <p:nvPicPr>
-          <p:cNvPr id="4" name="Smooth">
-            <a:hlinkClick r:id="" action="ppaction://media"/>
-            <a:extLst>
-              <a:ext uri="{FF2B5EF4-FFF2-40B4-BE49-F238E27FC236}">
-                <a16:creationId xmlns:a16="http://schemas.microsoft.com/office/drawing/2014/main" id="{4A7B04AD-3B3A-FE80-8ADA-592A03D2EF70}"/>
-              </a:ext>
-            </a:extLst>
-          </p:cNvPr>
-          <p:cNvPicPr>
-            <a:picLocks noGrp="1" noChangeAspect="1"/>
-          </p:cNvPicPr>
-          <p:nvPr>
-            <p:ph idx="1"/>
-            <a:videoFile r:link="rId2"/>
-            <p:extLst>
-              <p:ext uri="{DAA4B4D4-6D71-4841-9C94-3DE7FCFB9230}">
-                <p14:media xmlns:p14="http://schemas.microsoft.com/office/powerpoint/2010/main" r:embed="rId1"/>
-              </p:ext>
-            </p:extLst>
-          </p:nvPr>
-        </p:nvPicPr>
-        <p:blipFill>
-          <a:blip r:embed="rId4"/>
-          <a:srcRect l="19082" t="11417" r="26529" b="20224"/>
-          <a:stretch>
-            <a:fillRect/>
-          </a:stretch>
-        </p:blipFill>
-        <p:spPr>
-          <a:xfrm>
-            <a:off x="1669093" y="308703"/>
-            <a:ext cx="5805814" cy="5473419"/>
-          </a:xfrm>
-        </p:spPr>
-      </p:pic>
-    </p:spTree>
-    <p:extLst>
-      <p:ext uri="{BB962C8B-B14F-4D97-AF65-F5344CB8AC3E}">
-        <p14:creationId xmlns:p14="http://schemas.microsoft.com/office/powerpoint/2010/main" val="4127160925"/>
-      </p:ext>
-    </p:extLst>
-  </p:cSld>
-  <p:clrMapOvr>
-    <a:masterClrMapping/>
-  </p:clrMapOvr>
-  <p:timing>
-    <p:tnLst>
-      <p:par>
-        <p:cTn id="1" dur="indefinite" restart="never" nodeType="tmRoot">
-          <p:childTnLst>
-            <p:seq concurrent="1" nextAc="seek">
-              <p:cTn id="2" dur="indefinite" nodeType="mainSeq">
-                <p:childTnLst>
-                  <p:par>
-                    <p:cTn id="3" fill="hold">
-                      <p:stCondLst>
-                        <p:cond delay="indefinite"/>
-                      </p:stCondLst>
-                      <p:childTnLst>
-                        <p:par>
-                          <p:cTn id="4" fill="hold">
-                            <p:stCondLst>
-                              <p:cond delay="0"/>
-                            </p:stCondLst>
-                            <p:childTnLst>
-                              <p:par>
-                                <p:cTn id="5" presetID="1" presetClass="mediacall" presetSubtype="0" fill="hold" nodeType="clickEffect">
-                                  <p:stCondLst>
-                                    <p:cond delay="0"/>
-                                  </p:stCondLst>
-                                  <p:childTnLst>
-                                    <p:cmd type="call" cmd="playFrom(0.0)">
-                                      <p:cBhvr>
-                                        <p:cTn id="6" dur="3800" fill="hold"/>
+                                        <p:cTn id="6" dur="4000" fill="hold"/>
                                         <p:tgtEl>
                                           <p:spTgt spid="4"/>
                                         </p:tgtEl>
@@ -4348,6 +4566,1199 @@
       </p:par>
     </p:tnLst>
   </p:timing>
+</p:sld>
+</file>
+
+<file path=ppt/slides/slide4.xml><?xml version="1.0" encoding="utf-8"?>
+<p:sld xmlns:a="http://schemas.openxmlformats.org/drawingml/2006/main" xmlns:r="http://schemas.openxmlformats.org/officeDocument/2006/relationships" xmlns:p="http://schemas.openxmlformats.org/presentationml/2006/main">
+  <p:cSld>
+    <p:spTree>
+      <p:nvGrpSpPr>
+        <p:cNvPr id="1" name="">
+          <a:extLst>
+            <a:ext uri="{FF2B5EF4-FFF2-40B4-BE49-F238E27FC236}">
+              <a16:creationId xmlns:a16="http://schemas.microsoft.com/office/drawing/2014/main" id="{D4955F76-0188-D480-9D4F-6D7A29927D19}"/>
+            </a:ext>
+          </a:extLst>
+        </p:cNvPr>
+        <p:cNvGrpSpPr/>
+        <p:nvPr/>
+      </p:nvGrpSpPr>
+      <p:grpSpPr>
+        <a:xfrm>
+          <a:off x="0" y="0"/>
+          <a:ext cx="0" cy="0"/>
+          <a:chOff x="0" y="0"/>
+          <a:chExt cx="0" cy="0"/>
+        </a:xfrm>
+      </p:grpSpPr>
+      <p:sp>
+        <p:nvSpPr>
+          <p:cNvPr id="10" name="Title 9">
+            <a:extLst>
+              <a:ext uri="{FF2B5EF4-FFF2-40B4-BE49-F238E27FC236}">
+                <a16:creationId xmlns:a16="http://schemas.microsoft.com/office/drawing/2014/main" id="{9AA19DA6-A569-665B-8BEE-70A2EEBCDC5E}"/>
+              </a:ext>
+            </a:extLst>
+          </p:cNvPr>
+          <p:cNvSpPr>
+            <a:spLocks noGrp="1"/>
+          </p:cNvSpPr>
+          <p:nvPr>
+            <p:ph type="title"/>
+          </p:nvPr>
+        </p:nvSpPr>
+        <p:spPr>
+          <a:xfrm>
+            <a:off x="457200" y="234751"/>
+            <a:ext cx="7886700" cy="994172"/>
+          </a:xfrm>
+        </p:spPr>
+        <p:txBody>
+          <a:bodyPr>
+            <a:noAutofit/>
+          </a:bodyPr>
+          <a:lstStyle/>
+          <a:p>
+            <a:r>
+              <a:rPr lang="en-US" sz="3200" b="1" dirty="0">
+                <a:solidFill>
+                  <a:srgbClr val="171C8C"/>
+                </a:solidFill>
+                <a:latin typeface="Arial" panose="020B0604020202020204" pitchFamily="34" charset="0"/>
+                <a:cs typeface="Arial" panose="020B0604020202020204" pitchFamily="34" charset="0"/>
+              </a:rPr>
+              <a:t>Equilibrium</a:t>
+            </a:r>
+          </a:p>
+        </p:txBody>
+      </p:sp>
+      <p:cxnSp>
+        <p:nvCxnSpPr>
+          <p:cNvPr id="5" name="Straight Connector 4">
+            <a:extLst>
+              <a:ext uri="{FF2B5EF4-FFF2-40B4-BE49-F238E27FC236}">
+                <a16:creationId xmlns:a16="http://schemas.microsoft.com/office/drawing/2014/main" id="{619508E9-A444-61C7-77C9-520BD9CC27BD}"/>
+              </a:ext>
+            </a:extLst>
+          </p:cNvPr>
+          <p:cNvCxnSpPr/>
+          <p:nvPr/>
+        </p:nvCxnSpPr>
+        <p:spPr>
+          <a:xfrm>
+            <a:off x="191528" y="1224990"/>
+            <a:ext cx="8760941" cy="0"/>
+          </a:xfrm>
+          <a:prstGeom prst="line">
+            <a:avLst/>
+          </a:prstGeom>
+          <a:ln w="38100"/>
+        </p:spPr>
+        <p:style>
+          <a:lnRef idx="1">
+            <a:schemeClr val="accent1"/>
+          </a:lnRef>
+          <a:fillRef idx="0">
+            <a:schemeClr val="accent1"/>
+          </a:fillRef>
+          <a:effectRef idx="0">
+            <a:schemeClr val="accent1"/>
+          </a:effectRef>
+          <a:fontRef idx="minor">
+            <a:schemeClr val="tx1"/>
+          </a:fontRef>
+        </p:style>
+      </p:cxnSp>
+      <p:pic>
+        <p:nvPicPr>
+          <p:cNvPr id="2" name="BM_Cell_Forces">
+            <a:hlinkClick r:id="" action="ppaction://media"/>
+            <a:extLst>
+              <a:ext uri="{FF2B5EF4-FFF2-40B4-BE49-F238E27FC236}">
+                <a16:creationId xmlns:a16="http://schemas.microsoft.com/office/drawing/2014/main" id="{FB5631F7-E8B7-68EC-295F-EF7E2F47A5FB}"/>
+              </a:ext>
+            </a:extLst>
+          </p:cNvPr>
+          <p:cNvPicPr>
+            <a:picLocks noChangeAspect="1"/>
+          </p:cNvPicPr>
+          <p:nvPr>
+            <a:videoFile r:link="rId2"/>
+            <p:extLst>
+              <p:ext uri="{DAA4B4D4-6D71-4841-9C94-3DE7FCFB9230}">
+                <p14:media xmlns:p14="http://schemas.microsoft.com/office/powerpoint/2010/main" r:embed="rId1"/>
+              </p:ext>
+            </p:extLst>
+          </p:nvPr>
+        </p:nvPicPr>
+        <p:blipFill>
+          <a:blip r:embed="rId5"/>
+          <a:srcRect l="18695" t="9469" r="26667" b="20193"/>
+          <a:stretch>
+            <a:fillRect/>
+          </a:stretch>
+        </p:blipFill>
+        <p:spPr>
+          <a:xfrm>
+            <a:off x="3347830" y="1603514"/>
+            <a:ext cx="4996070" cy="4823787"/>
+          </a:xfrm>
+          <a:prstGeom prst="rect">
+            <a:avLst/>
+          </a:prstGeom>
+        </p:spPr>
+      </p:pic>
+    </p:spTree>
+    <p:extLst>
+      <p:ext uri="{BB962C8B-B14F-4D97-AF65-F5344CB8AC3E}">
+        <p14:creationId xmlns:p14="http://schemas.microsoft.com/office/powerpoint/2010/main" val="766923697"/>
+      </p:ext>
+    </p:extLst>
+  </p:cSld>
+  <p:clrMapOvr>
+    <a:masterClrMapping/>
+  </p:clrMapOvr>
+  <p:timing>
+    <p:tnLst>
+      <p:par>
+        <p:cTn id="1" dur="indefinite" restart="never" nodeType="tmRoot">
+          <p:childTnLst>
+            <p:seq concurrent="1" nextAc="seek">
+              <p:cTn id="2" dur="indefinite" nodeType="mainSeq">
+                <p:childTnLst>
+                  <p:par>
+                    <p:cTn id="3" fill="hold">
+                      <p:stCondLst>
+                        <p:cond delay="indefinite"/>
+                      </p:stCondLst>
+                      <p:childTnLst>
+                        <p:par>
+                          <p:cTn id="4" fill="hold">
+                            <p:stCondLst>
+                              <p:cond delay="0"/>
+                            </p:stCondLst>
+                            <p:childTnLst>
+                              <p:par>
+                                <p:cTn id="5" presetID="1" presetClass="mediacall" presetSubtype="0" fill="hold" nodeType="clickEffect">
+                                  <p:stCondLst>
+                                    <p:cond delay="0"/>
+                                  </p:stCondLst>
+                                  <p:childTnLst>
+                                    <p:cmd type="call" cmd="playFrom(0.0)">
+                                      <p:cBhvr>
+                                        <p:cTn id="6" dur="3600" fill="hold"/>
+                                        <p:tgtEl>
+                                          <p:spTgt spid="2"/>
+                                        </p:tgtEl>
+                                      </p:cBhvr>
+                                    </p:cmd>
+                                  </p:childTnLst>
+                                </p:cTn>
+                              </p:par>
+                            </p:childTnLst>
+                          </p:cTn>
+                        </p:par>
+                      </p:childTnLst>
+                    </p:cTn>
+                  </p:par>
+                </p:childTnLst>
+              </p:cTn>
+              <p:prevCondLst>
+                <p:cond evt="onPrev" delay="0">
+                  <p:tgtEl>
+                    <p:sldTgt/>
+                  </p:tgtEl>
+                </p:cond>
+              </p:prevCondLst>
+              <p:nextCondLst>
+                <p:cond evt="onNext" delay="0">
+                  <p:tgtEl>
+                    <p:sldTgt/>
+                  </p:tgtEl>
+                </p:cond>
+              </p:nextCondLst>
+            </p:seq>
+            <p:video>
+              <p:cMediaNode vol="80000">
+                <p:cTn id="7" fill="hold" display="0">
+                  <p:stCondLst>
+                    <p:cond delay="indefinite"/>
+                  </p:stCondLst>
+                </p:cTn>
+                <p:tgtEl>
+                  <p:spTgt spid="2"/>
+                </p:tgtEl>
+              </p:cMediaNode>
+            </p:video>
+            <p:seq concurrent="1" nextAc="seek">
+              <p:cTn id="8" restart="whenNotActive" fill="hold" evtFilter="cancelBubble" nodeType="interactiveSeq">
+                <p:stCondLst>
+                  <p:cond evt="onClick" delay="0">
+                    <p:tgtEl>
+                      <p:spTgt spid="2"/>
+                    </p:tgtEl>
+                  </p:cond>
+                </p:stCondLst>
+                <p:endSync evt="end" delay="0">
+                  <p:rtn val="all"/>
+                </p:endSync>
+                <p:childTnLst>
+                  <p:par>
+                    <p:cTn id="9" fill="hold">
+                      <p:stCondLst>
+                        <p:cond delay="0"/>
+                      </p:stCondLst>
+                      <p:childTnLst>
+                        <p:par>
+                          <p:cTn id="10" fill="hold">
+                            <p:stCondLst>
+                              <p:cond delay="0"/>
+                            </p:stCondLst>
+                            <p:childTnLst>
+                              <p:par>
+                                <p:cTn id="11" presetID="2" presetClass="mediacall" presetSubtype="0" fill="hold" nodeType="clickEffect">
+                                  <p:stCondLst>
+                                    <p:cond delay="0"/>
+                                  </p:stCondLst>
+                                  <p:childTnLst>
+                                    <p:cmd type="call" cmd="togglePause">
+                                      <p:cBhvr>
+                                        <p:cTn id="12" dur="1" fill="hold"/>
+                                        <p:tgtEl>
+                                          <p:spTgt spid="2"/>
+                                        </p:tgtEl>
+                                      </p:cBhvr>
+                                    </p:cmd>
+                                  </p:childTnLst>
+                                </p:cTn>
+                              </p:par>
+                            </p:childTnLst>
+                          </p:cTn>
+                        </p:par>
+                      </p:childTnLst>
+                    </p:cTn>
+                  </p:par>
+                </p:childTnLst>
+              </p:cTn>
+              <p:nextCondLst>
+                <p:cond evt="onClick" delay="0">
+                  <p:tgtEl>
+                    <p:spTgt spid="2"/>
+                  </p:tgtEl>
+                </p:cond>
+              </p:nextCondLst>
+            </p:seq>
+          </p:childTnLst>
+        </p:cTn>
+      </p:par>
+    </p:tnLst>
+  </p:timing>
+</p:sld>
+</file>
+
+<file path=ppt/slides/slide5.xml><?xml version="1.0" encoding="utf-8"?>
+<p:sld xmlns:a="http://schemas.openxmlformats.org/drawingml/2006/main" xmlns:r="http://schemas.openxmlformats.org/officeDocument/2006/relationships" xmlns:p="http://schemas.openxmlformats.org/presentationml/2006/main">
+  <p:cSld>
+    <p:spTree>
+      <p:nvGrpSpPr>
+        <p:cNvPr id="1" name=""/>
+        <p:cNvGrpSpPr/>
+        <p:nvPr/>
+      </p:nvGrpSpPr>
+      <p:grpSpPr>
+        <a:xfrm>
+          <a:off x="0" y="0"/>
+          <a:ext cx="0" cy="0"/>
+          <a:chOff x="0" y="0"/>
+          <a:chExt cx="0" cy="0"/>
+        </a:xfrm>
+      </p:grpSpPr>
+      <p:pic>
+        <p:nvPicPr>
+          <p:cNvPr id="4" name="Prolif_DemoV2">
+            <a:hlinkClick r:id="" action="ppaction://media"/>
+            <a:extLst>
+              <a:ext uri="{FF2B5EF4-FFF2-40B4-BE49-F238E27FC236}">
+                <a16:creationId xmlns:a16="http://schemas.microsoft.com/office/drawing/2014/main" id="{6929B391-CA41-DBE9-E026-AA38988C2C27}"/>
+              </a:ext>
+            </a:extLst>
+          </p:cNvPr>
+          <p:cNvPicPr>
+            <a:picLocks noGrp="1" noChangeAspect="1"/>
+          </p:cNvPicPr>
+          <p:nvPr>
+            <p:ph idx="1"/>
+            <a:videoFile r:link="rId2"/>
+            <p:extLst>
+              <p:ext uri="{DAA4B4D4-6D71-4841-9C94-3DE7FCFB9230}">
+                <p14:media xmlns:p14="http://schemas.microsoft.com/office/powerpoint/2010/main" r:embed="rId1"/>
+              </p:ext>
+            </p:extLst>
+          </p:nvPr>
+        </p:nvPicPr>
+        <p:blipFill>
+          <a:blip r:embed="rId4"/>
+          <a:srcRect l="19291" t="10309" r="26737" b="20777"/>
+          <a:stretch>
+            <a:fillRect/>
+          </a:stretch>
+        </p:blipFill>
+        <p:spPr>
+          <a:xfrm>
+            <a:off x="3181610" y="1562489"/>
+            <a:ext cx="5148197" cy="4930386"/>
+          </a:xfrm>
+        </p:spPr>
+      </p:pic>
+      <p:sp>
+        <p:nvSpPr>
+          <p:cNvPr id="5" name="Title 9">
+            <a:extLst>
+              <a:ext uri="{FF2B5EF4-FFF2-40B4-BE49-F238E27FC236}">
+                <a16:creationId xmlns:a16="http://schemas.microsoft.com/office/drawing/2014/main" id="{EA7078BA-E60C-19C5-19F6-D378748D9C24}"/>
+              </a:ext>
+            </a:extLst>
+          </p:cNvPr>
+          <p:cNvSpPr>
+            <a:spLocks noGrp="1"/>
+          </p:cNvSpPr>
+          <p:nvPr>
+            <p:ph type="title"/>
+          </p:nvPr>
+        </p:nvSpPr>
+        <p:spPr>
+          <a:xfrm>
+            <a:off x="457200" y="234751"/>
+            <a:ext cx="7886700" cy="994172"/>
+          </a:xfrm>
+        </p:spPr>
+        <p:txBody>
+          <a:bodyPr>
+            <a:noAutofit/>
+          </a:bodyPr>
+          <a:lstStyle/>
+          <a:p>
+            <a:r>
+              <a:rPr lang="en-US" sz="3200" b="1" dirty="0">
+                <a:solidFill>
+                  <a:srgbClr val="171C8C"/>
+                </a:solidFill>
+                <a:latin typeface="Arial" panose="020B0604020202020204" pitchFamily="34" charset="0"/>
+                <a:cs typeface="Arial" panose="020B0604020202020204" pitchFamily="34" charset="0"/>
+              </a:rPr>
+              <a:t>Only Spring Forces</a:t>
+            </a:r>
+          </a:p>
+        </p:txBody>
+      </p:sp>
+    </p:spTree>
+    <p:extLst>
+      <p:ext uri="{BB962C8B-B14F-4D97-AF65-F5344CB8AC3E}">
+        <p14:creationId xmlns:p14="http://schemas.microsoft.com/office/powerpoint/2010/main" val="3498850967"/>
+      </p:ext>
+    </p:extLst>
+  </p:cSld>
+  <p:clrMapOvr>
+    <a:masterClrMapping/>
+  </p:clrMapOvr>
+  <p:timing>
+    <p:tnLst>
+      <p:par>
+        <p:cTn id="1" dur="indefinite" restart="never" nodeType="tmRoot">
+          <p:childTnLst>
+            <p:seq concurrent="1" nextAc="seek">
+              <p:cTn id="2" dur="indefinite" nodeType="mainSeq">
+                <p:childTnLst>
+                  <p:par>
+                    <p:cTn id="3" fill="hold">
+                      <p:stCondLst>
+                        <p:cond delay="indefinite"/>
+                      </p:stCondLst>
+                      <p:childTnLst>
+                        <p:par>
+                          <p:cTn id="4" fill="hold">
+                            <p:stCondLst>
+                              <p:cond delay="0"/>
+                            </p:stCondLst>
+                            <p:childTnLst>
+                              <p:par>
+                                <p:cTn id="5" presetID="1" presetClass="mediacall" presetSubtype="0" fill="hold" nodeType="clickEffect">
+                                  <p:stCondLst>
+                                    <p:cond delay="0"/>
+                                  </p:stCondLst>
+                                  <p:childTnLst>
+                                    <p:cmd type="call" cmd="playFrom(0.0)">
+                                      <p:cBhvr>
+                                        <p:cTn id="6" dur="10100" fill="hold"/>
+                                        <p:tgtEl>
+                                          <p:spTgt spid="4"/>
+                                        </p:tgtEl>
+                                      </p:cBhvr>
+                                    </p:cmd>
+                                  </p:childTnLst>
+                                </p:cTn>
+                              </p:par>
+                            </p:childTnLst>
+                          </p:cTn>
+                        </p:par>
+                      </p:childTnLst>
+                    </p:cTn>
+                  </p:par>
+                </p:childTnLst>
+              </p:cTn>
+              <p:prevCondLst>
+                <p:cond evt="onPrev" delay="0">
+                  <p:tgtEl>
+                    <p:sldTgt/>
+                  </p:tgtEl>
+                </p:cond>
+              </p:prevCondLst>
+              <p:nextCondLst>
+                <p:cond evt="onNext" delay="0">
+                  <p:tgtEl>
+                    <p:sldTgt/>
+                  </p:tgtEl>
+                </p:cond>
+              </p:nextCondLst>
+            </p:seq>
+            <p:video>
+              <p:cMediaNode vol="80000">
+                <p:cTn id="7" fill="hold" display="0">
+                  <p:stCondLst>
+                    <p:cond delay="indefinite"/>
+                  </p:stCondLst>
+                </p:cTn>
+                <p:tgtEl>
+                  <p:spTgt spid="4"/>
+                </p:tgtEl>
+              </p:cMediaNode>
+            </p:video>
+            <p:seq concurrent="1" nextAc="seek">
+              <p:cTn id="8" restart="whenNotActive" fill="hold" evtFilter="cancelBubble" nodeType="interactiveSeq">
+                <p:stCondLst>
+                  <p:cond evt="onClick" delay="0">
+                    <p:tgtEl>
+                      <p:spTgt spid="4"/>
+                    </p:tgtEl>
+                  </p:cond>
+                </p:stCondLst>
+                <p:endSync evt="end" delay="0">
+                  <p:rtn val="all"/>
+                </p:endSync>
+                <p:childTnLst>
+                  <p:par>
+                    <p:cTn id="9" fill="hold">
+                      <p:stCondLst>
+                        <p:cond delay="0"/>
+                      </p:stCondLst>
+                      <p:childTnLst>
+                        <p:par>
+                          <p:cTn id="10" fill="hold">
+                            <p:stCondLst>
+                              <p:cond delay="0"/>
+                            </p:stCondLst>
+                            <p:childTnLst>
+                              <p:par>
+                                <p:cTn id="11" presetID="2" presetClass="mediacall" presetSubtype="0" fill="hold" nodeType="clickEffect">
+                                  <p:stCondLst>
+                                    <p:cond delay="0"/>
+                                  </p:stCondLst>
+                                  <p:childTnLst>
+                                    <p:cmd type="call" cmd="togglePause">
+                                      <p:cBhvr>
+                                        <p:cTn id="12" dur="1" fill="hold"/>
+                                        <p:tgtEl>
+                                          <p:spTgt spid="4"/>
+                                        </p:tgtEl>
+                                      </p:cBhvr>
+                                    </p:cmd>
+                                  </p:childTnLst>
+                                </p:cTn>
+                              </p:par>
+                            </p:childTnLst>
+                          </p:cTn>
+                        </p:par>
+                      </p:childTnLst>
+                    </p:cTn>
+                  </p:par>
+                </p:childTnLst>
+              </p:cTn>
+              <p:nextCondLst>
+                <p:cond evt="onClick" delay="0">
+                  <p:tgtEl>
+                    <p:spTgt spid="4"/>
+                  </p:tgtEl>
+                </p:cond>
+              </p:nextCondLst>
+            </p:seq>
+          </p:childTnLst>
+        </p:cTn>
+      </p:par>
+    </p:tnLst>
+  </p:timing>
+</p:sld>
+</file>
+
+<file path=ppt/slides/slide6.xml><?xml version="1.0" encoding="utf-8"?>
+<p:sld xmlns:a="http://schemas.openxmlformats.org/drawingml/2006/main" xmlns:r="http://schemas.openxmlformats.org/officeDocument/2006/relationships" xmlns:p="http://schemas.openxmlformats.org/presentationml/2006/main">
+  <p:cSld>
+    <p:spTree>
+      <p:nvGrpSpPr>
+        <p:cNvPr id="1" name="">
+          <a:extLst>
+            <a:ext uri="{FF2B5EF4-FFF2-40B4-BE49-F238E27FC236}">
+              <a16:creationId xmlns:a16="http://schemas.microsoft.com/office/drawing/2014/main" id="{E600249E-55F0-D4F4-8243-08DB1DE8F9FC}"/>
+            </a:ext>
+          </a:extLst>
+        </p:cNvPr>
+        <p:cNvGrpSpPr/>
+        <p:nvPr/>
+      </p:nvGrpSpPr>
+      <p:grpSpPr>
+        <a:xfrm>
+          <a:off x="0" y="0"/>
+          <a:ext cx="0" cy="0"/>
+          <a:chOff x="0" y="0"/>
+          <a:chExt cx="0" cy="0"/>
+        </a:xfrm>
+      </p:grpSpPr>
+      <p:sp>
+        <p:nvSpPr>
+          <p:cNvPr id="10" name="Title 9">
+            <a:extLst>
+              <a:ext uri="{FF2B5EF4-FFF2-40B4-BE49-F238E27FC236}">
+                <a16:creationId xmlns:a16="http://schemas.microsoft.com/office/drawing/2014/main" id="{F1195B24-805F-F543-9F71-14414F654394}"/>
+              </a:ext>
+            </a:extLst>
+          </p:cNvPr>
+          <p:cNvSpPr>
+            <a:spLocks noGrp="1"/>
+          </p:cNvSpPr>
+          <p:nvPr>
+            <p:ph type="title"/>
+          </p:nvPr>
+        </p:nvSpPr>
+        <p:spPr>
+          <a:xfrm>
+            <a:off x="457200" y="234751"/>
+            <a:ext cx="7886700" cy="994172"/>
+          </a:xfrm>
+        </p:spPr>
+        <p:txBody>
+          <a:bodyPr>
+            <a:noAutofit/>
+          </a:bodyPr>
+          <a:lstStyle/>
+          <a:p>
+            <a:r>
+              <a:rPr lang="en-US" sz="3200" b="1" dirty="0">
+                <a:solidFill>
+                  <a:srgbClr val="171C8C"/>
+                </a:solidFill>
+                <a:latin typeface="Arial" panose="020B0604020202020204" pitchFamily="34" charset="0"/>
+                <a:cs typeface="Arial" panose="020B0604020202020204" pitchFamily="34" charset="0"/>
+              </a:rPr>
+              <a:t>Updated Gradients: Cell-to-BM Force</a:t>
+            </a:r>
+          </a:p>
+        </p:txBody>
+      </p:sp>
+      <p:cxnSp>
+        <p:nvCxnSpPr>
+          <p:cNvPr id="5" name="Straight Connector 4">
+            <a:extLst>
+              <a:ext uri="{FF2B5EF4-FFF2-40B4-BE49-F238E27FC236}">
+                <a16:creationId xmlns:a16="http://schemas.microsoft.com/office/drawing/2014/main" id="{200BC0DA-28EB-5AAB-68E0-F25A89274750}"/>
+              </a:ext>
+            </a:extLst>
+          </p:cNvPr>
+          <p:cNvCxnSpPr/>
+          <p:nvPr/>
+        </p:nvCxnSpPr>
+        <p:spPr>
+          <a:xfrm>
+            <a:off x="191528" y="1224990"/>
+            <a:ext cx="8760941" cy="0"/>
+          </a:xfrm>
+          <a:prstGeom prst="line">
+            <a:avLst/>
+          </a:prstGeom>
+          <a:ln w="38100"/>
+        </p:spPr>
+        <p:style>
+          <a:lnRef idx="1">
+            <a:schemeClr val="accent1"/>
+          </a:lnRef>
+          <a:fillRef idx="0">
+            <a:schemeClr val="accent1"/>
+          </a:fillRef>
+          <a:effectRef idx="0">
+            <a:schemeClr val="accent1"/>
+          </a:effectRef>
+          <a:fontRef idx="minor">
+            <a:schemeClr val="tx1"/>
+          </a:fontRef>
+        </p:style>
+      </p:cxnSp>
+      <p:pic>
+        <p:nvPicPr>
+          <p:cNvPr id="2" name="ProfV1">
+            <a:hlinkClick r:id="" action="ppaction://media"/>
+            <a:extLst>
+              <a:ext uri="{FF2B5EF4-FFF2-40B4-BE49-F238E27FC236}">
+                <a16:creationId xmlns:a16="http://schemas.microsoft.com/office/drawing/2014/main" id="{EAE061F9-71B3-1922-E3C2-36AE80F2524E}"/>
+              </a:ext>
+            </a:extLst>
+          </p:cNvPr>
+          <p:cNvPicPr>
+            <a:picLocks noChangeAspect="1"/>
+          </p:cNvPicPr>
+          <p:nvPr>
+            <a:videoFile r:link="rId1"/>
+            <p:extLst>
+              <p:ext uri="{DAA4B4D4-6D71-4841-9C94-3DE7FCFB9230}">
+                <p14:media xmlns:p14="http://schemas.microsoft.com/office/powerpoint/2010/main" r:embed="rId2">
+                  <p14:trim end="4728"/>
+                </p14:media>
+              </p:ext>
+            </p:extLst>
+          </p:nvPr>
+        </p:nvPicPr>
+        <p:blipFill>
+          <a:blip r:embed="rId5"/>
+          <a:srcRect l="20000" t="10596" r="24783" b="19065"/>
+          <a:stretch>
+            <a:fillRect/>
+          </a:stretch>
+        </p:blipFill>
+        <p:spPr>
+          <a:xfrm>
+            <a:off x="3294822" y="1524271"/>
+            <a:ext cx="5049078" cy="4823772"/>
+          </a:xfrm>
+          <a:prstGeom prst="rect">
+            <a:avLst/>
+          </a:prstGeom>
+        </p:spPr>
+      </p:pic>
+    </p:spTree>
+    <p:extLst>
+      <p:ext uri="{BB962C8B-B14F-4D97-AF65-F5344CB8AC3E}">
+        <p14:creationId xmlns:p14="http://schemas.microsoft.com/office/powerpoint/2010/main" val="3508636308"/>
+      </p:ext>
+    </p:extLst>
+  </p:cSld>
+  <p:clrMapOvr>
+    <a:masterClrMapping/>
+  </p:clrMapOvr>
+  <p:timing>
+    <p:tnLst>
+      <p:par>
+        <p:cTn id="1" dur="indefinite" restart="never" nodeType="tmRoot">
+          <p:childTnLst>
+            <p:seq concurrent="1" nextAc="seek">
+              <p:cTn id="2" dur="indefinite" nodeType="mainSeq">
+                <p:childTnLst>
+                  <p:par>
+                    <p:cTn id="3" fill="hold">
+                      <p:stCondLst>
+                        <p:cond delay="indefinite"/>
+                      </p:stCondLst>
+                      <p:childTnLst>
+                        <p:par>
+                          <p:cTn id="4" fill="hold">
+                            <p:stCondLst>
+                              <p:cond delay="0"/>
+                            </p:stCondLst>
+                            <p:childTnLst>
+                              <p:par>
+                                <p:cTn id="5" presetID="1" presetClass="mediacall" presetSubtype="0" fill="hold" nodeType="clickEffect">
+                                  <p:stCondLst>
+                                    <p:cond delay="0"/>
+                                  </p:stCondLst>
+                                  <p:childTnLst>
+                                    <p:cmd type="call" cmd="playFrom(0.0)">
+                                      <p:cBhvr>
+                                        <p:cTn id="6" dur="5272" fill="hold"/>
+                                        <p:tgtEl>
+                                          <p:spTgt spid="2"/>
+                                        </p:tgtEl>
+                                      </p:cBhvr>
+                                    </p:cmd>
+                                  </p:childTnLst>
+                                </p:cTn>
+                              </p:par>
+                            </p:childTnLst>
+                          </p:cTn>
+                        </p:par>
+                      </p:childTnLst>
+                    </p:cTn>
+                  </p:par>
+                </p:childTnLst>
+              </p:cTn>
+              <p:prevCondLst>
+                <p:cond evt="onPrev" delay="0">
+                  <p:tgtEl>
+                    <p:sldTgt/>
+                  </p:tgtEl>
+                </p:cond>
+              </p:prevCondLst>
+              <p:nextCondLst>
+                <p:cond evt="onNext" delay="0">
+                  <p:tgtEl>
+                    <p:sldTgt/>
+                  </p:tgtEl>
+                </p:cond>
+              </p:nextCondLst>
+            </p:seq>
+            <p:video>
+              <p:cMediaNode vol="80000">
+                <p:cTn id="7" fill="hold" display="0">
+                  <p:stCondLst>
+                    <p:cond delay="indefinite"/>
+                  </p:stCondLst>
+                </p:cTn>
+                <p:tgtEl>
+                  <p:spTgt spid="2"/>
+                </p:tgtEl>
+              </p:cMediaNode>
+            </p:video>
+            <p:seq concurrent="1" nextAc="seek">
+              <p:cTn id="8" restart="whenNotActive" fill="hold" evtFilter="cancelBubble" nodeType="interactiveSeq">
+                <p:stCondLst>
+                  <p:cond evt="onClick" delay="0">
+                    <p:tgtEl>
+                      <p:spTgt spid="2"/>
+                    </p:tgtEl>
+                  </p:cond>
+                </p:stCondLst>
+                <p:endSync evt="end" delay="0">
+                  <p:rtn val="all"/>
+                </p:endSync>
+                <p:childTnLst>
+                  <p:par>
+                    <p:cTn id="9" fill="hold">
+                      <p:stCondLst>
+                        <p:cond delay="0"/>
+                      </p:stCondLst>
+                      <p:childTnLst>
+                        <p:par>
+                          <p:cTn id="10" fill="hold">
+                            <p:stCondLst>
+                              <p:cond delay="0"/>
+                            </p:stCondLst>
+                            <p:childTnLst>
+                              <p:par>
+                                <p:cTn id="11" presetID="2" presetClass="mediacall" presetSubtype="0" fill="hold" nodeType="clickEffect">
+                                  <p:stCondLst>
+                                    <p:cond delay="0"/>
+                                  </p:stCondLst>
+                                  <p:childTnLst>
+                                    <p:cmd type="call" cmd="togglePause">
+                                      <p:cBhvr>
+                                        <p:cTn id="12" dur="1" fill="hold"/>
+                                        <p:tgtEl>
+                                          <p:spTgt spid="2"/>
+                                        </p:tgtEl>
+                                      </p:cBhvr>
+                                    </p:cmd>
+                                  </p:childTnLst>
+                                </p:cTn>
+                              </p:par>
+                            </p:childTnLst>
+                          </p:cTn>
+                        </p:par>
+                      </p:childTnLst>
+                    </p:cTn>
+                  </p:par>
+                </p:childTnLst>
+              </p:cTn>
+              <p:nextCondLst>
+                <p:cond evt="onClick" delay="0">
+                  <p:tgtEl>
+                    <p:spTgt spid="2"/>
+                  </p:tgtEl>
+                </p:cond>
+              </p:nextCondLst>
+            </p:seq>
+          </p:childTnLst>
+        </p:cTn>
+      </p:par>
+    </p:tnLst>
+  </p:timing>
+</p:sld>
+</file>
+
+<file path=ppt/slides/slide7.xml><?xml version="1.0" encoding="utf-8"?>
+<p:sld xmlns:a="http://schemas.openxmlformats.org/drawingml/2006/main" xmlns:r="http://schemas.openxmlformats.org/officeDocument/2006/relationships" xmlns:p="http://schemas.openxmlformats.org/presentationml/2006/main">
+  <p:cSld>
+    <p:spTree>
+      <p:nvGrpSpPr>
+        <p:cNvPr id="1" name="">
+          <a:extLst>
+            <a:ext uri="{FF2B5EF4-FFF2-40B4-BE49-F238E27FC236}">
+              <a16:creationId xmlns:a16="http://schemas.microsoft.com/office/drawing/2014/main" id="{D2D1A48A-8F25-B2AB-40D5-620262D66B20}"/>
+            </a:ext>
+          </a:extLst>
+        </p:cNvPr>
+        <p:cNvGrpSpPr/>
+        <p:nvPr/>
+      </p:nvGrpSpPr>
+      <p:grpSpPr>
+        <a:xfrm>
+          <a:off x="0" y="0"/>
+          <a:ext cx="0" cy="0"/>
+          <a:chOff x="0" y="0"/>
+          <a:chExt cx="0" cy="0"/>
+        </a:xfrm>
+      </p:grpSpPr>
+      <p:sp>
+        <p:nvSpPr>
+          <p:cNvPr id="10" name="Title 9">
+            <a:extLst>
+              <a:ext uri="{FF2B5EF4-FFF2-40B4-BE49-F238E27FC236}">
+                <a16:creationId xmlns:a16="http://schemas.microsoft.com/office/drawing/2014/main" id="{1C95EC67-C641-5091-7EC0-DA15C688D1F3}"/>
+              </a:ext>
+            </a:extLst>
+          </p:cNvPr>
+          <p:cNvSpPr>
+            <a:spLocks noGrp="1"/>
+          </p:cNvSpPr>
+          <p:nvPr>
+            <p:ph type="title"/>
+          </p:nvPr>
+        </p:nvSpPr>
+        <p:spPr>
+          <a:xfrm>
+            <a:off x="457200" y="234751"/>
+            <a:ext cx="7886700" cy="994172"/>
+          </a:xfrm>
+        </p:spPr>
+        <p:txBody>
+          <a:bodyPr>
+            <a:noAutofit/>
+          </a:bodyPr>
+          <a:lstStyle/>
+          <a:p>
+            <a:r>
+              <a:rPr lang="en-US" sz="3200" b="1" dirty="0">
+                <a:solidFill>
+                  <a:srgbClr val="171C8C"/>
+                </a:solidFill>
+                <a:latin typeface="Arial" panose="020B0604020202020204" pitchFamily="34" charset="0"/>
+                <a:cs typeface="Arial" panose="020B0604020202020204" pitchFamily="34" charset="0"/>
+              </a:rPr>
+              <a:t>Updated Gradients: Cell-to-BM Force</a:t>
+            </a:r>
+          </a:p>
+        </p:txBody>
+      </p:sp>
+      <p:cxnSp>
+        <p:nvCxnSpPr>
+          <p:cNvPr id="5" name="Straight Connector 4">
+            <a:extLst>
+              <a:ext uri="{FF2B5EF4-FFF2-40B4-BE49-F238E27FC236}">
+                <a16:creationId xmlns:a16="http://schemas.microsoft.com/office/drawing/2014/main" id="{6161F00D-CD6D-1275-3333-ED17AE5260BC}"/>
+              </a:ext>
+            </a:extLst>
+          </p:cNvPr>
+          <p:cNvCxnSpPr/>
+          <p:nvPr/>
+        </p:nvCxnSpPr>
+        <p:spPr>
+          <a:xfrm>
+            <a:off x="191528" y="1224990"/>
+            <a:ext cx="8760941" cy="0"/>
+          </a:xfrm>
+          <a:prstGeom prst="line">
+            <a:avLst/>
+          </a:prstGeom>
+          <a:ln w="38100"/>
+        </p:spPr>
+        <p:style>
+          <a:lnRef idx="1">
+            <a:schemeClr val="accent1"/>
+          </a:lnRef>
+          <a:fillRef idx="0">
+            <a:schemeClr val="accent1"/>
+          </a:fillRef>
+          <a:effectRef idx="0">
+            <a:schemeClr val="accent1"/>
+          </a:effectRef>
+          <a:fontRef idx="minor">
+            <a:schemeClr val="tx1"/>
+          </a:fontRef>
+        </p:style>
+      </p:cxnSp>
+      <p:pic>
+        <p:nvPicPr>
+          <p:cNvPr id="2" name="ProfV2">
+            <a:hlinkClick r:id="" action="ppaction://media"/>
+            <a:extLst>
+              <a:ext uri="{FF2B5EF4-FFF2-40B4-BE49-F238E27FC236}">
+                <a16:creationId xmlns:a16="http://schemas.microsoft.com/office/drawing/2014/main" id="{7F3EBCE1-E456-5B26-CDEA-FF5E9A425568}"/>
+              </a:ext>
+            </a:extLst>
+          </p:cNvPr>
+          <p:cNvPicPr>
+            <a:picLocks noChangeAspect="1"/>
+          </p:cNvPicPr>
+          <p:nvPr>
+            <a:videoFile r:link="rId2"/>
+            <p:extLst>
+              <p:ext uri="{DAA4B4D4-6D71-4841-9C94-3DE7FCFB9230}">
+                <p14:media xmlns:p14="http://schemas.microsoft.com/office/powerpoint/2010/main" r:embed="rId1"/>
+              </p:ext>
+            </p:extLst>
+          </p:nvPr>
+        </p:nvPicPr>
+        <p:blipFill>
+          <a:blip r:embed="rId5"/>
+          <a:srcRect l="19062" t="10927" r="26010" b="18735"/>
+          <a:stretch>
+            <a:fillRect/>
+          </a:stretch>
+        </p:blipFill>
+        <p:spPr>
+          <a:xfrm>
+            <a:off x="3321325" y="1537252"/>
+            <a:ext cx="5022575" cy="4823792"/>
+          </a:xfrm>
+          <a:prstGeom prst="rect">
+            <a:avLst/>
+          </a:prstGeom>
+        </p:spPr>
+      </p:pic>
+    </p:spTree>
+    <p:extLst>
+      <p:ext uri="{BB962C8B-B14F-4D97-AF65-F5344CB8AC3E}">
+        <p14:creationId xmlns:p14="http://schemas.microsoft.com/office/powerpoint/2010/main" val="1276417643"/>
+      </p:ext>
+    </p:extLst>
+  </p:cSld>
+  <p:clrMapOvr>
+    <a:masterClrMapping/>
+  </p:clrMapOvr>
+  <p:timing>
+    <p:tnLst>
+      <p:par>
+        <p:cTn id="1" dur="indefinite" restart="never" nodeType="tmRoot">
+          <p:childTnLst>
+            <p:seq concurrent="1" nextAc="seek">
+              <p:cTn id="2" dur="indefinite" nodeType="mainSeq">
+                <p:childTnLst>
+                  <p:par>
+                    <p:cTn id="3" fill="hold">
+                      <p:stCondLst>
+                        <p:cond delay="indefinite"/>
+                      </p:stCondLst>
+                      <p:childTnLst>
+                        <p:par>
+                          <p:cTn id="4" fill="hold">
+                            <p:stCondLst>
+                              <p:cond delay="0"/>
+                            </p:stCondLst>
+                            <p:childTnLst>
+                              <p:par>
+                                <p:cTn id="5" presetID="1" presetClass="mediacall" presetSubtype="0" fill="hold" nodeType="clickEffect">
+                                  <p:stCondLst>
+                                    <p:cond delay="0"/>
+                                  </p:stCondLst>
+                                  <p:childTnLst>
+                                    <p:cmd type="call" cmd="playFrom(0.0)">
+                                      <p:cBhvr>
+                                        <p:cTn id="6" dur="5700" fill="hold"/>
+                                        <p:tgtEl>
+                                          <p:spTgt spid="2"/>
+                                        </p:tgtEl>
+                                      </p:cBhvr>
+                                    </p:cmd>
+                                  </p:childTnLst>
+                                </p:cTn>
+                              </p:par>
+                            </p:childTnLst>
+                          </p:cTn>
+                        </p:par>
+                      </p:childTnLst>
+                    </p:cTn>
+                  </p:par>
+                </p:childTnLst>
+              </p:cTn>
+              <p:prevCondLst>
+                <p:cond evt="onPrev" delay="0">
+                  <p:tgtEl>
+                    <p:sldTgt/>
+                  </p:tgtEl>
+                </p:cond>
+              </p:prevCondLst>
+              <p:nextCondLst>
+                <p:cond evt="onNext" delay="0">
+                  <p:tgtEl>
+                    <p:sldTgt/>
+                  </p:tgtEl>
+                </p:cond>
+              </p:nextCondLst>
+            </p:seq>
+            <p:video>
+              <p:cMediaNode vol="80000">
+                <p:cTn id="7" fill="hold" display="0">
+                  <p:stCondLst>
+                    <p:cond delay="indefinite"/>
+                  </p:stCondLst>
+                </p:cTn>
+                <p:tgtEl>
+                  <p:spTgt spid="2"/>
+                </p:tgtEl>
+              </p:cMediaNode>
+            </p:video>
+            <p:seq concurrent="1" nextAc="seek">
+              <p:cTn id="8" restart="whenNotActive" fill="hold" evtFilter="cancelBubble" nodeType="interactiveSeq">
+                <p:stCondLst>
+                  <p:cond evt="onClick" delay="0">
+                    <p:tgtEl>
+                      <p:spTgt spid="2"/>
+                    </p:tgtEl>
+                  </p:cond>
+                </p:stCondLst>
+                <p:endSync evt="end" delay="0">
+                  <p:rtn val="all"/>
+                </p:endSync>
+                <p:childTnLst>
+                  <p:par>
+                    <p:cTn id="9" fill="hold">
+                      <p:stCondLst>
+                        <p:cond delay="0"/>
+                      </p:stCondLst>
+                      <p:childTnLst>
+                        <p:par>
+                          <p:cTn id="10" fill="hold">
+                            <p:stCondLst>
+                              <p:cond delay="0"/>
+                            </p:stCondLst>
+                            <p:childTnLst>
+                              <p:par>
+                                <p:cTn id="11" presetID="2" presetClass="mediacall" presetSubtype="0" fill="hold" nodeType="clickEffect">
+                                  <p:stCondLst>
+                                    <p:cond delay="0"/>
+                                  </p:stCondLst>
+                                  <p:childTnLst>
+                                    <p:cmd type="call" cmd="togglePause">
+                                      <p:cBhvr>
+                                        <p:cTn id="12" dur="1" fill="hold"/>
+                                        <p:tgtEl>
+                                          <p:spTgt spid="2"/>
+                                        </p:tgtEl>
+                                      </p:cBhvr>
+                                    </p:cmd>
+                                  </p:childTnLst>
+                                </p:cTn>
+                              </p:par>
+                            </p:childTnLst>
+                          </p:cTn>
+                        </p:par>
+                      </p:childTnLst>
+                    </p:cTn>
+                  </p:par>
+                </p:childTnLst>
+              </p:cTn>
+              <p:nextCondLst>
+                <p:cond evt="onClick" delay="0">
+                  <p:tgtEl>
+                    <p:spTgt spid="2"/>
+                  </p:tgtEl>
+                </p:cond>
+              </p:nextCondLst>
+            </p:seq>
+          </p:childTnLst>
+        </p:cTn>
+      </p:par>
+    </p:tnLst>
+  </p:timing>
+</p:sld>
+</file>
+
+<file path=ppt/slides/slide8.xml><?xml version="1.0" encoding="utf-8"?>
+<p:sld xmlns:a="http://schemas.openxmlformats.org/drawingml/2006/main" xmlns:r="http://schemas.openxmlformats.org/officeDocument/2006/relationships" xmlns:p="http://schemas.openxmlformats.org/presentationml/2006/main">
+  <p:cSld>
+    <p:spTree>
+      <p:nvGrpSpPr>
+        <p:cNvPr id="1" name=""/>
+        <p:cNvGrpSpPr/>
+        <p:nvPr/>
+      </p:nvGrpSpPr>
+      <p:grpSpPr>
+        <a:xfrm>
+          <a:off x="0" y="0"/>
+          <a:ext cx="0" cy="0"/>
+          <a:chOff x="0" y="0"/>
+          <a:chExt cx="0" cy="0"/>
+        </a:xfrm>
+      </p:grpSpPr>
+      <p:sp>
+        <p:nvSpPr>
+          <p:cNvPr id="2" name="Title 1">
+            <a:extLst>
+              <a:ext uri="{FF2B5EF4-FFF2-40B4-BE49-F238E27FC236}">
+                <a16:creationId xmlns:a16="http://schemas.microsoft.com/office/drawing/2014/main" id="{61247D2F-DC91-11B4-5993-497BDCA33C68}"/>
+              </a:ext>
+            </a:extLst>
+          </p:cNvPr>
+          <p:cNvSpPr>
+            <a:spLocks noGrp="1"/>
+          </p:cNvSpPr>
+          <p:nvPr>
+            <p:ph type="title"/>
+          </p:nvPr>
+        </p:nvSpPr>
+        <p:spPr/>
+        <p:txBody>
+          <a:bodyPr/>
+          <a:lstStyle/>
+          <a:p>
+            <a:endParaRPr lang="en-US"/>
+          </a:p>
+        </p:txBody>
+      </p:sp>
+      <p:pic>
+        <p:nvPicPr>
+          <p:cNvPr id="9" name="Content Placeholder 8">
+            <a:extLst>
+              <a:ext uri="{FF2B5EF4-FFF2-40B4-BE49-F238E27FC236}">
+                <a16:creationId xmlns:a16="http://schemas.microsoft.com/office/drawing/2014/main" id="{67263619-A7F9-AA59-69A5-0D9A55E3299B}"/>
+              </a:ext>
+            </a:extLst>
+          </p:cNvPr>
+          <p:cNvPicPr>
+            <a:picLocks noGrp="1" noChangeAspect="1"/>
+          </p:cNvPicPr>
+          <p:nvPr>
+            <p:ph idx="1"/>
+          </p:nvPr>
+        </p:nvPicPr>
+        <p:blipFill>
+          <a:blip r:embed="rId2"/>
+          <a:stretch>
+            <a:fillRect/>
+          </a:stretch>
+        </p:blipFill>
+        <p:spPr>
+          <a:xfrm>
+            <a:off x="457200" y="1772863"/>
+            <a:ext cx="8229600" cy="4180636"/>
+          </a:xfrm>
+        </p:spPr>
+      </p:pic>
+    </p:spTree>
+    <p:extLst>
+      <p:ext uri="{BB962C8B-B14F-4D97-AF65-F5344CB8AC3E}">
+        <p14:creationId xmlns:p14="http://schemas.microsoft.com/office/powerpoint/2010/main" val="1126787470"/>
+      </p:ext>
+    </p:extLst>
+  </p:cSld>
+  <p:clrMapOvr>
+    <a:masterClrMapping/>
+  </p:clrMapOvr>
 </p:sld>
 </file>
 

</xml_diff>

<commit_message>
Reorganize code & directory
</commit_message>
<xml_diff>
--- a/Presentation/Project_Update_(8-12).pptx
+++ b/Presentation/Project_Update_(8-12).pptx
@@ -6,17 +6,12 @@
     <p:sldMasterId id="2147483674" r:id="rId2"/>
   </p:sldMasterIdLst>
   <p:notesMasterIdLst>
-    <p:notesMasterId r:id="rId11"/>
+    <p:notesMasterId r:id="rId6"/>
   </p:notesMasterIdLst>
   <p:sldIdLst>
     <p:sldId id="3588" r:id="rId3"/>
-    <p:sldId id="3593" r:id="rId4"/>
-    <p:sldId id="3617" r:id="rId5"/>
-    <p:sldId id="3618" r:id="rId6"/>
-    <p:sldId id="3621" r:id="rId7"/>
-    <p:sldId id="3619" r:id="rId8"/>
-    <p:sldId id="3620" r:id="rId9"/>
-    <p:sldId id="3622" r:id="rId10"/>
+    <p:sldId id="3620" r:id="rId4"/>
+    <p:sldId id="3621" r:id="rId5"/>
   </p:sldIdLst>
   <p:sldSz cx="9144000" cy="6858000" type="screen4x3"/>
   <p:notesSz cx="6858000" cy="9144000"/>
@@ -205,7 +200,7 @@
           <a:p>
             <a:fld id="{42297E26-78EB-8B41-8DC9-A0EBC93E0939}" type="datetimeFigureOut">
               <a:rPr lang="en-US" smtClean="0"/>
-              <a:t>8/20/2025</a:t>
+              <a:t>9/5/2025</a:t>
             </a:fld>
             <a:endParaRPr lang="en-US"/>
           </a:p>
@@ -575,7 +570,7 @@
         <p:cNvPr id="1" name="">
           <a:extLst>
             <a:ext uri="{FF2B5EF4-FFF2-40B4-BE49-F238E27FC236}">
-              <a16:creationId xmlns:a16="http://schemas.microsoft.com/office/drawing/2014/main" id="{6FFE40E4-A9C2-797F-41E3-A38DEFA90D56}"/>
+              <a16:creationId xmlns:a16="http://schemas.microsoft.com/office/drawing/2014/main" id="{48979CB3-A21A-DE50-0904-6AA80D8C2B2C}"/>
             </a:ext>
           </a:extLst>
         </p:cNvPr>
@@ -595,7 +590,7 @@
           <p:cNvPr id="2" name="Slide Image Placeholder 1">
             <a:extLst>
               <a:ext uri="{FF2B5EF4-FFF2-40B4-BE49-F238E27FC236}">
-                <a16:creationId xmlns:a16="http://schemas.microsoft.com/office/drawing/2014/main" id="{C79A7236-0BEC-0071-66BE-3FEF19AC6F38}"/>
+                <a16:creationId xmlns:a16="http://schemas.microsoft.com/office/drawing/2014/main" id="{B8EF8597-08D6-674A-D533-50F013ADF1AE}"/>
               </a:ext>
             </a:extLst>
           </p:cNvPr>
@@ -613,7 +608,7 @@
           <p:cNvPr id="3" name="Notes Placeholder 2">
             <a:extLst>
               <a:ext uri="{FF2B5EF4-FFF2-40B4-BE49-F238E27FC236}">
-                <a16:creationId xmlns:a16="http://schemas.microsoft.com/office/drawing/2014/main" id="{65ADF69B-A154-0205-8E11-ECBD89250411}"/>
+                <a16:creationId xmlns:a16="http://schemas.microsoft.com/office/drawing/2014/main" id="{4A02F682-F949-EFC3-C6B2-20CF0E2DF4F5}"/>
               </a:ext>
             </a:extLst>
           </p:cNvPr>
@@ -863,7 +858,7 @@
           <p:cNvPr id="4" name="Slide Number Placeholder 3">
             <a:extLst>
               <a:ext uri="{FF2B5EF4-FFF2-40B4-BE49-F238E27FC236}">
-                <a16:creationId xmlns:a16="http://schemas.microsoft.com/office/drawing/2014/main" id="{CE5A314A-4355-DAD8-D642-7F31D255D914}"/>
+                <a16:creationId xmlns:a16="http://schemas.microsoft.com/office/drawing/2014/main" id="{5BC16D41-3CD0-2053-0DDC-56987738770A}"/>
               </a:ext>
             </a:extLst>
           </p:cNvPr>
@@ -890,7 +885,7 @@
     </p:spTree>
     <p:extLst>
       <p:ext uri="{BB962C8B-B14F-4D97-AF65-F5344CB8AC3E}">
-        <p14:creationId xmlns:p14="http://schemas.microsoft.com/office/powerpoint/2010/main" val="380097560"/>
+        <p14:creationId xmlns:p14="http://schemas.microsoft.com/office/powerpoint/2010/main" val="926004251"/>
       </p:ext>
     </p:extLst>
   </p:cSld>
@@ -901,1005 +896,6 @@
 </file>
 
 <file path=ppt/notesSlides/notesSlide3.xml><?xml version="1.0" encoding="utf-8"?>
-<p:notes xmlns:a="http://schemas.openxmlformats.org/drawingml/2006/main" xmlns:r="http://schemas.openxmlformats.org/officeDocument/2006/relationships" xmlns:p="http://schemas.openxmlformats.org/presentationml/2006/main">
-  <p:cSld>
-    <p:spTree>
-      <p:nvGrpSpPr>
-        <p:cNvPr id="1" name="">
-          <a:extLst>
-            <a:ext uri="{FF2B5EF4-FFF2-40B4-BE49-F238E27FC236}">
-              <a16:creationId xmlns:a16="http://schemas.microsoft.com/office/drawing/2014/main" id="{649C2ACC-79C5-EF53-C92C-9C41D0C8960D}"/>
-            </a:ext>
-          </a:extLst>
-        </p:cNvPr>
-        <p:cNvGrpSpPr/>
-        <p:nvPr/>
-      </p:nvGrpSpPr>
-      <p:grpSpPr>
-        <a:xfrm>
-          <a:off x="0" y="0"/>
-          <a:ext cx="0" cy="0"/>
-          <a:chOff x="0" y="0"/>
-          <a:chExt cx="0" cy="0"/>
-        </a:xfrm>
-      </p:grpSpPr>
-      <p:sp>
-        <p:nvSpPr>
-          <p:cNvPr id="2" name="Slide Image Placeholder 1">
-            <a:extLst>
-              <a:ext uri="{FF2B5EF4-FFF2-40B4-BE49-F238E27FC236}">
-                <a16:creationId xmlns:a16="http://schemas.microsoft.com/office/drawing/2014/main" id="{7E29F928-EE96-2071-2B3F-A7E92D88CB69}"/>
-              </a:ext>
-            </a:extLst>
-          </p:cNvPr>
-          <p:cNvSpPr>
-            <a:spLocks noGrp="1" noRot="1" noChangeAspect="1"/>
-          </p:cNvSpPr>
-          <p:nvPr>
-            <p:ph type="sldImg"/>
-          </p:nvPr>
-        </p:nvSpPr>
-        <p:spPr/>
-      </p:sp>
-      <p:sp>
-        <p:nvSpPr>
-          <p:cNvPr id="3" name="Notes Placeholder 2">
-            <a:extLst>
-              <a:ext uri="{FF2B5EF4-FFF2-40B4-BE49-F238E27FC236}">
-                <a16:creationId xmlns:a16="http://schemas.microsoft.com/office/drawing/2014/main" id="{5666E213-BFE1-BD45-5A3B-16C5DAB63DEA}"/>
-              </a:ext>
-            </a:extLst>
-          </p:cNvPr>
-          <p:cNvSpPr>
-            <a:spLocks noGrp="1"/>
-          </p:cNvSpPr>
-          <p:nvPr>
-            <p:ph type="body" idx="1"/>
-          </p:nvPr>
-        </p:nvSpPr>
-        <p:spPr/>
-        <p:txBody>
-          <a:bodyPr/>
-          <a:lstStyle/>
-          <a:p>
-            <a:pPr marL="0" marR="0" lvl="0" indent="0" algn="l" defTabSz="914400" rtl="0" eaLnBrk="1" fontAlgn="auto" latinLnBrk="0" hangingPunct="1">
-              <a:lnSpc>
-                <a:spcPct val="100000"/>
-              </a:lnSpc>
-              <a:spcBef>
-                <a:spcPts val="0"/>
-              </a:spcBef>
-              <a:spcAft>
-                <a:spcPts val="0"/>
-              </a:spcAft>
-              <a:buClrTx/>
-              <a:buSzTx/>
-              <a:buFontTx/>
-              <a:buNone/>
-              <a:tabLst/>
-              <a:defRPr/>
-            </a:pPr>
-            <a:r>
-              <a:rPr lang="en-US" dirty="0"/>
-              <a:t>Pancreatic Ductal Adenocarcinoma is the most common subtype of pancreatic cancer, constituting about 90% of all pancreatic cancer. PDAC is the third leading cause of cancer-related deaths in the U.S., with a 5-year survival rate of only 13.3%. It is also known to have extremely poor prognosis, with nearly 90% of tumors already metastasized at diagnosis. </a:t>
-            </a:r>
-          </a:p>
-          <a:p>
-            <a:pPr marL="0" marR="0" lvl="0" indent="0" algn="l" defTabSz="914400" rtl="0" eaLnBrk="1" fontAlgn="auto" latinLnBrk="0" hangingPunct="1">
-              <a:lnSpc>
-                <a:spcPct val="100000"/>
-              </a:lnSpc>
-              <a:spcBef>
-                <a:spcPts val="0"/>
-              </a:spcBef>
-              <a:spcAft>
-                <a:spcPts val="0"/>
-              </a:spcAft>
-              <a:buClrTx/>
-              <a:buSzTx/>
-              <a:buFontTx/>
-              <a:buNone/>
-              <a:tabLst/>
-              <a:defRPr/>
-            </a:pPr>
-            <a:endParaRPr lang="en-US" dirty="0"/>
-          </a:p>
-          <a:p>
-            <a:pPr marL="0" marR="0" lvl="0" indent="0" algn="l" defTabSz="914400" rtl="0" eaLnBrk="1" fontAlgn="auto" latinLnBrk="0" hangingPunct="1">
-              <a:lnSpc>
-                <a:spcPct val="100000"/>
-              </a:lnSpc>
-              <a:spcBef>
-                <a:spcPts val="0"/>
-              </a:spcBef>
-              <a:spcAft>
-                <a:spcPts val="0"/>
-              </a:spcAft>
-              <a:buClrTx/>
-              <a:buSzTx/>
-              <a:buFontTx/>
-              <a:buNone/>
-              <a:tabLst/>
-              <a:defRPr/>
-            </a:pPr>
-            <a:endParaRPr lang="en-US" dirty="0"/>
-          </a:p>
-          <a:p>
-            <a:pPr marL="0" marR="0" lvl="0" indent="0" algn="l" defTabSz="914400" rtl="0" eaLnBrk="1" fontAlgn="auto" latinLnBrk="0" hangingPunct="1">
-              <a:lnSpc>
-                <a:spcPct val="100000"/>
-              </a:lnSpc>
-              <a:spcBef>
-                <a:spcPts val="0"/>
-              </a:spcBef>
-              <a:spcAft>
-                <a:spcPts val="0"/>
-              </a:spcAft>
-              <a:buClrTx/>
-              <a:buSzTx/>
-              <a:buFontTx/>
-              <a:buNone/>
-              <a:tabLst/>
-              <a:defRPr/>
-            </a:pPr>
-            <a:endParaRPr lang="en-US" dirty="0"/>
-          </a:p>
-          <a:p>
-            <a:pPr marL="0" marR="0" lvl="0" indent="0" algn="l" defTabSz="914400" rtl="0" eaLnBrk="1" fontAlgn="auto" latinLnBrk="0" hangingPunct="1">
-              <a:lnSpc>
-                <a:spcPct val="100000"/>
-              </a:lnSpc>
-              <a:spcBef>
-                <a:spcPts val="0"/>
-              </a:spcBef>
-              <a:spcAft>
-                <a:spcPts val="0"/>
-              </a:spcAft>
-              <a:buClrTx/>
-              <a:buSzTx/>
-              <a:buFontTx/>
-              <a:buNone/>
-              <a:tabLst/>
-              <a:defRPr/>
-            </a:pPr>
-            <a:endParaRPr lang="en-US" dirty="0"/>
-          </a:p>
-          <a:p>
-            <a:pPr marL="0" marR="0" lvl="0" indent="0" algn="l" defTabSz="914400" rtl="0" eaLnBrk="1" fontAlgn="auto" latinLnBrk="0" hangingPunct="1">
-              <a:lnSpc>
-                <a:spcPct val="100000"/>
-              </a:lnSpc>
-              <a:spcBef>
-                <a:spcPts val="0"/>
-              </a:spcBef>
-              <a:spcAft>
-                <a:spcPts val="0"/>
-              </a:spcAft>
-              <a:buClrTx/>
-              <a:buSzTx/>
-              <a:buFontTx/>
-              <a:buNone/>
-              <a:tabLst/>
-              <a:defRPr/>
-            </a:pPr>
-            <a:r>
-              <a:rPr lang="en-US" dirty="0"/>
-              <a:t>PDAC begins in the epithelial cells lining the pancreatic ducts, which are normally responsible for regulating secretion of digestive enzymes into the small intestine. In PDAC, these cells acquire mutations that cause them to proliferate uncontrollably and eventually rupture the ductal membrane. After spreading into the stroma, cancer-associated fibroblasts develop dense networks of collogen fibers, known as desmoplasia, around the previous pancreatic ducts. This creates almost like a shield around the tumor, protecting it from immune attack and drug penetration. </a:t>
-            </a:r>
-          </a:p>
-          <a:p>
-            <a:pPr marL="0" marR="0" lvl="0" indent="0" algn="l" defTabSz="914400" rtl="0" eaLnBrk="1" fontAlgn="auto" latinLnBrk="0" hangingPunct="1">
-              <a:lnSpc>
-                <a:spcPct val="100000"/>
-              </a:lnSpc>
-              <a:spcBef>
-                <a:spcPts val="0"/>
-              </a:spcBef>
-              <a:spcAft>
-                <a:spcPts val="0"/>
-              </a:spcAft>
-              <a:buClrTx/>
-              <a:buSzTx/>
-              <a:buFontTx/>
-              <a:buNone/>
-              <a:tabLst/>
-              <a:defRPr/>
-            </a:pPr>
-            <a:endParaRPr lang="en-US" dirty="0"/>
-          </a:p>
-          <a:p>
-            <a:pPr marL="0" marR="0" lvl="0" indent="0" algn="l" defTabSz="914400" rtl="0" eaLnBrk="1" fontAlgn="auto" latinLnBrk="0" hangingPunct="1">
-              <a:lnSpc>
-                <a:spcPct val="100000"/>
-              </a:lnSpc>
-              <a:spcBef>
-                <a:spcPts val="0"/>
-              </a:spcBef>
-              <a:spcAft>
-                <a:spcPts val="0"/>
-              </a:spcAft>
-              <a:buClrTx/>
-              <a:buSzTx/>
-              <a:buFontTx/>
-              <a:buNone/>
-              <a:tabLst/>
-              <a:defRPr/>
-            </a:pPr>
-            <a:r>
-              <a:rPr lang="en-US" dirty="0"/>
-              <a:t>Pancreatic ductal adenocarcinoma is the most common subtype of pancreatic cancer, with a 5 year survival rate of only 13%. The low survival rate is thought to be due to multiple challenges to treatment such as the difficulty of detecting PDAC before it has metastasized. (add graphic) A hallmark of PDAC is what’s called a “desmoplastic” tumor microenvironment. Compared to healthy tissue on the left, PDAC on the right has masses of cell growth in places that used to be healthy ducts, and is infiltrated by a greater diversity of immune and stromal cells while being crisscrossed and encapsulated in this network of collagen fibers, which are deposited by cancer-associated fibroblasts. </a:t>
-            </a:r>
-            <a:r>
-              <a:rPr lang="en-US" sz="1200" dirty="0"/>
-              <a:t>The dense fibrotic network of collagen is referred to as desmoplasia and is seen in certain types of tumors.</a:t>
-            </a:r>
-            <a:endParaRPr lang="en-US" dirty="0"/>
-          </a:p>
-          <a:p>
-            <a:pPr marL="0" marR="0" lvl="0" indent="0" algn="l" defTabSz="914400" rtl="0" eaLnBrk="1" fontAlgn="auto" latinLnBrk="0" hangingPunct="1">
-              <a:lnSpc>
-                <a:spcPct val="100000"/>
-              </a:lnSpc>
-              <a:spcBef>
-                <a:spcPts val="0"/>
-              </a:spcBef>
-              <a:spcAft>
-                <a:spcPts val="0"/>
-              </a:spcAft>
-              <a:buClrTx/>
-              <a:buSzTx/>
-              <a:buFontTx/>
-              <a:buNone/>
-              <a:tabLst/>
-              <a:defRPr/>
-            </a:pPr>
-            <a:endParaRPr lang="en-US" dirty="0"/>
-          </a:p>
-          <a:p>
-            <a:pPr marL="0" marR="0" lvl="0" indent="0" algn="l" defTabSz="914400" rtl="0" eaLnBrk="1" fontAlgn="auto" latinLnBrk="0" hangingPunct="1">
-              <a:lnSpc>
-                <a:spcPct val="100000"/>
-              </a:lnSpc>
-              <a:spcBef>
-                <a:spcPts val="0"/>
-              </a:spcBef>
-              <a:spcAft>
-                <a:spcPts val="0"/>
-              </a:spcAft>
-              <a:buClrTx/>
-              <a:buSzTx/>
-              <a:buFontTx/>
-              <a:buNone/>
-              <a:tabLst/>
-              <a:defRPr/>
-            </a:pPr>
-            <a:r>
-              <a:rPr lang="en-US" dirty="0"/>
-              <a:t>Those immune cells that are found in this microenvironment are often suppressive such as T regulatory cells and suppressive macrophages. Some of the immune cells are “residents” that were probably there in the healthy tissue, but others are recruited from the periphery (</a:t>
-            </a:r>
-            <a:r>
-              <a:rPr lang="en-US" dirty="0" err="1"/>
-              <a:t>BM+blood</a:t>
-            </a:r>
-            <a:r>
-              <a:rPr lang="en-US" dirty="0"/>
-              <a:t>)</a:t>
-            </a:r>
-          </a:p>
-          <a:p>
-            <a:endParaRPr lang="en-US" dirty="0"/>
-          </a:p>
-        </p:txBody>
-      </p:sp>
-      <p:sp>
-        <p:nvSpPr>
-          <p:cNvPr id="4" name="Slide Number Placeholder 3">
-            <a:extLst>
-              <a:ext uri="{FF2B5EF4-FFF2-40B4-BE49-F238E27FC236}">
-                <a16:creationId xmlns:a16="http://schemas.microsoft.com/office/drawing/2014/main" id="{6703A737-37C9-2788-B6B1-D3EBB0A93579}"/>
-              </a:ext>
-            </a:extLst>
-          </p:cNvPr>
-          <p:cNvSpPr>
-            <a:spLocks noGrp="1"/>
-          </p:cNvSpPr>
-          <p:nvPr>
-            <p:ph type="sldNum" sz="quarter" idx="5"/>
-          </p:nvPr>
-        </p:nvSpPr>
-        <p:spPr/>
-        <p:txBody>
-          <a:bodyPr/>
-          <a:lstStyle/>
-          <a:p>
-            <a:fld id="{B314B106-72D9-394B-AE7F-13630EA62899}" type="slidenum">
-              <a:rPr lang="en-US" smtClean="0"/>
-              <a:t>3</a:t>
-            </a:fld>
-            <a:endParaRPr lang="en-US"/>
-          </a:p>
-        </p:txBody>
-      </p:sp>
-    </p:spTree>
-    <p:extLst>
-      <p:ext uri="{BB962C8B-B14F-4D97-AF65-F5344CB8AC3E}">
-        <p14:creationId xmlns:p14="http://schemas.microsoft.com/office/powerpoint/2010/main" val="3902385321"/>
-      </p:ext>
-    </p:extLst>
-  </p:cSld>
-  <p:clrMapOvr>
-    <a:masterClrMapping/>
-  </p:clrMapOvr>
-</p:notes>
-</file>
-
-<file path=ppt/notesSlides/notesSlide4.xml><?xml version="1.0" encoding="utf-8"?>
-<p:notes xmlns:a="http://schemas.openxmlformats.org/drawingml/2006/main" xmlns:r="http://schemas.openxmlformats.org/officeDocument/2006/relationships" xmlns:p="http://schemas.openxmlformats.org/presentationml/2006/main">
-  <p:cSld>
-    <p:spTree>
-      <p:nvGrpSpPr>
-        <p:cNvPr id="1" name="">
-          <a:extLst>
-            <a:ext uri="{FF2B5EF4-FFF2-40B4-BE49-F238E27FC236}">
-              <a16:creationId xmlns:a16="http://schemas.microsoft.com/office/drawing/2014/main" id="{DA7DE17C-D287-E4F2-9555-B5260611FAF8}"/>
-            </a:ext>
-          </a:extLst>
-        </p:cNvPr>
-        <p:cNvGrpSpPr/>
-        <p:nvPr/>
-      </p:nvGrpSpPr>
-      <p:grpSpPr>
-        <a:xfrm>
-          <a:off x="0" y="0"/>
-          <a:ext cx="0" cy="0"/>
-          <a:chOff x="0" y="0"/>
-          <a:chExt cx="0" cy="0"/>
-        </a:xfrm>
-      </p:grpSpPr>
-      <p:sp>
-        <p:nvSpPr>
-          <p:cNvPr id="2" name="Slide Image Placeholder 1">
-            <a:extLst>
-              <a:ext uri="{FF2B5EF4-FFF2-40B4-BE49-F238E27FC236}">
-                <a16:creationId xmlns:a16="http://schemas.microsoft.com/office/drawing/2014/main" id="{EADDFC36-31DD-7A29-0F59-727D342135DC}"/>
-              </a:ext>
-            </a:extLst>
-          </p:cNvPr>
-          <p:cNvSpPr>
-            <a:spLocks noGrp="1" noRot="1" noChangeAspect="1"/>
-          </p:cNvSpPr>
-          <p:nvPr>
-            <p:ph type="sldImg"/>
-          </p:nvPr>
-        </p:nvSpPr>
-        <p:spPr/>
-      </p:sp>
-      <p:sp>
-        <p:nvSpPr>
-          <p:cNvPr id="3" name="Notes Placeholder 2">
-            <a:extLst>
-              <a:ext uri="{FF2B5EF4-FFF2-40B4-BE49-F238E27FC236}">
-                <a16:creationId xmlns:a16="http://schemas.microsoft.com/office/drawing/2014/main" id="{06AC8DC6-79BB-B129-F078-8D090C31624C}"/>
-              </a:ext>
-            </a:extLst>
-          </p:cNvPr>
-          <p:cNvSpPr>
-            <a:spLocks noGrp="1"/>
-          </p:cNvSpPr>
-          <p:nvPr>
-            <p:ph type="body" idx="1"/>
-          </p:nvPr>
-        </p:nvSpPr>
-        <p:spPr/>
-        <p:txBody>
-          <a:bodyPr/>
-          <a:lstStyle/>
-          <a:p>
-            <a:pPr marL="0" marR="0" lvl="0" indent="0" algn="l" defTabSz="914400" rtl="0" eaLnBrk="1" fontAlgn="auto" latinLnBrk="0" hangingPunct="1">
-              <a:lnSpc>
-                <a:spcPct val="100000"/>
-              </a:lnSpc>
-              <a:spcBef>
-                <a:spcPts val="0"/>
-              </a:spcBef>
-              <a:spcAft>
-                <a:spcPts val="0"/>
-              </a:spcAft>
-              <a:buClrTx/>
-              <a:buSzTx/>
-              <a:buFontTx/>
-              <a:buNone/>
-              <a:tabLst/>
-              <a:defRPr/>
-            </a:pPr>
-            <a:r>
-              <a:rPr lang="en-US" dirty="0"/>
-              <a:t>Pancreatic Ductal Adenocarcinoma is the most common subtype of pancreatic cancer, constituting about 90% of all pancreatic cancer. PDAC is the third leading cause of cancer-related deaths in the U.S., with a 5-year survival rate of only 13.3%. It is also known to have extremely poor prognosis, with nearly 90% of tumors already metastasized at diagnosis. </a:t>
-            </a:r>
-          </a:p>
-          <a:p>
-            <a:pPr marL="0" marR="0" lvl="0" indent="0" algn="l" defTabSz="914400" rtl="0" eaLnBrk="1" fontAlgn="auto" latinLnBrk="0" hangingPunct="1">
-              <a:lnSpc>
-                <a:spcPct val="100000"/>
-              </a:lnSpc>
-              <a:spcBef>
-                <a:spcPts val="0"/>
-              </a:spcBef>
-              <a:spcAft>
-                <a:spcPts val="0"/>
-              </a:spcAft>
-              <a:buClrTx/>
-              <a:buSzTx/>
-              <a:buFontTx/>
-              <a:buNone/>
-              <a:tabLst/>
-              <a:defRPr/>
-            </a:pPr>
-            <a:endParaRPr lang="en-US" dirty="0"/>
-          </a:p>
-          <a:p>
-            <a:pPr marL="0" marR="0" lvl="0" indent="0" algn="l" defTabSz="914400" rtl="0" eaLnBrk="1" fontAlgn="auto" latinLnBrk="0" hangingPunct="1">
-              <a:lnSpc>
-                <a:spcPct val="100000"/>
-              </a:lnSpc>
-              <a:spcBef>
-                <a:spcPts val="0"/>
-              </a:spcBef>
-              <a:spcAft>
-                <a:spcPts val="0"/>
-              </a:spcAft>
-              <a:buClrTx/>
-              <a:buSzTx/>
-              <a:buFontTx/>
-              <a:buNone/>
-              <a:tabLst/>
-              <a:defRPr/>
-            </a:pPr>
-            <a:endParaRPr lang="en-US" dirty="0"/>
-          </a:p>
-          <a:p>
-            <a:pPr marL="0" marR="0" lvl="0" indent="0" algn="l" defTabSz="914400" rtl="0" eaLnBrk="1" fontAlgn="auto" latinLnBrk="0" hangingPunct="1">
-              <a:lnSpc>
-                <a:spcPct val="100000"/>
-              </a:lnSpc>
-              <a:spcBef>
-                <a:spcPts val="0"/>
-              </a:spcBef>
-              <a:spcAft>
-                <a:spcPts val="0"/>
-              </a:spcAft>
-              <a:buClrTx/>
-              <a:buSzTx/>
-              <a:buFontTx/>
-              <a:buNone/>
-              <a:tabLst/>
-              <a:defRPr/>
-            </a:pPr>
-            <a:endParaRPr lang="en-US" dirty="0"/>
-          </a:p>
-          <a:p>
-            <a:pPr marL="0" marR="0" lvl="0" indent="0" algn="l" defTabSz="914400" rtl="0" eaLnBrk="1" fontAlgn="auto" latinLnBrk="0" hangingPunct="1">
-              <a:lnSpc>
-                <a:spcPct val="100000"/>
-              </a:lnSpc>
-              <a:spcBef>
-                <a:spcPts val="0"/>
-              </a:spcBef>
-              <a:spcAft>
-                <a:spcPts val="0"/>
-              </a:spcAft>
-              <a:buClrTx/>
-              <a:buSzTx/>
-              <a:buFontTx/>
-              <a:buNone/>
-              <a:tabLst/>
-              <a:defRPr/>
-            </a:pPr>
-            <a:endParaRPr lang="en-US" dirty="0"/>
-          </a:p>
-          <a:p>
-            <a:pPr marL="0" marR="0" lvl="0" indent="0" algn="l" defTabSz="914400" rtl="0" eaLnBrk="1" fontAlgn="auto" latinLnBrk="0" hangingPunct="1">
-              <a:lnSpc>
-                <a:spcPct val="100000"/>
-              </a:lnSpc>
-              <a:spcBef>
-                <a:spcPts val="0"/>
-              </a:spcBef>
-              <a:spcAft>
-                <a:spcPts val="0"/>
-              </a:spcAft>
-              <a:buClrTx/>
-              <a:buSzTx/>
-              <a:buFontTx/>
-              <a:buNone/>
-              <a:tabLst/>
-              <a:defRPr/>
-            </a:pPr>
-            <a:r>
-              <a:rPr lang="en-US" dirty="0"/>
-              <a:t>PDAC begins in the epithelial cells lining the pancreatic ducts, which are normally responsible for regulating secretion of digestive enzymes into the small intestine. In PDAC, these cells acquire mutations that cause them to proliferate uncontrollably and eventually rupture the ductal membrane. After spreading into the stroma, cancer-associated fibroblasts develop dense networks of collogen fibers, known as desmoplasia, around the previous pancreatic ducts. This creates almost like a shield around the tumor, protecting it from immune attack and drug penetration. </a:t>
-            </a:r>
-          </a:p>
-          <a:p>
-            <a:pPr marL="0" marR="0" lvl="0" indent="0" algn="l" defTabSz="914400" rtl="0" eaLnBrk="1" fontAlgn="auto" latinLnBrk="0" hangingPunct="1">
-              <a:lnSpc>
-                <a:spcPct val="100000"/>
-              </a:lnSpc>
-              <a:spcBef>
-                <a:spcPts val="0"/>
-              </a:spcBef>
-              <a:spcAft>
-                <a:spcPts val="0"/>
-              </a:spcAft>
-              <a:buClrTx/>
-              <a:buSzTx/>
-              <a:buFontTx/>
-              <a:buNone/>
-              <a:tabLst/>
-              <a:defRPr/>
-            </a:pPr>
-            <a:endParaRPr lang="en-US" dirty="0"/>
-          </a:p>
-          <a:p>
-            <a:pPr marL="0" marR="0" lvl="0" indent="0" algn="l" defTabSz="914400" rtl="0" eaLnBrk="1" fontAlgn="auto" latinLnBrk="0" hangingPunct="1">
-              <a:lnSpc>
-                <a:spcPct val="100000"/>
-              </a:lnSpc>
-              <a:spcBef>
-                <a:spcPts val="0"/>
-              </a:spcBef>
-              <a:spcAft>
-                <a:spcPts val="0"/>
-              </a:spcAft>
-              <a:buClrTx/>
-              <a:buSzTx/>
-              <a:buFontTx/>
-              <a:buNone/>
-              <a:tabLst/>
-              <a:defRPr/>
-            </a:pPr>
-            <a:r>
-              <a:rPr lang="en-US" dirty="0"/>
-              <a:t>Pancreatic ductal adenocarcinoma is the most common subtype of pancreatic cancer, with a 5 year survival rate of only 13%. The low survival rate is thought to be due to multiple challenges to treatment such as the difficulty of detecting PDAC before it has metastasized. (add graphic) A hallmark of PDAC is what’s called a “desmoplastic” tumor microenvironment. Compared to healthy tissue on the left, PDAC on the right has masses of cell growth in places that used to be healthy ducts, and is infiltrated by a greater diversity of immune and stromal cells while being crisscrossed and encapsulated in this network of collagen fibers, which are deposited by cancer-associated fibroblasts. </a:t>
-            </a:r>
-            <a:r>
-              <a:rPr lang="en-US" sz="1200" dirty="0"/>
-              <a:t>The dense fibrotic network of collagen is referred to as desmoplasia and is seen in certain types of tumors.</a:t>
-            </a:r>
-            <a:endParaRPr lang="en-US" dirty="0"/>
-          </a:p>
-          <a:p>
-            <a:pPr marL="0" marR="0" lvl="0" indent="0" algn="l" defTabSz="914400" rtl="0" eaLnBrk="1" fontAlgn="auto" latinLnBrk="0" hangingPunct="1">
-              <a:lnSpc>
-                <a:spcPct val="100000"/>
-              </a:lnSpc>
-              <a:spcBef>
-                <a:spcPts val="0"/>
-              </a:spcBef>
-              <a:spcAft>
-                <a:spcPts val="0"/>
-              </a:spcAft>
-              <a:buClrTx/>
-              <a:buSzTx/>
-              <a:buFontTx/>
-              <a:buNone/>
-              <a:tabLst/>
-              <a:defRPr/>
-            </a:pPr>
-            <a:endParaRPr lang="en-US" dirty="0"/>
-          </a:p>
-          <a:p>
-            <a:pPr marL="0" marR="0" lvl="0" indent="0" algn="l" defTabSz="914400" rtl="0" eaLnBrk="1" fontAlgn="auto" latinLnBrk="0" hangingPunct="1">
-              <a:lnSpc>
-                <a:spcPct val="100000"/>
-              </a:lnSpc>
-              <a:spcBef>
-                <a:spcPts val="0"/>
-              </a:spcBef>
-              <a:spcAft>
-                <a:spcPts val="0"/>
-              </a:spcAft>
-              <a:buClrTx/>
-              <a:buSzTx/>
-              <a:buFontTx/>
-              <a:buNone/>
-              <a:tabLst/>
-              <a:defRPr/>
-            </a:pPr>
-            <a:r>
-              <a:rPr lang="en-US" dirty="0"/>
-              <a:t>Those immune cells that are found in this microenvironment are often suppressive such as T regulatory cells and suppressive macrophages. Some of the immune cells are “residents” that were probably there in the healthy tissue, but others are recruited from the periphery (</a:t>
-            </a:r>
-            <a:r>
-              <a:rPr lang="en-US" dirty="0" err="1"/>
-              <a:t>BM+blood</a:t>
-            </a:r>
-            <a:r>
-              <a:rPr lang="en-US" dirty="0"/>
-              <a:t>)</a:t>
-            </a:r>
-          </a:p>
-          <a:p>
-            <a:endParaRPr lang="en-US" dirty="0"/>
-          </a:p>
-        </p:txBody>
-      </p:sp>
-      <p:sp>
-        <p:nvSpPr>
-          <p:cNvPr id="4" name="Slide Number Placeholder 3">
-            <a:extLst>
-              <a:ext uri="{FF2B5EF4-FFF2-40B4-BE49-F238E27FC236}">
-                <a16:creationId xmlns:a16="http://schemas.microsoft.com/office/drawing/2014/main" id="{B8DB3696-31BE-B389-1A3D-95B4F3D431A4}"/>
-              </a:ext>
-            </a:extLst>
-          </p:cNvPr>
-          <p:cNvSpPr>
-            <a:spLocks noGrp="1"/>
-          </p:cNvSpPr>
-          <p:nvPr>
-            <p:ph type="sldNum" sz="quarter" idx="5"/>
-          </p:nvPr>
-        </p:nvSpPr>
-        <p:spPr/>
-        <p:txBody>
-          <a:bodyPr/>
-          <a:lstStyle/>
-          <a:p>
-            <a:fld id="{B314B106-72D9-394B-AE7F-13630EA62899}" type="slidenum">
-              <a:rPr lang="en-US" smtClean="0"/>
-              <a:t>4</a:t>
-            </a:fld>
-            <a:endParaRPr lang="en-US"/>
-          </a:p>
-        </p:txBody>
-      </p:sp>
-    </p:spTree>
-    <p:extLst>
-      <p:ext uri="{BB962C8B-B14F-4D97-AF65-F5344CB8AC3E}">
-        <p14:creationId xmlns:p14="http://schemas.microsoft.com/office/powerpoint/2010/main" val="2208492687"/>
-      </p:ext>
-    </p:extLst>
-  </p:cSld>
-  <p:clrMapOvr>
-    <a:masterClrMapping/>
-  </p:clrMapOvr>
-</p:notes>
-</file>
-
-<file path=ppt/notesSlides/notesSlide5.xml><?xml version="1.0" encoding="utf-8"?>
-<p:notes xmlns:a="http://schemas.openxmlformats.org/drawingml/2006/main" xmlns:r="http://schemas.openxmlformats.org/officeDocument/2006/relationships" xmlns:p="http://schemas.openxmlformats.org/presentationml/2006/main">
-  <p:cSld>
-    <p:spTree>
-      <p:nvGrpSpPr>
-        <p:cNvPr id="1" name="">
-          <a:extLst>
-            <a:ext uri="{FF2B5EF4-FFF2-40B4-BE49-F238E27FC236}">
-              <a16:creationId xmlns:a16="http://schemas.microsoft.com/office/drawing/2014/main" id="{9EB8E748-4CAE-78F3-D237-5CBCAFF3EFD2}"/>
-            </a:ext>
-          </a:extLst>
-        </p:cNvPr>
-        <p:cNvGrpSpPr/>
-        <p:nvPr/>
-      </p:nvGrpSpPr>
-      <p:grpSpPr>
-        <a:xfrm>
-          <a:off x="0" y="0"/>
-          <a:ext cx="0" cy="0"/>
-          <a:chOff x="0" y="0"/>
-          <a:chExt cx="0" cy="0"/>
-        </a:xfrm>
-      </p:grpSpPr>
-      <p:sp>
-        <p:nvSpPr>
-          <p:cNvPr id="2" name="Slide Image Placeholder 1">
-            <a:extLst>
-              <a:ext uri="{FF2B5EF4-FFF2-40B4-BE49-F238E27FC236}">
-                <a16:creationId xmlns:a16="http://schemas.microsoft.com/office/drawing/2014/main" id="{7D016BBE-F17F-BB50-F8BB-B387427B9685}"/>
-              </a:ext>
-            </a:extLst>
-          </p:cNvPr>
-          <p:cNvSpPr>
-            <a:spLocks noGrp="1" noRot="1" noChangeAspect="1"/>
-          </p:cNvSpPr>
-          <p:nvPr>
-            <p:ph type="sldImg"/>
-          </p:nvPr>
-        </p:nvSpPr>
-        <p:spPr/>
-      </p:sp>
-      <p:sp>
-        <p:nvSpPr>
-          <p:cNvPr id="3" name="Notes Placeholder 2">
-            <a:extLst>
-              <a:ext uri="{FF2B5EF4-FFF2-40B4-BE49-F238E27FC236}">
-                <a16:creationId xmlns:a16="http://schemas.microsoft.com/office/drawing/2014/main" id="{7DE0EDB9-D6C2-0612-7C82-EA8CBD544236}"/>
-              </a:ext>
-            </a:extLst>
-          </p:cNvPr>
-          <p:cNvSpPr>
-            <a:spLocks noGrp="1"/>
-          </p:cNvSpPr>
-          <p:nvPr>
-            <p:ph type="body" idx="1"/>
-          </p:nvPr>
-        </p:nvSpPr>
-        <p:spPr/>
-        <p:txBody>
-          <a:bodyPr/>
-          <a:lstStyle/>
-          <a:p>
-            <a:pPr marL="0" marR="0" lvl="0" indent="0" algn="l" defTabSz="914400" rtl="0" eaLnBrk="1" fontAlgn="auto" latinLnBrk="0" hangingPunct="1">
-              <a:lnSpc>
-                <a:spcPct val="100000"/>
-              </a:lnSpc>
-              <a:spcBef>
-                <a:spcPts val="0"/>
-              </a:spcBef>
-              <a:spcAft>
-                <a:spcPts val="0"/>
-              </a:spcAft>
-              <a:buClrTx/>
-              <a:buSzTx/>
-              <a:buFontTx/>
-              <a:buNone/>
-              <a:tabLst/>
-              <a:defRPr/>
-            </a:pPr>
-            <a:r>
-              <a:rPr lang="en-US" dirty="0"/>
-              <a:t>Pancreatic Ductal Adenocarcinoma is the most common subtype of pancreatic cancer, constituting about 90% of all pancreatic cancer. PDAC is the third leading cause of cancer-related deaths in the U.S., with a 5-year survival rate of only 13.3%. It is also known to have extremely poor prognosis, with nearly 90% of tumors already metastasized at diagnosis. </a:t>
-            </a:r>
-          </a:p>
-          <a:p>
-            <a:pPr marL="0" marR="0" lvl="0" indent="0" algn="l" defTabSz="914400" rtl="0" eaLnBrk="1" fontAlgn="auto" latinLnBrk="0" hangingPunct="1">
-              <a:lnSpc>
-                <a:spcPct val="100000"/>
-              </a:lnSpc>
-              <a:spcBef>
-                <a:spcPts val="0"/>
-              </a:spcBef>
-              <a:spcAft>
-                <a:spcPts val="0"/>
-              </a:spcAft>
-              <a:buClrTx/>
-              <a:buSzTx/>
-              <a:buFontTx/>
-              <a:buNone/>
-              <a:tabLst/>
-              <a:defRPr/>
-            </a:pPr>
-            <a:endParaRPr lang="en-US" dirty="0"/>
-          </a:p>
-          <a:p>
-            <a:pPr marL="0" marR="0" lvl="0" indent="0" algn="l" defTabSz="914400" rtl="0" eaLnBrk="1" fontAlgn="auto" latinLnBrk="0" hangingPunct="1">
-              <a:lnSpc>
-                <a:spcPct val="100000"/>
-              </a:lnSpc>
-              <a:spcBef>
-                <a:spcPts val="0"/>
-              </a:spcBef>
-              <a:spcAft>
-                <a:spcPts val="0"/>
-              </a:spcAft>
-              <a:buClrTx/>
-              <a:buSzTx/>
-              <a:buFontTx/>
-              <a:buNone/>
-              <a:tabLst/>
-              <a:defRPr/>
-            </a:pPr>
-            <a:endParaRPr lang="en-US" dirty="0"/>
-          </a:p>
-          <a:p>
-            <a:pPr marL="0" marR="0" lvl="0" indent="0" algn="l" defTabSz="914400" rtl="0" eaLnBrk="1" fontAlgn="auto" latinLnBrk="0" hangingPunct="1">
-              <a:lnSpc>
-                <a:spcPct val="100000"/>
-              </a:lnSpc>
-              <a:spcBef>
-                <a:spcPts val="0"/>
-              </a:spcBef>
-              <a:spcAft>
-                <a:spcPts val="0"/>
-              </a:spcAft>
-              <a:buClrTx/>
-              <a:buSzTx/>
-              <a:buFontTx/>
-              <a:buNone/>
-              <a:tabLst/>
-              <a:defRPr/>
-            </a:pPr>
-            <a:endParaRPr lang="en-US" dirty="0"/>
-          </a:p>
-          <a:p>
-            <a:pPr marL="0" marR="0" lvl="0" indent="0" algn="l" defTabSz="914400" rtl="0" eaLnBrk="1" fontAlgn="auto" latinLnBrk="0" hangingPunct="1">
-              <a:lnSpc>
-                <a:spcPct val="100000"/>
-              </a:lnSpc>
-              <a:spcBef>
-                <a:spcPts val="0"/>
-              </a:spcBef>
-              <a:spcAft>
-                <a:spcPts val="0"/>
-              </a:spcAft>
-              <a:buClrTx/>
-              <a:buSzTx/>
-              <a:buFontTx/>
-              <a:buNone/>
-              <a:tabLst/>
-              <a:defRPr/>
-            </a:pPr>
-            <a:endParaRPr lang="en-US" dirty="0"/>
-          </a:p>
-          <a:p>
-            <a:pPr marL="0" marR="0" lvl="0" indent="0" algn="l" defTabSz="914400" rtl="0" eaLnBrk="1" fontAlgn="auto" latinLnBrk="0" hangingPunct="1">
-              <a:lnSpc>
-                <a:spcPct val="100000"/>
-              </a:lnSpc>
-              <a:spcBef>
-                <a:spcPts val="0"/>
-              </a:spcBef>
-              <a:spcAft>
-                <a:spcPts val="0"/>
-              </a:spcAft>
-              <a:buClrTx/>
-              <a:buSzTx/>
-              <a:buFontTx/>
-              <a:buNone/>
-              <a:tabLst/>
-              <a:defRPr/>
-            </a:pPr>
-            <a:r>
-              <a:rPr lang="en-US" dirty="0"/>
-              <a:t>PDAC begins in the epithelial cells lining the pancreatic ducts, which are normally responsible for regulating secretion of digestive enzymes into the small intestine. In PDAC, these cells acquire mutations that cause them to proliferate uncontrollably and eventually rupture the ductal membrane. After spreading into the stroma, cancer-associated fibroblasts develop dense networks of collogen fibers, known as desmoplasia, around the previous pancreatic ducts. This creates almost like a shield around the tumor, protecting it from immune attack and drug penetration. </a:t>
-            </a:r>
-          </a:p>
-          <a:p>
-            <a:pPr marL="0" marR="0" lvl="0" indent="0" algn="l" defTabSz="914400" rtl="0" eaLnBrk="1" fontAlgn="auto" latinLnBrk="0" hangingPunct="1">
-              <a:lnSpc>
-                <a:spcPct val="100000"/>
-              </a:lnSpc>
-              <a:spcBef>
-                <a:spcPts val="0"/>
-              </a:spcBef>
-              <a:spcAft>
-                <a:spcPts val="0"/>
-              </a:spcAft>
-              <a:buClrTx/>
-              <a:buSzTx/>
-              <a:buFontTx/>
-              <a:buNone/>
-              <a:tabLst/>
-              <a:defRPr/>
-            </a:pPr>
-            <a:endParaRPr lang="en-US" dirty="0"/>
-          </a:p>
-          <a:p>
-            <a:pPr marL="0" marR="0" lvl="0" indent="0" algn="l" defTabSz="914400" rtl="0" eaLnBrk="1" fontAlgn="auto" latinLnBrk="0" hangingPunct="1">
-              <a:lnSpc>
-                <a:spcPct val="100000"/>
-              </a:lnSpc>
-              <a:spcBef>
-                <a:spcPts val="0"/>
-              </a:spcBef>
-              <a:spcAft>
-                <a:spcPts val="0"/>
-              </a:spcAft>
-              <a:buClrTx/>
-              <a:buSzTx/>
-              <a:buFontTx/>
-              <a:buNone/>
-              <a:tabLst/>
-              <a:defRPr/>
-            </a:pPr>
-            <a:r>
-              <a:rPr lang="en-US" dirty="0"/>
-              <a:t>Pancreatic ductal adenocarcinoma is the most common subtype of pancreatic cancer, with a 5 year survival rate of only 13%. The low survival rate is thought to be due to multiple challenges to treatment such as the difficulty of detecting PDAC before it has metastasized. (add graphic) A hallmark of PDAC is what’s called a “desmoplastic” tumor microenvironment. Compared to healthy tissue on the left, PDAC on the right has masses of cell growth in places that used to be healthy ducts, and is infiltrated by a greater diversity of immune and stromal cells while being crisscrossed and encapsulated in this network of collagen fibers, which are deposited by cancer-associated fibroblasts. </a:t>
-            </a:r>
-            <a:r>
-              <a:rPr lang="en-US" sz="1200" dirty="0"/>
-              <a:t>The dense fibrotic network of collagen is referred to as desmoplasia and is seen in certain types of tumors.</a:t>
-            </a:r>
-            <a:endParaRPr lang="en-US" dirty="0"/>
-          </a:p>
-          <a:p>
-            <a:pPr marL="0" marR="0" lvl="0" indent="0" algn="l" defTabSz="914400" rtl="0" eaLnBrk="1" fontAlgn="auto" latinLnBrk="0" hangingPunct="1">
-              <a:lnSpc>
-                <a:spcPct val="100000"/>
-              </a:lnSpc>
-              <a:spcBef>
-                <a:spcPts val="0"/>
-              </a:spcBef>
-              <a:spcAft>
-                <a:spcPts val="0"/>
-              </a:spcAft>
-              <a:buClrTx/>
-              <a:buSzTx/>
-              <a:buFontTx/>
-              <a:buNone/>
-              <a:tabLst/>
-              <a:defRPr/>
-            </a:pPr>
-            <a:endParaRPr lang="en-US" dirty="0"/>
-          </a:p>
-          <a:p>
-            <a:pPr marL="0" marR="0" lvl="0" indent="0" algn="l" defTabSz="914400" rtl="0" eaLnBrk="1" fontAlgn="auto" latinLnBrk="0" hangingPunct="1">
-              <a:lnSpc>
-                <a:spcPct val="100000"/>
-              </a:lnSpc>
-              <a:spcBef>
-                <a:spcPts val="0"/>
-              </a:spcBef>
-              <a:spcAft>
-                <a:spcPts val="0"/>
-              </a:spcAft>
-              <a:buClrTx/>
-              <a:buSzTx/>
-              <a:buFontTx/>
-              <a:buNone/>
-              <a:tabLst/>
-              <a:defRPr/>
-            </a:pPr>
-            <a:r>
-              <a:rPr lang="en-US" dirty="0"/>
-              <a:t>Those immune cells that are found in this microenvironment are often suppressive such as T regulatory cells and suppressive macrophages. Some of the immune cells are “residents” that were probably there in the healthy tissue, but others are recruited from the periphery (</a:t>
-            </a:r>
-            <a:r>
-              <a:rPr lang="en-US" dirty="0" err="1"/>
-              <a:t>BM+blood</a:t>
-            </a:r>
-            <a:r>
-              <a:rPr lang="en-US" dirty="0"/>
-              <a:t>)</a:t>
-            </a:r>
-          </a:p>
-          <a:p>
-            <a:endParaRPr lang="en-US" dirty="0"/>
-          </a:p>
-        </p:txBody>
-      </p:sp>
-      <p:sp>
-        <p:nvSpPr>
-          <p:cNvPr id="4" name="Slide Number Placeholder 3">
-            <a:extLst>
-              <a:ext uri="{FF2B5EF4-FFF2-40B4-BE49-F238E27FC236}">
-                <a16:creationId xmlns:a16="http://schemas.microsoft.com/office/drawing/2014/main" id="{65935998-F14E-7885-A99C-29F5E8ECCBF7}"/>
-              </a:ext>
-            </a:extLst>
-          </p:cNvPr>
-          <p:cNvSpPr>
-            <a:spLocks noGrp="1"/>
-          </p:cNvSpPr>
-          <p:nvPr>
-            <p:ph type="sldNum" sz="quarter" idx="5"/>
-          </p:nvPr>
-        </p:nvSpPr>
-        <p:spPr/>
-        <p:txBody>
-          <a:bodyPr/>
-          <a:lstStyle/>
-          <a:p>
-            <a:fld id="{B314B106-72D9-394B-AE7F-13630EA62899}" type="slidenum">
-              <a:rPr lang="en-US" smtClean="0"/>
-              <a:t>6</a:t>
-            </a:fld>
-            <a:endParaRPr lang="en-US"/>
-          </a:p>
-        </p:txBody>
-      </p:sp>
-    </p:spTree>
-    <p:extLst>
-      <p:ext uri="{BB962C8B-B14F-4D97-AF65-F5344CB8AC3E}">
-        <p14:creationId xmlns:p14="http://schemas.microsoft.com/office/powerpoint/2010/main" val="1548959108"/>
-      </p:ext>
-    </p:extLst>
-  </p:cSld>
-  <p:clrMapOvr>
-    <a:masterClrMapping/>
-  </p:clrMapOvr>
-</p:notes>
-</file>
-
-<file path=ppt/notesSlides/notesSlide6.xml><?xml version="1.0" encoding="utf-8"?>
 <p:notes xmlns:a="http://schemas.openxmlformats.org/drawingml/2006/main" xmlns:r="http://schemas.openxmlformats.org/officeDocument/2006/relationships" xmlns:p="http://schemas.openxmlformats.org/presentationml/2006/main">
   <p:cSld>
     <p:spTree>
@@ -2213,7 +1209,7 @@
           <a:p>
             <a:fld id="{B314B106-72D9-394B-AE7F-13630EA62899}" type="slidenum">
               <a:rPr lang="en-US" smtClean="0"/>
-              <a:t>7</a:t>
+              <a:t>3</a:t>
             </a:fld>
             <a:endParaRPr lang="en-US"/>
           </a:p>
@@ -2222,7 +1218,7 @@
     </p:spTree>
     <p:extLst>
       <p:ext uri="{BB962C8B-B14F-4D97-AF65-F5344CB8AC3E}">
-        <p14:creationId xmlns:p14="http://schemas.microsoft.com/office/powerpoint/2010/main" val="926004251"/>
+        <p14:creationId xmlns:p14="http://schemas.microsoft.com/office/powerpoint/2010/main" val="1996327844"/>
       </p:ext>
     </p:extLst>
   </p:cSld>
@@ -2613,7 +1609,7 @@
             <a:fld id="{2B799761-2EBC-ED48-8421-93C3DA969FB7}" type="datetimeFigureOut">
               <a:rPr lang="en-US" smtClean="0"/>
               <a:pPr/>
-              <a:t>8/20/2025</a:t>
+              <a:t>9/5/2025</a:t>
             </a:fld>
             <a:endParaRPr lang="en-US"/>
           </a:p>
@@ -2844,7 +1840,7 @@
             <a:fld id="{60F76AEE-5F7C-0C4E-AB7D-BADB32FF08A3}" type="datetimeFigureOut">
               <a:rPr lang="en-US" smtClean="0"/>
               <a:pPr/>
-              <a:t>8/20/2025</a:t>
+              <a:t>9/5/2025</a:t>
             </a:fld>
             <a:endParaRPr lang="en-US"/>
           </a:p>
@@ -4001,7 +2997,7 @@
         <p:cNvPr id="1" name="">
           <a:extLst>
             <a:ext uri="{FF2B5EF4-FFF2-40B4-BE49-F238E27FC236}">
-              <a16:creationId xmlns:a16="http://schemas.microsoft.com/office/drawing/2014/main" id="{228476CE-4A05-3F29-B27A-1F11ECFE935C}"/>
+              <a16:creationId xmlns:a16="http://schemas.microsoft.com/office/drawing/2014/main" id="{D2D1A48A-8F25-B2AB-40D5-620262D66B20}"/>
             </a:ext>
           </a:extLst>
         </p:cNvPr>
@@ -4021,7 +3017,7 @@
           <p:cNvPr id="10" name="Title 9">
             <a:extLst>
               <a:ext uri="{FF2B5EF4-FFF2-40B4-BE49-F238E27FC236}">
-                <a16:creationId xmlns:a16="http://schemas.microsoft.com/office/drawing/2014/main" id="{0157906B-C597-E573-2E2B-896AA1FF365E}"/>
+                <a16:creationId xmlns:a16="http://schemas.microsoft.com/office/drawing/2014/main" id="{1C95EC67-C641-5091-7EC0-DA15C688D1F3}"/>
               </a:ext>
             </a:extLst>
           </p:cNvPr>
@@ -4052,7 +3048,7 @@
                 <a:latin typeface="Arial" panose="020B0604020202020204" pitchFamily="34" charset="0"/>
                 <a:cs typeface="Arial" panose="020B0604020202020204" pitchFamily="34" charset="0"/>
               </a:rPr>
-              <a:t>Updated Gradients: BM-to-Cell Force</a:t>
+              <a:t>Updated Deformation </a:t>
             </a:r>
           </a:p>
         </p:txBody>
@@ -4062,7 +3058,7 @@
           <p:cNvPr id="5" name="Straight Connector 4">
             <a:extLst>
               <a:ext uri="{FF2B5EF4-FFF2-40B4-BE49-F238E27FC236}">
-                <a16:creationId xmlns:a16="http://schemas.microsoft.com/office/drawing/2014/main" id="{448FF531-164A-F5D3-7B43-2BA968303F43}"/>
+                <a16:creationId xmlns:a16="http://schemas.microsoft.com/office/drawing/2014/main" id="{6161F00D-CD6D-1275-3333-ED17AE5260BC}"/>
               </a:ext>
             </a:extLst>
           </p:cNvPr>
@@ -4096,11 +3092,11 @@
       </p:cxnSp>
       <p:pic>
         <p:nvPicPr>
-          <p:cNvPr id="2" name="Cell_Force_Demo">
+          <p:cNvPr id="3" name="lower_prof">
             <a:hlinkClick r:id="" action="ppaction://media"/>
             <a:extLst>
               <a:ext uri="{FF2B5EF4-FFF2-40B4-BE49-F238E27FC236}">
-                <a16:creationId xmlns:a16="http://schemas.microsoft.com/office/drawing/2014/main" id="{E0E505D2-3715-3A7A-E0F8-58DCE4FF1F54}"/>
+                <a16:creationId xmlns:a16="http://schemas.microsoft.com/office/drawing/2014/main" id="{62A85324-B546-FC18-A3C0-2083630F2093}"/>
               </a:ext>
             </a:extLst>
           </p:cNvPr>
@@ -4118,25 +3114,134 @@
         </p:nvPicPr>
         <p:blipFill>
           <a:blip r:embed="rId5"/>
-          <a:srcRect l="19136" t="10765" r="28465" b="21021"/>
+          <a:srcRect l="27397" t="10122" r="33698" b="19011"/>
           <a:stretch>
             <a:fillRect/>
           </a:stretch>
         </p:blipFill>
         <p:spPr>
           <a:xfrm>
-            <a:off x="3419061" y="1510748"/>
-            <a:ext cx="4791286" cy="4678018"/>
+            <a:off x="3457183" y="1338525"/>
+            <a:ext cx="5049556" cy="5174015"/>
           </a:xfrm>
           <a:prstGeom prst="rect">
             <a:avLst/>
           </a:prstGeom>
         </p:spPr>
       </p:pic>
+      <p:sp>
+        <p:nvSpPr>
+          <p:cNvPr id="4" name="TextBox 3">
+            <a:extLst>
+              <a:ext uri="{FF2B5EF4-FFF2-40B4-BE49-F238E27FC236}">
+                <a16:creationId xmlns:a16="http://schemas.microsoft.com/office/drawing/2014/main" id="{F20D4BC1-E94F-BAA2-9DB2-64545DDBDB52}"/>
+              </a:ext>
+            </a:extLst>
+          </p:cNvPr>
+          <p:cNvSpPr txBox="1"/>
+          <p:nvPr/>
+        </p:nvSpPr>
+        <p:spPr>
+          <a:xfrm>
+            <a:off x="457200" y="1717589"/>
+            <a:ext cx="2999983" cy="3416320"/>
+          </a:xfrm>
+          <a:prstGeom prst="rect">
+            <a:avLst/>
+          </a:prstGeom>
+          <a:noFill/>
+        </p:spPr>
+        <p:txBody>
+          <a:bodyPr wrap="square" rtlCol="0">
+            <a:spAutoFit/>
+          </a:bodyPr>
+          <a:lstStyle/>
+          <a:p>
+            <a:r>
+              <a:rPr lang="en-US" sz="2400" dirty="0">
+                <a:solidFill>
+                  <a:schemeClr val="tx2"/>
+                </a:solidFill>
+              </a:rPr>
+              <a:t>Spring Constants: </a:t>
+            </a:r>
+          </a:p>
+          <a:p>
+            <a:pPr marL="800100" lvl="1" indent="-342900">
+              <a:buFont typeface="Arial" panose="020B0604020202020204" pitchFamily="34" charset="0"/>
+              <a:buChar char="•"/>
+            </a:pPr>
+            <a:r>
+              <a:rPr lang="en-US" sz="2400" dirty="0">
+                <a:solidFill>
+                  <a:schemeClr val="tx2"/>
+                </a:solidFill>
+              </a:rPr>
+              <a:t>BM-to-Cell = .005</a:t>
+            </a:r>
+          </a:p>
+          <a:p>
+            <a:pPr marL="800100" lvl="1" indent="-342900">
+              <a:buFont typeface="Arial" panose="020B0604020202020204" pitchFamily="34" charset="0"/>
+              <a:buChar char="•"/>
+            </a:pPr>
+            <a:r>
+              <a:rPr lang="en-US" sz="2400" dirty="0">
+                <a:solidFill>
+                  <a:schemeClr val="tx2"/>
+                </a:solidFill>
+              </a:rPr>
+              <a:t>Cell-to-BM = .005</a:t>
+            </a:r>
+          </a:p>
+          <a:p>
+            <a:pPr marL="800100" lvl="1" indent="-342900">
+              <a:buFont typeface="Arial" panose="020B0604020202020204" pitchFamily="34" charset="0"/>
+              <a:buChar char="•"/>
+            </a:pPr>
+            <a:r>
+              <a:rPr lang="en-US" sz="2400" dirty="0">
+                <a:solidFill>
+                  <a:schemeClr val="tx2"/>
+                </a:solidFill>
+              </a:rPr>
+              <a:t>Repulsion = 1</a:t>
+            </a:r>
+          </a:p>
+          <a:p>
+            <a:endParaRPr lang="en-US" sz="2400" dirty="0">
+              <a:solidFill>
+                <a:schemeClr val="tx2"/>
+              </a:solidFill>
+            </a:endParaRPr>
+          </a:p>
+          <a:p>
+            <a:r>
+              <a:rPr lang="en-US" sz="2400" dirty="0">
+                <a:solidFill>
+                  <a:schemeClr val="tx2"/>
+                </a:solidFill>
+              </a:rPr>
+              <a:t>Proliferation = .001</a:t>
+            </a:r>
+          </a:p>
+          <a:p>
+            <a:pPr marL="800100" lvl="1" indent="-342900">
+              <a:buFont typeface="Arial" panose="020B0604020202020204" pitchFamily="34" charset="0"/>
+              <a:buChar char="•"/>
+            </a:pPr>
+            <a:endParaRPr lang="en-US" sz="2400" dirty="0">
+              <a:solidFill>
+                <a:schemeClr val="tx2"/>
+              </a:solidFill>
+            </a:endParaRPr>
+          </a:p>
+        </p:txBody>
+      </p:sp>
     </p:spTree>
     <p:extLst>
       <p:ext uri="{BB962C8B-B14F-4D97-AF65-F5344CB8AC3E}">
-        <p14:creationId xmlns:p14="http://schemas.microsoft.com/office/powerpoint/2010/main" val="776799174"/>
+        <p14:creationId xmlns:p14="http://schemas.microsoft.com/office/powerpoint/2010/main" val="1276417643"/>
       </p:ext>
     </p:extLst>
   </p:cSld>
@@ -4171,9 +3276,9 @@
                                   <p:childTnLst>
                                     <p:cmd type="call" cmd="playFrom(0.0)">
                                       <p:cBhvr>
-                                        <p:cTn id="6" dur="3700" fill="hold"/>
+                                        <p:cTn id="6" dur="34743" fill="hold"/>
                                         <p:tgtEl>
-                                          <p:spTgt spid="2"/>
+                                          <p:spTgt spid="3"/>
                                         </p:tgtEl>
                                       </p:cBhvr>
                                     </p:cmd>
@@ -4211,7 +3316,7 @@
                   </p:stCondLst>
                 </p:cTn>
                 <p:tgtEl>
-                  <p:spTgt spid="2"/>
+                  <p:spTgt spid="3"/>
                 </p:tgtEl>
               </p:cMediaNode>
             </p:video>
@@ -4220,7 +3325,7 @@
                 <p:stCondLst>
                   <p:cond evt="onClick" delay="0">
                     <p:tgtEl>
-                      <p:spTgt spid="2"/>
+                      <p:spTgt spid="3"/>
                     </p:tgtEl>
                   </p:cond>
                 </p:stCondLst>
@@ -4250,7 +3355,7 @@
                                       <p:cBhvr>
                                         <p:cTn id="12" dur="1" fill="hold"/>
                                         <p:tgtEl>
-                                          <p:spTgt spid="2"/>
+                                          <p:spTgt spid="3"/>
                                         </p:tgtEl>
                                       </p:cBhvr>
                                     </p:cmd>
@@ -4268,7 +3373,7 @@
               <p:nextCondLst>
                 <p:cond evt="onClick" delay="0">
                   <p:tgtEl>
-                    <p:spTgt spid="2"/>
+                    <p:spTgt spid="3"/>
                   </p:tgtEl>
                 </p:cond>
               </p:nextCondLst>
@@ -4282,1115 +3387,6 @@
 </file>
 
 <file path=ppt/slides/slide3.xml><?xml version="1.0" encoding="utf-8"?>
-<p:sld xmlns:a="http://schemas.openxmlformats.org/drawingml/2006/main" xmlns:r="http://schemas.openxmlformats.org/officeDocument/2006/relationships" xmlns:p="http://schemas.openxmlformats.org/presentationml/2006/main">
-  <p:cSld>
-    <p:spTree>
-      <p:nvGrpSpPr>
-        <p:cNvPr id="1" name="">
-          <a:extLst>
-            <a:ext uri="{FF2B5EF4-FFF2-40B4-BE49-F238E27FC236}">
-              <a16:creationId xmlns:a16="http://schemas.microsoft.com/office/drawing/2014/main" id="{9CACB396-58E0-7624-BA5F-AEB96F688381}"/>
-            </a:ext>
-          </a:extLst>
-        </p:cNvPr>
-        <p:cNvGrpSpPr/>
-        <p:nvPr/>
-      </p:nvGrpSpPr>
-      <p:grpSpPr>
-        <a:xfrm>
-          <a:off x="0" y="0"/>
-          <a:ext cx="0" cy="0"/>
-          <a:chOff x="0" y="0"/>
-          <a:chExt cx="0" cy="0"/>
-        </a:xfrm>
-      </p:grpSpPr>
-      <p:sp>
-        <p:nvSpPr>
-          <p:cNvPr id="10" name="Title 9">
-            <a:extLst>
-              <a:ext uri="{FF2B5EF4-FFF2-40B4-BE49-F238E27FC236}">
-                <a16:creationId xmlns:a16="http://schemas.microsoft.com/office/drawing/2014/main" id="{58092917-9ECC-841C-C5C9-F2F117BA30D4}"/>
-              </a:ext>
-            </a:extLst>
-          </p:cNvPr>
-          <p:cNvSpPr>
-            <a:spLocks noGrp="1"/>
-          </p:cNvSpPr>
-          <p:nvPr>
-            <p:ph type="title"/>
-          </p:nvPr>
-        </p:nvSpPr>
-        <p:spPr>
-          <a:xfrm>
-            <a:off x="457200" y="234751"/>
-            <a:ext cx="7886700" cy="994172"/>
-          </a:xfrm>
-        </p:spPr>
-        <p:txBody>
-          <a:bodyPr>
-            <a:noAutofit/>
-          </a:bodyPr>
-          <a:lstStyle/>
-          <a:p>
-            <a:r>
-              <a:rPr lang="en-US" sz="3200" b="1" dirty="0">
-                <a:solidFill>
-                  <a:srgbClr val="171C8C"/>
-                </a:solidFill>
-                <a:latin typeface="Arial" panose="020B0604020202020204" pitchFamily="34" charset="0"/>
-                <a:cs typeface="Arial" panose="020B0604020202020204" pitchFamily="34" charset="0"/>
-              </a:rPr>
-              <a:t>Updated Gradients: Cell-to-BM Force</a:t>
-            </a:r>
-          </a:p>
-        </p:txBody>
-      </p:sp>
-      <p:cxnSp>
-        <p:nvCxnSpPr>
-          <p:cNvPr id="5" name="Straight Connector 4">
-            <a:extLst>
-              <a:ext uri="{FF2B5EF4-FFF2-40B4-BE49-F238E27FC236}">
-                <a16:creationId xmlns:a16="http://schemas.microsoft.com/office/drawing/2014/main" id="{F119AE36-74A6-40F7-4470-D6D4E080E84B}"/>
-              </a:ext>
-            </a:extLst>
-          </p:cNvPr>
-          <p:cNvCxnSpPr/>
-          <p:nvPr/>
-        </p:nvCxnSpPr>
-        <p:spPr>
-          <a:xfrm>
-            <a:off x="191528" y="1224990"/>
-            <a:ext cx="8760941" cy="0"/>
-          </a:xfrm>
-          <a:prstGeom prst="line">
-            <a:avLst/>
-          </a:prstGeom>
-          <a:ln w="38100"/>
-        </p:spPr>
-        <p:style>
-          <a:lnRef idx="1">
-            <a:schemeClr val="accent1"/>
-          </a:lnRef>
-          <a:fillRef idx="0">
-            <a:schemeClr val="accent1"/>
-          </a:fillRef>
-          <a:effectRef idx="0">
-            <a:schemeClr val="accent1"/>
-          </a:effectRef>
-          <a:fontRef idx="minor">
-            <a:schemeClr val="tx1"/>
-          </a:fontRef>
-        </p:style>
-      </p:cxnSp>
-      <p:pic>
-        <p:nvPicPr>
-          <p:cNvPr id="4" name="Deform_Demo">
-            <a:hlinkClick r:id="" action="ppaction://media"/>
-            <a:extLst>
-              <a:ext uri="{FF2B5EF4-FFF2-40B4-BE49-F238E27FC236}">
-                <a16:creationId xmlns:a16="http://schemas.microsoft.com/office/drawing/2014/main" id="{B4F02FB7-EDFB-6FC5-3695-2C92A6D18DFD}"/>
-              </a:ext>
-            </a:extLst>
-          </p:cNvPr>
-          <p:cNvPicPr>
-            <a:picLocks noChangeAspect="1"/>
-          </p:cNvPicPr>
-          <p:nvPr>
-            <a:videoFile r:link="rId2"/>
-            <p:extLst>
-              <p:ext uri="{DAA4B4D4-6D71-4841-9C94-3DE7FCFB9230}">
-                <p14:media xmlns:p14="http://schemas.microsoft.com/office/powerpoint/2010/main" r:embed="rId1"/>
-              </p:ext>
-            </p:extLst>
-          </p:nvPr>
-        </p:nvPicPr>
-        <p:blipFill>
-          <a:blip r:embed="rId5"/>
-          <a:srcRect l="20660" t="10938" r="27456" b="19496"/>
-          <a:stretch>
-            <a:fillRect/>
-          </a:stretch>
-        </p:blipFill>
-        <p:spPr>
-          <a:xfrm>
-            <a:off x="3599621" y="1550506"/>
-            <a:ext cx="4744279" cy="4770771"/>
-          </a:xfrm>
-          <a:prstGeom prst="rect">
-            <a:avLst/>
-          </a:prstGeom>
-        </p:spPr>
-      </p:pic>
-    </p:spTree>
-    <p:extLst>
-      <p:ext uri="{BB962C8B-B14F-4D97-AF65-F5344CB8AC3E}">
-        <p14:creationId xmlns:p14="http://schemas.microsoft.com/office/powerpoint/2010/main" val="942722353"/>
-      </p:ext>
-    </p:extLst>
-  </p:cSld>
-  <p:clrMapOvr>
-    <a:masterClrMapping/>
-  </p:clrMapOvr>
-  <p:timing>
-    <p:tnLst>
-      <p:par>
-        <p:cTn id="1" dur="indefinite" restart="never" nodeType="tmRoot">
-          <p:childTnLst>
-            <p:seq concurrent="1" nextAc="seek">
-              <p:cTn id="2" dur="indefinite" nodeType="mainSeq">
-                <p:childTnLst>
-                  <p:par>
-                    <p:cTn id="3" fill="hold">
-                      <p:stCondLst>
-                        <p:cond delay="indefinite"/>
-                      </p:stCondLst>
-                      <p:childTnLst>
-                        <p:par>
-                          <p:cTn id="4" fill="hold">
-                            <p:stCondLst>
-                              <p:cond delay="0"/>
-                            </p:stCondLst>
-                            <p:childTnLst>
-                              <p:par>
-                                <p:cTn id="5" presetID="1" presetClass="mediacall" presetSubtype="0" fill="hold" nodeType="clickEffect">
-                                  <p:stCondLst>
-                                    <p:cond delay="0"/>
-                                  </p:stCondLst>
-                                  <p:childTnLst>
-                                    <p:cmd type="call" cmd="playFrom(0.0)">
-                                      <p:cBhvr>
-                                        <p:cTn id="6" dur="4000" fill="hold"/>
-                                        <p:tgtEl>
-                                          <p:spTgt spid="4"/>
-                                        </p:tgtEl>
-                                      </p:cBhvr>
-                                    </p:cmd>
-                                  </p:childTnLst>
-                                </p:cTn>
-                              </p:par>
-                            </p:childTnLst>
-                          </p:cTn>
-                        </p:par>
-                      </p:childTnLst>
-                    </p:cTn>
-                  </p:par>
-                </p:childTnLst>
-              </p:cTn>
-              <p:prevCondLst>
-                <p:cond evt="onPrev" delay="0">
-                  <p:tgtEl>
-                    <p:sldTgt/>
-                  </p:tgtEl>
-                </p:cond>
-              </p:prevCondLst>
-              <p:nextCondLst>
-                <p:cond evt="onNext" delay="0">
-                  <p:tgtEl>
-                    <p:sldTgt/>
-                  </p:tgtEl>
-                </p:cond>
-              </p:nextCondLst>
-            </p:seq>
-            <p:video>
-              <p:cMediaNode vol="80000">
-                <p:cTn id="7" fill="hold" display="0">
-                  <p:stCondLst>
-                    <p:cond delay="indefinite"/>
-                  </p:stCondLst>
-                </p:cTn>
-                <p:tgtEl>
-                  <p:spTgt spid="4"/>
-                </p:tgtEl>
-              </p:cMediaNode>
-            </p:video>
-            <p:seq concurrent="1" nextAc="seek">
-              <p:cTn id="8" restart="whenNotActive" fill="hold" evtFilter="cancelBubble" nodeType="interactiveSeq">
-                <p:stCondLst>
-                  <p:cond evt="onClick" delay="0">
-                    <p:tgtEl>
-                      <p:spTgt spid="4"/>
-                    </p:tgtEl>
-                  </p:cond>
-                </p:stCondLst>
-                <p:endSync evt="end" delay="0">
-                  <p:rtn val="all"/>
-                </p:endSync>
-                <p:childTnLst>
-                  <p:par>
-                    <p:cTn id="9" fill="hold">
-                      <p:stCondLst>
-                        <p:cond delay="0"/>
-                      </p:stCondLst>
-                      <p:childTnLst>
-                        <p:par>
-                          <p:cTn id="10" fill="hold">
-                            <p:stCondLst>
-                              <p:cond delay="0"/>
-                            </p:stCondLst>
-                            <p:childTnLst>
-                              <p:par>
-                                <p:cTn id="11" presetID="2" presetClass="mediacall" presetSubtype="0" fill="hold" nodeType="clickEffect">
-                                  <p:stCondLst>
-                                    <p:cond delay="0"/>
-                                  </p:stCondLst>
-                                  <p:childTnLst>
-                                    <p:cmd type="call" cmd="togglePause">
-                                      <p:cBhvr>
-                                        <p:cTn id="12" dur="1" fill="hold"/>
-                                        <p:tgtEl>
-                                          <p:spTgt spid="4"/>
-                                        </p:tgtEl>
-                                      </p:cBhvr>
-                                    </p:cmd>
-                                  </p:childTnLst>
-                                </p:cTn>
-                              </p:par>
-                            </p:childTnLst>
-                          </p:cTn>
-                        </p:par>
-                      </p:childTnLst>
-                    </p:cTn>
-                  </p:par>
-                </p:childTnLst>
-              </p:cTn>
-              <p:nextCondLst>
-                <p:cond evt="onClick" delay="0">
-                  <p:tgtEl>
-                    <p:spTgt spid="4"/>
-                  </p:tgtEl>
-                </p:cond>
-              </p:nextCondLst>
-            </p:seq>
-          </p:childTnLst>
-        </p:cTn>
-      </p:par>
-    </p:tnLst>
-  </p:timing>
-</p:sld>
-</file>
-
-<file path=ppt/slides/slide4.xml><?xml version="1.0" encoding="utf-8"?>
-<p:sld xmlns:a="http://schemas.openxmlformats.org/drawingml/2006/main" xmlns:r="http://schemas.openxmlformats.org/officeDocument/2006/relationships" xmlns:p="http://schemas.openxmlformats.org/presentationml/2006/main">
-  <p:cSld>
-    <p:spTree>
-      <p:nvGrpSpPr>
-        <p:cNvPr id="1" name="">
-          <a:extLst>
-            <a:ext uri="{FF2B5EF4-FFF2-40B4-BE49-F238E27FC236}">
-              <a16:creationId xmlns:a16="http://schemas.microsoft.com/office/drawing/2014/main" id="{D4955F76-0188-D480-9D4F-6D7A29927D19}"/>
-            </a:ext>
-          </a:extLst>
-        </p:cNvPr>
-        <p:cNvGrpSpPr/>
-        <p:nvPr/>
-      </p:nvGrpSpPr>
-      <p:grpSpPr>
-        <a:xfrm>
-          <a:off x="0" y="0"/>
-          <a:ext cx="0" cy="0"/>
-          <a:chOff x="0" y="0"/>
-          <a:chExt cx="0" cy="0"/>
-        </a:xfrm>
-      </p:grpSpPr>
-      <p:sp>
-        <p:nvSpPr>
-          <p:cNvPr id="10" name="Title 9">
-            <a:extLst>
-              <a:ext uri="{FF2B5EF4-FFF2-40B4-BE49-F238E27FC236}">
-                <a16:creationId xmlns:a16="http://schemas.microsoft.com/office/drawing/2014/main" id="{9AA19DA6-A569-665B-8BEE-70A2EEBCDC5E}"/>
-              </a:ext>
-            </a:extLst>
-          </p:cNvPr>
-          <p:cNvSpPr>
-            <a:spLocks noGrp="1"/>
-          </p:cNvSpPr>
-          <p:nvPr>
-            <p:ph type="title"/>
-          </p:nvPr>
-        </p:nvSpPr>
-        <p:spPr>
-          <a:xfrm>
-            <a:off x="457200" y="234751"/>
-            <a:ext cx="7886700" cy="994172"/>
-          </a:xfrm>
-        </p:spPr>
-        <p:txBody>
-          <a:bodyPr>
-            <a:noAutofit/>
-          </a:bodyPr>
-          <a:lstStyle/>
-          <a:p>
-            <a:r>
-              <a:rPr lang="en-US" sz="3200" b="1" dirty="0">
-                <a:solidFill>
-                  <a:srgbClr val="171C8C"/>
-                </a:solidFill>
-                <a:latin typeface="Arial" panose="020B0604020202020204" pitchFamily="34" charset="0"/>
-                <a:cs typeface="Arial" panose="020B0604020202020204" pitchFamily="34" charset="0"/>
-              </a:rPr>
-              <a:t>Equilibrium</a:t>
-            </a:r>
-          </a:p>
-        </p:txBody>
-      </p:sp>
-      <p:cxnSp>
-        <p:nvCxnSpPr>
-          <p:cNvPr id="5" name="Straight Connector 4">
-            <a:extLst>
-              <a:ext uri="{FF2B5EF4-FFF2-40B4-BE49-F238E27FC236}">
-                <a16:creationId xmlns:a16="http://schemas.microsoft.com/office/drawing/2014/main" id="{619508E9-A444-61C7-77C9-520BD9CC27BD}"/>
-              </a:ext>
-            </a:extLst>
-          </p:cNvPr>
-          <p:cNvCxnSpPr/>
-          <p:nvPr/>
-        </p:nvCxnSpPr>
-        <p:spPr>
-          <a:xfrm>
-            <a:off x="191528" y="1224990"/>
-            <a:ext cx="8760941" cy="0"/>
-          </a:xfrm>
-          <a:prstGeom prst="line">
-            <a:avLst/>
-          </a:prstGeom>
-          <a:ln w="38100"/>
-        </p:spPr>
-        <p:style>
-          <a:lnRef idx="1">
-            <a:schemeClr val="accent1"/>
-          </a:lnRef>
-          <a:fillRef idx="0">
-            <a:schemeClr val="accent1"/>
-          </a:fillRef>
-          <a:effectRef idx="0">
-            <a:schemeClr val="accent1"/>
-          </a:effectRef>
-          <a:fontRef idx="minor">
-            <a:schemeClr val="tx1"/>
-          </a:fontRef>
-        </p:style>
-      </p:cxnSp>
-      <p:pic>
-        <p:nvPicPr>
-          <p:cNvPr id="2" name="BM_Cell_Forces">
-            <a:hlinkClick r:id="" action="ppaction://media"/>
-            <a:extLst>
-              <a:ext uri="{FF2B5EF4-FFF2-40B4-BE49-F238E27FC236}">
-                <a16:creationId xmlns:a16="http://schemas.microsoft.com/office/drawing/2014/main" id="{FB5631F7-E8B7-68EC-295F-EF7E2F47A5FB}"/>
-              </a:ext>
-            </a:extLst>
-          </p:cNvPr>
-          <p:cNvPicPr>
-            <a:picLocks noChangeAspect="1"/>
-          </p:cNvPicPr>
-          <p:nvPr>
-            <a:videoFile r:link="rId2"/>
-            <p:extLst>
-              <p:ext uri="{DAA4B4D4-6D71-4841-9C94-3DE7FCFB9230}">
-                <p14:media xmlns:p14="http://schemas.microsoft.com/office/powerpoint/2010/main" r:embed="rId1"/>
-              </p:ext>
-            </p:extLst>
-          </p:nvPr>
-        </p:nvPicPr>
-        <p:blipFill>
-          <a:blip r:embed="rId5"/>
-          <a:srcRect l="18695" t="9469" r="26667" b="20193"/>
-          <a:stretch>
-            <a:fillRect/>
-          </a:stretch>
-        </p:blipFill>
-        <p:spPr>
-          <a:xfrm>
-            <a:off x="3347830" y="1603514"/>
-            <a:ext cx="4996070" cy="4823787"/>
-          </a:xfrm>
-          <a:prstGeom prst="rect">
-            <a:avLst/>
-          </a:prstGeom>
-        </p:spPr>
-      </p:pic>
-    </p:spTree>
-    <p:extLst>
-      <p:ext uri="{BB962C8B-B14F-4D97-AF65-F5344CB8AC3E}">
-        <p14:creationId xmlns:p14="http://schemas.microsoft.com/office/powerpoint/2010/main" val="766923697"/>
-      </p:ext>
-    </p:extLst>
-  </p:cSld>
-  <p:clrMapOvr>
-    <a:masterClrMapping/>
-  </p:clrMapOvr>
-  <p:timing>
-    <p:tnLst>
-      <p:par>
-        <p:cTn id="1" dur="indefinite" restart="never" nodeType="tmRoot">
-          <p:childTnLst>
-            <p:seq concurrent="1" nextAc="seek">
-              <p:cTn id="2" dur="indefinite" nodeType="mainSeq">
-                <p:childTnLst>
-                  <p:par>
-                    <p:cTn id="3" fill="hold">
-                      <p:stCondLst>
-                        <p:cond delay="indefinite"/>
-                      </p:stCondLst>
-                      <p:childTnLst>
-                        <p:par>
-                          <p:cTn id="4" fill="hold">
-                            <p:stCondLst>
-                              <p:cond delay="0"/>
-                            </p:stCondLst>
-                            <p:childTnLst>
-                              <p:par>
-                                <p:cTn id="5" presetID="1" presetClass="mediacall" presetSubtype="0" fill="hold" nodeType="clickEffect">
-                                  <p:stCondLst>
-                                    <p:cond delay="0"/>
-                                  </p:stCondLst>
-                                  <p:childTnLst>
-                                    <p:cmd type="call" cmd="playFrom(0.0)">
-                                      <p:cBhvr>
-                                        <p:cTn id="6" dur="3600" fill="hold"/>
-                                        <p:tgtEl>
-                                          <p:spTgt spid="2"/>
-                                        </p:tgtEl>
-                                      </p:cBhvr>
-                                    </p:cmd>
-                                  </p:childTnLst>
-                                </p:cTn>
-                              </p:par>
-                            </p:childTnLst>
-                          </p:cTn>
-                        </p:par>
-                      </p:childTnLst>
-                    </p:cTn>
-                  </p:par>
-                </p:childTnLst>
-              </p:cTn>
-              <p:prevCondLst>
-                <p:cond evt="onPrev" delay="0">
-                  <p:tgtEl>
-                    <p:sldTgt/>
-                  </p:tgtEl>
-                </p:cond>
-              </p:prevCondLst>
-              <p:nextCondLst>
-                <p:cond evt="onNext" delay="0">
-                  <p:tgtEl>
-                    <p:sldTgt/>
-                  </p:tgtEl>
-                </p:cond>
-              </p:nextCondLst>
-            </p:seq>
-            <p:video>
-              <p:cMediaNode vol="80000">
-                <p:cTn id="7" fill="hold" display="0">
-                  <p:stCondLst>
-                    <p:cond delay="indefinite"/>
-                  </p:stCondLst>
-                </p:cTn>
-                <p:tgtEl>
-                  <p:spTgt spid="2"/>
-                </p:tgtEl>
-              </p:cMediaNode>
-            </p:video>
-            <p:seq concurrent="1" nextAc="seek">
-              <p:cTn id="8" restart="whenNotActive" fill="hold" evtFilter="cancelBubble" nodeType="interactiveSeq">
-                <p:stCondLst>
-                  <p:cond evt="onClick" delay="0">
-                    <p:tgtEl>
-                      <p:spTgt spid="2"/>
-                    </p:tgtEl>
-                  </p:cond>
-                </p:stCondLst>
-                <p:endSync evt="end" delay="0">
-                  <p:rtn val="all"/>
-                </p:endSync>
-                <p:childTnLst>
-                  <p:par>
-                    <p:cTn id="9" fill="hold">
-                      <p:stCondLst>
-                        <p:cond delay="0"/>
-                      </p:stCondLst>
-                      <p:childTnLst>
-                        <p:par>
-                          <p:cTn id="10" fill="hold">
-                            <p:stCondLst>
-                              <p:cond delay="0"/>
-                            </p:stCondLst>
-                            <p:childTnLst>
-                              <p:par>
-                                <p:cTn id="11" presetID="2" presetClass="mediacall" presetSubtype="0" fill="hold" nodeType="clickEffect">
-                                  <p:stCondLst>
-                                    <p:cond delay="0"/>
-                                  </p:stCondLst>
-                                  <p:childTnLst>
-                                    <p:cmd type="call" cmd="togglePause">
-                                      <p:cBhvr>
-                                        <p:cTn id="12" dur="1" fill="hold"/>
-                                        <p:tgtEl>
-                                          <p:spTgt spid="2"/>
-                                        </p:tgtEl>
-                                      </p:cBhvr>
-                                    </p:cmd>
-                                  </p:childTnLst>
-                                </p:cTn>
-                              </p:par>
-                            </p:childTnLst>
-                          </p:cTn>
-                        </p:par>
-                      </p:childTnLst>
-                    </p:cTn>
-                  </p:par>
-                </p:childTnLst>
-              </p:cTn>
-              <p:nextCondLst>
-                <p:cond evt="onClick" delay="0">
-                  <p:tgtEl>
-                    <p:spTgt spid="2"/>
-                  </p:tgtEl>
-                </p:cond>
-              </p:nextCondLst>
-            </p:seq>
-          </p:childTnLst>
-        </p:cTn>
-      </p:par>
-    </p:tnLst>
-  </p:timing>
-</p:sld>
-</file>
-
-<file path=ppt/slides/slide5.xml><?xml version="1.0" encoding="utf-8"?>
-<p:sld xmlns:a="http://schemas.openxmlformats.org/drawingml/2006/main" xmlns:r="http://schemas.openxmlformats.org/officeDocument/2006/relationships" xmlns:p="http://schemas.openxmlformats.org/presentationml/2006/main">
-  <p:cSld>
-    <p:spTree>
-      <p:nvGrpSpPr>
-        <p:cNvPr id="1" name=""/>
-        <p:cNvGrpSpPr/>
-        <p:nvPr/>
-      </p:nvGrpSpPr>
-      <p:grpSpPr>
-        <a:xfrm>
-          <a:off x="0" y="0"/>
-          <a:ext cx="0" cy="0"/>
-          <a:chOff x="0" y="0"/>
-          <a:chExt cx="0" cy="0"/>
-        </a:xfrm>
-      </p:grpSpPr>
-      <p:pic>
-        <p:nvPicPr>
-          <p:cNvPr id="4" name="Prolif_DemoV2">
-            <a:hlinkClick r:id="" action="ppaction://media"/>
-            <a:extLst>
-              <a:ext uri="{FF2B5EF4-FFF2-40B4-BE49-F238E27FC236}">
-                <a16:creationId xmlns:a16="http://schemas.microsoft.com/office/drawing/2014/main" id="{6929B391-CA41-DBE9-E026-AA38988C2C27}"/>
-              </a:ext>
-            </a:extLst>
-          </p:cNvPr>
-          <p:cNvPicPr>
-            <a:picLocks noGrp="1" noChangeAspect="1"/>
-          </p:cNvPicPr>
-          <p:nvPr>
-            <p:ph idx="1"/>
-            <a:videoFile r:link="rId2"/>
-            <p:extLst>
-              <p:ext uri="{DAA4B4D4-6D71-4841-9C94-3DE7FCFB9230}">
-                <p14:media xmlns:p14="http://schemas.microsoft.com/office/powerpoint/2010/main" r:embed="rId1"/>
-              </p:ext>
-            </p:extLst>
-          </p:nvPr>
-        </p:nvPicPr>
-        <p:blipFill>
-          <a:blip r:embed="rId4"/>
-          <a:srcRect l="19291" t="10309" r="26737" b="20777"/>
-          <a:stretch>
-            <a:fillRect/>
-          </a:stretch>
-        </p:blipFill>
-        <p:spPr>
-          <a:xfrm>
-            <a:off x="3181610" y="1562489"/>
-            <a:ext cx="5148197" cy="4930386"/>
-          </a:xfrm>
-        </p:spPr>
-      </p:pic>
-      <p:sp>
-        <p:nvSpPr>
-          <p:cNvPr id="5" name="Title 9">
-            <a:extLst>
-              <a:ext uri="{FF2B5EF4-FFF2-40B4-BE49-F238E27FC236}">
-                <a16:creationId xmlns:a16="http://schemas.microsoft.com/office/drawing/2014/main" id="{EA7078BA-E60C-19C5-19F6-D378748D9C24}"/>
-              </a:ext>
-            </a:extLst>
-          </p:cNvPr>
-          <p:cNvSpPr>
-            <a:spLocks noGrp="1"/>
-          </p:cNvSpPr>
-          <p:nvPr>
-            <p:ph type="title"/>
-          </p:nvPr>
-        </p:nvSpPr>
-        <p:spPr>
-          <a:xfrm>
-            <a:off x="457200" y="234751"/>
-            <a:ext cx="7886700" cy="994172"/>
-          </a:xfrm>
-        </p:spPr>
-        <p:txBody>
-          <a:bodyPr>
-            <a:noAutofit/>
-          </a:bodyPr>
-          <a:lstStyle/>
-          <a:p>
-            <a:r>
-              <a:rPr lang="en-US" sz="3200" b="1" dirty="0">
-                <a:solidFill>
-                  <a:srgbClr val="171C8C"/>
-                </a:solidFill>
-                <a:latin typeface="Arial" panose="020B0604020202020204" pitchFamily="34" charset="0"/>
-                <a:cs typeface="Arial" panose="020B0604020202020204" pitchFamily="34" charset="0"/>
-              </a:rPr>
-              <a:t>Only Spring Forces</a:t>
-            </a:r>
-          </a:p>
-        </p:txBody>
-      </p:sp>
-    </p:spTree>
-    <p:extLst>
-      <p:ext uri="{BB962C8B-B14F-4D97-AF65-F5344CB8AC3E}">
-        <p14:creationId xmlns:p14="http://schemas.microsoft.com/office/powerpoint/2010/main" val="3498850967"/>
-      </p:ext>
-    </p:extLst>
-  </p:cSld>
-  <p:clrMapOvr>
-    <a:masterClrMapping/>
-  </p:clrMapOvr>
-  <p:timing>
-    <p:tnLst>
-      <p:par>
-        <p:cTn id="1" dur="indefinite" restart="never" nodeType="tmRoot">
-          <p:childTnLst>
-            <p:seq concurrent="1" nextAc="seek">
-              <p:cTn id="2" dur="indefinite" nodeType="mainSeq">
-                <p:childTnLst>
-                  <p:par>
-                    <p:cTn id="3" fill="hold">
-                      <p:stCondLst>
-                        <p:cond delay="indefinite"/>
-                      </p:stCondLst>
-                      <p:childTnLst>
-                        <p:par>
-                          <p:cTn id="4" fill="hold">
-                            <p:stCondLst>
-                              <p:cond delay="0"/>
-                            </p:stCondLst>
-                            <p:childTnLst>
-                              <p:par>
-                                <p:cTn id="5" presetID="1" presetClass="mediacall" presetSubtype="0" fill="hold" nodeType="clickEffect">
-                                  <p:stCondLst>
-                                    <p:cond delay="0"/>
-                                  </p:stCondLst>
-                                  <p:childTnLst>
-                                    <p:cmd type="call" cmd="playFrom(0.0)">
-                                      <p:cBhvr>
-                                        <p:cTn id="6" dur="10100" fill="hold"/>
-                                        <p:tgtEl>
-                                          <p:spTgt spid="4"/>
-                                        </p:tgtEl>
-                                      </p:cBhvr>
-                                    </p:cmd>
-                                  </p:childTnLst>
-                                </p:cTn>
-                              </p:par>
-                            </p:childTnLst>
-                          </p:cTn>
-                        </p:par>
-                      </p:childTnLst>
-                    </p:cTn>
-                  </p:par>
-                </p:childTnLst>
-              </p:cTn>
-              <p:prevCondLst>
-                <p:cond evt="onPrev" delay="0">
-                  <p:tgtEl>
-                    <p:sldTgt/>
-                  </p:tgtEl>
-                </p:cond>
-              </p:prevCondLst>
-              <p:nextCondLst>
-                <p:cond evt="onNext" delay="0">
-                  <p:tgtEl>
-                    <p:sldTgt/>
-                  </p:tgtEl>
-                </p:cond>
-              </p:nextCondLst>
-            </p:seq>
-            <p:video>
-              <p:cMediaNode vol="80000">
-                <p:cTn id="7" fill="hold" display="0">
-                  <p:stCondLst>
-                    <p:cond delay="indefinite"/>
-                  </p:stCondLst>
-                </p:cTn>
-                <p:tgtEl>
-                  <p:spTgt spid="4"/>
-                </p:tgtEl>
-              </p:cMediaNode>
-            </p:video>
-            <p:seq concurrent="1" nextAc="seek">
-              <p:cTn id="8" restart="whenNotActive" fill="hold" evtFilter="cancelBubble" nodeType="interactiveSeq">
-                <p:stCondLst>
-                  <p:cond evt="onClick" delay="0">
-                    <p:tgtEl>
-                      <p:spTgt spid="4"/>
-                    </p:tgtEl>
-                  </p:cond>
-                </p:stCondLst>
-                <p:endSync evt="end" delay="0">
-                  <p:rtn val="all"/>
-                </p:endSync>
-                <p:childTnLst>
-                  <p:par>
-                    <p:cTn id="9" fill="hold">
-                      <p:stCondLst>
-                        <p:cond delay="0"/>
-                      </p:stCondLst>
-                      <p:childTnLst>
-                        <p:par>
-                          <p:cTn id="10" fill="hold">
-                            <p:stCondLst>
-                              <p:cond delay="0"/>
-                            </p:stCondLst>
-                            <p:childTnLst>
-                              <p:par>
-                                <p:cTn id="11" presetID="2" presetClass="mediacall" presetSubtype="0" fill="hold" nodeType="clickEffect">
-                                  <p:stCondLst>
-                                    <p:cond delay="0"/>
-                                  </p:stCondLst>
-                                  <p:childTnLst>
-                                    <p:cmd type="call" cmd="togglePause">
-                                      <p:cBhvr>
-                                        <p:cTn id="12" dur="1" fill="hold"/>
-                                        <p:tgtEl>
-                                          <p:spTgt spid="4"/>
-                                        </p:tgtEl>
-                                      </p:cBhvr>
-                                    </p:cmd>
-                                  </p:childTnLst>
-                                </p:cTn>
-                              </p:par>
-                            </p:childTnLst>
-                          </p:cTn>
-                        </p:par>
-                      </p:childTnLst>
-                    </p:cTn>
-                  </p:par>
-                </p:childTnLst>
-              </p:cTn>
-              <p:nextCondLst>
-                <p:cond evt="onClick" delay="0">
-                  <p:tgtEl>
-                    <p:spTgt spid="4"/>
-                  </p:tgtEl>
-                </p:cond>
-              </p:nextCondLst>
-            </p:seq>
-          </p:childTnLst>
-        </p:cTn>
-      </p:par>
-    </p:tnLst>
-  </p:timing>
-</p:sld>
-</file>
-
-<file path=ppt/slides/slide6.xml><?xml version="1.0" encoding="utf-8"?>
-<p:sld xmlns:a="http://schemas.openxmlformats.org/drawingml/2006/main" xmlns:r="http://schemas.openxmlformats.org/officeDocument/2006/relationships" xmlns:p="http://schemas.openxmlformats.org/presentationml/2006/main">
-  <p:cSld>
-    <p:spTree>
-      <p:nvGrpSpPr>
-        <p:cNvPr id="1" name="">
-          <a:extLst>
-            <a:ext uri="{FF2B5EF4-FFF2-40B4-BE49-F238E27FC236}">
-              <a16:creationId xmlns:a16="http://schemas.microsoft.com/office/drawing/2014/main" id="{E600249E-55F0-D4F4-8243-08DB1DE8F9FC}"/>
-            </a:ext>
-          </a:extLst>
-        </p:cNvPr>
-        <p:cNvGrpSpPr/>
-        <p:nvPr/>
-      </p:nvGrpSpPr>
-      <p:grpSpPr>
-        <a:xfrm>
-          <a:off x="0" y="0"/>
-          <a:ext cx="0" cy="0"/>
-          <a:chOff x="0" y="0"/>
-          <a:chExt cx="0" cy="0"/>
-        </a:xfrm>
-      </p:grpSpPr>
-      <p:sp>
-        <p:nvSpPr>
-          <p:cNvPr id="10" name="Title 9">
-            <a:extLst>
-              <a:ext uri="{FF2B5EF4-FFF2-40B4-BE49-F238E27FC236}">
-                <a16:creationId xmlns:a16="http://schemas.microsoft.com/office/drawing/2014/main" id="{F1195B24-805F-F543-9F71-14414F654394}"/>
-              </a:ext>
-            </a:extLst>
-          </p:cNvPr>
-          <p:cNvSpPr>
-            <a:spLocks noGrp="1"/>
-          </p:cNvSpPr>
-          <p:nvPr>
-            <p:ph type="title"/>
-          </p:nvPr>
-        </p:nvSpPr>
-        <p:spPr>
-          <a:xfrm>
-            <a:off x="457200" y="234751"/>
-            <a:ext cx="7886700" cy="994172"/>
-          </a:xfrm>
-        </p:spPr>
-        <p:txBody>
-          <a:bodyPr>
-            <a:noAutofit/>
-          </a:bodyPr>
-          <a:lstStyle/>
-          <a:p>
-            <a:r>
-              <a:rPr lang="en-US" sz="3200" b="1" dirty="0">
-                <a:solidFill>
-                  <a:srgbClr val="171C8C"/>
-                </a:solidFill>
-                <a:latin typeface="Arial" panose="020B0604020202020204" pitchFamily="34" charset="0"/>
-                <a:cs typeface="Arial" panose="020B0604020202020204" pitchFamily="34" charset="0"/>
-              </a:rPr>
-              <a:t>Updated Gradients: Cell-to-BM Force</a:t>
-            </a:r>
-          </a:p>
-        </p:txBody>
-      </p:sp>
-      <p:cxnSp>
-        <p:nvCxnSpPr>
-          <p:cNvPr id="5" name="Straight Connector 4">
-            <a:extLst>
-              <a:ext uri="{FF2B5EF4-FFF2-40B4-BE49-F238E27FC236}">
-                <a16:creationId xmlns:a16="http://schemas.microsoft.com/office/drawing/2014/main" id="{200BC0DA-28EB-5AAB-68E0-F25A89274750}"/>
-              </a:ext>
-            </a:extLst>
-          </p:cNvPr>
-          <p:cNvCxnSpPr/>
-          <p:nvPr/>
-        </p:nvCxnSpPr>
-        <p:spPr>
-          <a:xfrm>
-            <a:off x="191528" y="1224990"/>
-            <a:ext cx="8760941" cy="0"/>
-          </a:xfrm>
-          <a:prstGeom prst="line">
-            <a:avLst/>
-          </a:prstGeom>
-          <a:ln w="38100"/>
-        </p:spPr>
-        <p:style>
-          <a:lnRef idx="1">
-            <a:schemeClr val="accent1"/>
-          </a:lnRef>
-          <a:fillRef idx="0">
-            <a:schemeClr val="accent1"/>
-          </a:fillRef>
-          <a:effectRef idx="0">
-            <a:schemeClr val="accent1"/>
-          </a:effectRef>
-          <a:fontRef idx="minor">
-            <a:schemeClr val="tx1"/>
-          </a:fontRef>
-        </p:style>
-      </p:cxnSp>
-      <p:pic>
-        <p:nvPicPr>
-          <p:cNvPr id="2" name="ProfV1">
-            <a:hlinkClick r:id="" action="ppaction://media"/>
-            <a:extLst>
-              <a:ext uri="{FF2B5EF4-FFF2-40B4-BE49-F238E27FC236}">
-                <a16:creationId xmlns:a16="http://schemas.microsoft.com/office/drawing/2014/main" id="{EAE061F9-71B3-1922-E3C2-36AE80F2524E}"/>
-              </a:ext>
-            </a:extLst>
-          </p:cNvPr>
-          <p:cNvPicPr>
-            <a:picLocks noChangeAspect="1"/>
-          </p:cNvPicPr>
-          <p:nvPr>
-            <a:videoFile r:link="rId1"/>
-            <p:extLst>
-              <p:ext uri="{DAA4B4D4-6D71-4841-9C94-3DE7FCFB9230}">
-                <p14:media xmlns:p14="http://schemas.microsoft.com/office/powerpoint/2010/main" r:embed="rId2">
-                  <p14:trim end="4728"/>
-                </p14:media>
-              </p:ext>
-            </p:extLst>
-          </p:nvPr>
-        </p:nvPicPr>
-        <p:blipFill>
-          <a:blip r:embed="rId5"/>
-          <a:srcRect l="20000" t="10596" r="24783" b="19065"/>
-          <a:stretch>
-            <a:fillRect/>
-          </a:stretch>
-        </p:blipFill>
-        <p:spPr>
-          <a:xfrm>
-            <a:off x="3294822" y="1524271"/>
-            <a:ext cx="5049078" cy="4823772"/>
-          </a:xfrm>
-          <a:prstGeom prst="rect">
-            <a:avLst/>
-          </a:prstGeom>
-        </p:spPr>
-      </p:pic>
-    </p:spTree>
-    <p:extLst>
-      <p:ext uri="{BB962C8B-B14F-4D97-AF65-F5344CB8AC3E}">
-        <p14:creationId xmlns:p14="http://schemas.microsoft.com/office/powerpoint/2010/main" val="3508636308"/>
-      </p:ext>
-    </p:extLst>
-  </p:cSld>
-  <p:clrMapOvr>
-    <a:masterClrMapping/>
-  </p:clrMapOvr>
-  <p:timing>
-    <p:tnLst>
-      <p:par>
-        <p:cTn id="1" dur="indefinite" restart="never" nodeType="tmRoot">
-          <p:childTnLst>
-            <p:seq concurrent="1" nextAc="seek">
-              <p:cTn id="2" dur="indefinite" nodeType="mainSeq">
-                <p:childTnLst>
-                  <p:par>
-                    <p:cTn id="3" fill="hold">
-                      <p:stCondLst>
-                        <p:cond delay="indefinite"/>
-                      </p:stCondLst>
-                      <p:childTnLst>
-                        <p:par>
-                          <p:cTn id="4" fill="hold">
-                            <p:stCondLst>
-                              <p:cond delay="0"/>
-                            </p:stCondLst>
-                            <p:childTnLst>
-                              <p:par>
-                                <p:cTn id="5" presetID="1" presetClass="mediacall" presetSubtype="0" fill="hold" nodeType="clickEffect">
-                                  <p:stCondLst>
-                                    <p:cond delay="0"/>
-                                  </p:stCondLst>
-                                  <p:childTnLst>
-                                    <p:cmd type="call" cmd="playFrom(0.0)">
-                                      <p:cBhvr>
-                                        <p:cTn id="6" dur="5272" fill="hold"/>
-                                        <p:tgtEl>
-                                          <p:spTgt spid="2"/>
-                                        </p:tgtEl>
-                                      </p:cBhvr>
-                                    </p:cmd>
-                                  </p:childTnLst>
-                                </p:cTn>
-                              </p:par>
-                            </p:childTnLst>
-                          </p:cTn>
-                        </p:par>
-                      </p:childTnLst>
-                    </p:cTn>
-                  </p:par>
-                </p:childTnLst>
-              </p:cTn>
-              <p:prevCondLst>
-                <p:cond evt="onPrev" delay="0">
-                  <p:tgtEl>
-                    <p:sldTgt/>
-                  </p:tgtEl>
-                </p:cond>
-              </p:prevCondLst>
-              <p:nextCondLst>
-                <p:cond evt="onNext" delay="0">
-                  <p:tgtEl>
-                    <p:sldTgt/>
-                  </p:tgtEl>
-                </p:cond>
-              </p:nextCondLst>
-            </p:seq>
-            <p:video>
-              <p:cMediaNode vol="80000">
-                <p:cTn id="7" fill="hold" display="0">
-                  <p:stCondLst>
-                    <p:cond delay="indefinite"/>
-                  </p:stCondLst>
-                </p:cTn>
-                <p:tgtEl>
-                  <p:spTgt spid="2"/>
-                </p:tgtEl>
-              </p:cMediaNode>
-            </p:video>
-            <p:seq concurrent="1" nextAc="seek">
-              <p:cTn id="8" restart="whenNotActive" fill="hold" evtFilter="cancelBubble" nodeType="interactiveSeq">
-                <p:stCondLst>
-                  <p:cond evt="onClick" delay="0">
-                    <p:tgtEl>
-                      <p:spTgt spid="2"/>
-                    </p:tgtEl>
-                  </p:cond>
-                </p:stCondLst>
-                <p:endSync evt="end" delay="0">
-                  <p:rtn val="all"/>
-                </p:endSync>
-                <p:childTnLst>
-                  <p:par>
-                    <p:cTn id="9" fill="hold">
-                      <p:stCondLst>
-                        <p:cond delay="0"/>
-                      </p:stCondLst>
-                      <p:childTnLst>
-                        <p:par>
-                          <p:cTn id="10" fill="hold">
-                            <p:stCondLst>
-                              <p:cond delay="0"/>
-                            </p:stCondLst>
-                            <p:childTnLst>
-                              <p:par>
-                                <p:cTn id="11" presetID="2" presetClass="mediacall" presetSubtype="0" fill="hold" nodeType="clickEffect">
-                                  <p:stCondLst>
-                                    <p:cond delay="0"/>
-                                  </p:stCondLst>
-                                  <p:childTnLst>
-                                    <p:cmd type="call" cmd="togglePause">
-                                      <p:cBhvr>
-                                        <p:cTn id="12" dur="1" fill="hold"/>
-                                        <p:tgtEl>
-                                          <p:spTgt spid="2"/>
-                                        </p:tgtEl>
-                                      </p:cBhvr>
-                                    </p:cmd>
-                                  </p:childTnLst>
-                                </p:cTn>
-                              </p:par>
-                            </p:childTnLst>
-                          </p:cTn>
-                        </p:par>
-                      </p:childTnLst>
-                    </p:cTn>
-                  </p:par>
-                </p:childTnLst>
-              </p:cTn>
-              <p:nextCondLst>
-                <p:cond evt="onClick" delay="0">
-                  <p:tgtEl>
-                    <p:spTgt spid="2"/>
-                  </p:tgtEl>
-                </p:cond>
-              </p:nextCondLst>
-            </p:seq>
-          </p:childTnLst>
-        </p:cTn>
-      </p:par>
-    </p:tnLst>
-  </p:timing>
-</p:sld>
-</file>
-
-<file path=ppt/slides/slide7.xml><?xml version="1.0" encoding="utf-8"?>
 <p:sld xmlns:a="http://schemas.openxmlformats.org/drawingml/2006/main" xmlns:r="http://schemas.openxmlformats.org/officeDocument/2006/relationships" xmlns:p="http://schemas.openxmlformats.org/presentationml/2006/main">
   <p:cSld>
     <p:spTree>
@@ -5449,7 +3445,7 @@
                 <a:latin typeface="Arial" panose="020B0604020202020204" pitchFamily="34" charset="0"/>
                 <a:cs typeface="Arial" panose="020B0604020202020204" pitchFamily="34" charset="0"/>
               </a:rPr>
-              <a:t>Updated Gradients: Cell-to-BM Force</a:t>
+              <a:t>Updated Deformation </a:t>
             </a:r>
           </a:p>
         </p:txBody>
@@ -5491,268 +3487,116 @@
           </a:fontRef>
         </p:style>
       </p:cxnSp>
-      <p:pic>
-        <p:nvPicPr>
-          <p:cNvPr id="2" name="ProfV2">
-            <a:hlinkClick r:id="" action="ppaction://media"/>
+      <p:sp>
+        <p:nvSpPr>
+          <p:cNvPr id="4" name="TextBox 3">
             <a:extLst>
               <a:ext uri="{FF2B5EF4-FFF2-40B4-BE49-F238E27FC236}">
-                <a16:creationId xmlns:a16="http://schemas.microsoft.com/office/drawing/2014/main" id="{7F3EBCE1-E456-5B26-CDEA-FF5E9A425568}"/>
+                <a16:creationId xmlns:a16="http://schemas.microsoft.com/office/drawing/2014/main" id="{F20D4BC1-E94F-BAA2-9DB2-64545DDBDB52}"/>
               </a:ext>
             </a:extLst>
           </p:cNvPr>
-          <p:cNvPicPr>
-            <a:picLocks noChangeAspect="1"/>
-          </p:cNvPicPr>
-          <p:nvPr>
-            <a:videoFile r:link="rId2"/>
-            <p:extLst>
-              <p:ext uri="{DAA4B4D4-6D71-4841-9C94-3DE7FCFB9230}">
-                <p14:media xmlns:p14="http://schemas.microsoft.com/office/powerpoint/2010/main" r:embed="rId1"/>
-              </p:ext>
-            </p:extLst>
-          </p:nvPr>
-        </p:nvPicPr>
-        <p:blipFill>
-          <a:blip r:embed="rId5"/>
-          <a:srcRect l="19062" t="10927" r="26010" b="18735"/>
-          <a:stretch>
-            <a:fillRect/>
-          </a:stretch>
-        </p:blipFill>
+          <p:cNvSpPr txBox="1"/>
+          <p:nvPr/>
+        </p:nvSpPr>
         <p:spPr>
           <a:xfrm>
-            <a:off x="3321325" y="1537252"/>
-            <a:ext cx="5022575" cy="4823792"/>
+            <a:off x="457200" y="1717589"/>
+            <a:ext cx="8210811" cy="1938992"/>
           </a:xfrm>
           <a:prstGeom prst="rect">
             <a:avLst/>
           </a:prstGeom>
+          <a:noFill/>
         </p:spPr>
-      </p:pic>
+        <p:txBody>
+          <a:bodyPr wrap="square" rtlCol="0">
+            <a:spAutoFit/>
+          </a:bodyPr>
+          <a:lstStyle/>
+          <a:p>
+            <a:pPr marL="342900" indent="-342900">
+              <a:buFont typeface="Arial" panose="020B0604020202020204" pitchFamily="34" charset="0"/>
+              <a:buChar char="•"/>
+            </a:pPr>
+            <a:r>
+              <a:rPr lang="en-US" sz="2400" dirty="0">
+                <a:solidFill>
+                  <a:schemeClr val="tx2"/>
+                </a:solidFill>
+              </a:rPr>
+              <a:t>Review </a:t>
+            </a:r>
+            <a:r>
+              <a:rPr lang="en-US" sz="2400" dirty="0" err="1">
+                <a:solidFill>
+                  <a:schemeClr val="tx2"/>
+                </a:solidFill>
+              </a:rPr>
+              <a:t>replusive</a:t>
+            </a:r>
+            <a:r>
+              <a:rPr lang="en-US" sz="2400" dirty="0">
+                <a:solidFill>
+                  <a:schemeClr val="tx2"/>
+                </a:solidFill>
+              </a:rPr>
+              <a:t> force. Research alternative mechanic. </a:t>
+            </a:r>
+          </a:p>
+          <a:p>
+            <a:pPr marL="342900" indent="-342900">
+              <a:buFont typeface="Arial" panose="020B0604020202020204" pitchFamily="34" charset="0"/>
+              <a:buChar char="•"/>
+            </a:pPr>
+            <a:endParaRPr lang="en-US" sz="2400" dirty="0">
+              <a:solidFill>
+                <a:schemeClr val="tx2"/>
+              </a:solidFill>
+            </a:endParaRPr>
+          </a:p>
+          <a:p>
+            <a:pPr marL="342900" indent="-342900">
+              <a:buFont typeface="Arial" panose="020B0604020202020204" pitchFamily="34" charset="0"/>
+              <a:buChar char="•"/>
+            </a:pPr>
+            <a:r>
+              <a:rPr lang="en-US" sz="2400" dirty="0">
+                <a:solidFill>
+                  <a:schemeClr val="tx2"/>
+                </a:solidFill>
+              </a:rPr>
+              <a:t>Refine membrane elasticity </a:t>
+            </a:r>
+          </a:p>
+          <a:p>
+            <a:pPr marL="342900" indent="-342900">
+              <a:buFont typeface="Arial" panose="020B0604020202020204" pitchFamily="34" charset="0"/>
+              <a:buChar char="•"/>
+            </a:pPr>
+            <a:endParaRPr lang="en-US" sz="2400" dirty="0">
+              <a:solidFill>
+                <a:schemeClr val="tx2"/>
+              </a:solidFill>
+            </a:endParaRPr>
+          </a:p>
+          <a:p>
+            <a:pPr marL="342900" indent="-342900">
+              <a:buFont typeface="Arial" panose="020B0604020202020204" pitchFamily="34" charset="0"/>
+              <a:buChar char="•"/>
+            </a:pPr>
+            <a:endParaRPr lang="en-US" sz="2400" dirty="0">
+              <a:solidFill>
+                <a:schemeClr val="tx2"/>
+              </a:solidFill>
+            </a:endParaRPr>
+          </a:p>
+        </p:txBody>
+      </p:sp>
     </p:spTree>
     <p:extLst>
       <p:ext uri="{BB962C8B-B14F-4D97-AF65-F5344CB8AC3E}">
-        <p14:creationId xmlns:p14="http://schemas.microsoft.com/office/powerpoint/2010/main" val="1276417643"/>
-      </p:ext>
-    </p:extLst>
-  </p:cSld>
-  <p:clrMapOvr>
-    <a:masterClrMapping/>
-  </p:clrMapOvr>
-  <p:timing>
-    <p:tnLst>
-      <p:par>
-        <p:cTn id="1" dur="indefinite" restart="never" nodeType="tmRoot">
-          <p:childTnLst>
-            <p:seq concurrent="1" nextAc="seek">
-              <p:cTn id="2" dur="indefinite" nodeType="mainSeq">
-                <p:childTnLst>
-                  <p:par>
-                    <p:cTn id="3" fill="hold">
-                      <p:stCondLst>
-                        <p:cond delay="indefinite"/>
-                      </p:stCondLst>
-                      <p:childTnLst>
-                        <p:par>
-                          <p:cTn id="4" fill="hold">
-                            <p:stCondLst>
-                              <p:cond delay="0"/>
-                            </p:stCondLst>
-                            <p:childTnLst>
-                              <p:par>
-                                <p:cTn id="5" presetID="1" presetClass="mediacall" presetSubtype="0" fill="hold" nodeType="clickEffect">
-                                  <p:stCondLst>
-                                    <p:cond delay="0"/>
-                                  </p:stCondLst>
-                                  <p:childTnLst>
-                                    <p:cmd type="call" cmd="playFrom(0.0)">
-                                      <p:cBhvr>
-                                        <p:cTn id="6" dur="5700" fill="hold"/>
-                                        <p:tgtEl>
-                                          <p:spTgt spid="2"/>
-                                        </p:tgtEl>
-                                      </p:cBhvr>
-                                    </p:cmd>
-                                  </p:childTnLst>
-                                </p:cTn>
-                              </p:par>
-                            </p:childTnLst>
-                          </p:cTn>
-                        </p:par>
-                      </p:childTnLst>
-                    </p:cTn>
-                  </p:par>
-                </p:childTnLst>
-              </p:cTn>
-              <p:prevCondLst>
-                <p:cond evt="onPrev" delay="0">
-                  <p:tgtEl>
-                    <p:sldTgt/>
-                  </p:tgtEl>
-                </p:cond>
-              </p:prevCondLst>
-              <p:nextCondLst>
-                <p:cond evt="onNext" delay="0">
-                  <p:tgtEl>
-                    <p:sldTgt/>
-                  </p:tgtEl>
-                </p:cond>
-              </p:nextCondLst>
-            </p:seq>
-            <p:video>
-              <p:cMediaNode vol="80000">
-                <p:cTn id="7" fill="hold" display="0">
-                  <p:stCondLst>
-                    <p:cond delay="indefinite"/>
-                  </p:stCondLst>
-                </p:cTn>
-                <p:tgtEl>
-                  <p:spTgt spid="2"/>
-                </p:tgtEl>
-              </p:cMediaNode>
-            </p:video>
-            <p:seq concurrent="1" nextAc="seek">
-              <p:cTn id="8" restart="whenNotActive" fill="hold" evtFilter="cancelBubble" nodeType="interactiveSeq">
-                <p:stCondLst>
-                  <p:cond evt="onClick" delay="0">
-                    <p:tgtEl>
-                      <p:spTgt spid="2"/>
-                    </p:tgtEl>
-                  </p:cond>
-                </p:stCondLst>
-                <p:endSync evt="end" delay="0">
-                  <p:rtn val="all"/>
-                </p:endSync>
-                <p:childTnLst>
-                  <p:par>
-                    <p:cTn id="9" fill="hold">
-                      <p:stCondLst>
-                        <p:cond delay="0"/>
-                      </p:stCondLst>
-                      <p:childTnLst>
-                        <p:par>
-                          <p:cTn id="10" fill="hold">
-                            <p:stCondLst>
-                              <p:cond delay="0"/>
-                            </p:stCondLst>
-                            <p:childTnLst>
-                              <p:par>
-                                <p:cTn id="11" presetID="2" presetClass="mediacall" presetSubtype="0" fill="hold" nodeType="clickEffect">
-                                  <p:stCondLst>
-                                    <p:cond delay="0"/>
-                                  </p:stCondLst>
-                                  <p:childTnLst>
-                                    <p:cmd type="call" cmd="togglePause">
-                                      <p:cBhvr>
-                                        <p:cTn id="12" dur="1" fill="hold"/>
-                                        <p:tgtEl>
-                                          <p:spTgt spid="2"/>
-                                        </p:tgtEl>
-                                      </p:cBhvr>
-                                    </p:cmd>
-                                  </p:childTnLst>
-                                </p:cTn>
-                              </p:par>
-                            </p:childTnLst>
-                          </p:cTn>
-                        </p:par>
-                      </p:childTnLst>
-                    </p:cTn>
-                  </p:par>
-                </p:childTnLst>
-              </p:cTn>
-              <p:nextCondLst>
-                <p:cond evt="onClick" delay="0">
-                  <p:tgtEl>
-                    <p:spTgt spid="2"/>
-                  </p:tgtEl>
-                </p:cond>
-              </p:nextCondLst>
-            </p:seq>
-          </p:childTnLst>
-        </p:cTn>
-      </p:par>
-    </p:tnLst>
-  </p:timing>
-</p:sld>
-</file>
-
-<file path=ppt/slides/slide8.xml><?xml version="1.0" encoding="utf-8"?>
-<p:sld xmlns:a="http://schemas.openxmlformats.org/drawingml/2006/main" xmlns:r="http://schemas.openxmlformats.org/officeDocument/2006/relationships" xmlns:p="http://schemas.openxmlformats.org/presentationml/2006/main">
-  <p:cSld>
-    <p:spTree>
-      <p:nvGrpSpPr>
-        <p:cNvPr id="1" name=""/>
-        <p:cNvGrpSpPr/>
-        <p:nvPr/>
-      </p:nvGrpSpPr>
-      <p:grpSpPr>
-        <a:xfrm>
-          <a:off x="0" y="0"/>
-          <a:ext cx="0" cy="0"/>
-          <a:chOff x="0" y="0"/>
-          <a:chExt cx="0" cy="0"/>
-        </a:xfrm>
-      </p:grpSpPr>
-      <p:sp>
-        <p:nvSpPr>
-          <p:cNvPr id="2" name="Title 1">
-            <a:extLst>
-              <a:ext uri="{FF2B5EF4-FFF2-40B4-BE49-F238E27FC236}">
-                <a16:creationId xmlns:a16="http://schemas.microsoft.com/office/drawing/2014/main" id="{61247D2F-DC91-11B4-5993-497BDCA33C68}"/>
-              </a:ext>
-            </a:extLst>
-          </p:cNvPr>
-          <p:cNvSpPr>
-            <a:spLocks noGrp="1"/>
-          </p:cNvSpPr>
-          <p:nvPr>
-            <p:ph type="title"/>
-          </p:nvPr>
-        </p:nvSpPr>
-        <p:spPr/>
-        <p:txBody>
-          <a:bodyPr/>
-          <a:lstStyle/>
-          <a:p>
-            <a:endParaRPr lang="en-US"/>
-          </a:p>
-        </p:txBody>
-      </p:sp>
-      <p:pic>
-        <p:nvPicPr>
-          <p:cNvPr id="9" name="Content Placeholder 8">
-            <a:extLst>
-              <a:ext uri="{FF2B5EF4-FFF2-40B4-BE49-F238E27FC236}">
-                <a16:creationId xmlns:a16="http://schemas.microsoft.com/office/drawing/2014/main" id="{67263619-A7F9-AA59-69A5-0D9A55E3299B}"/>
-              </a:ext>
-            </a:extLst>
-          </p:cNvPr>
-          <p:cNvPicPr>
-            <a:picLocks noGrp="1" noChangeAspect="1"/>
-          </p:cNvPicPr>
-          <p:nvPr>
-            <p:ph idx="1"/>
-          </p:nvPr>
-        </p:nvPicPr>
-        <p:blipFill>
-          <a:blip r:embed="rId2"/>
-          <a:stretch>
-            <a:fillRect/>
-          </a:stretch>
-        </p:blipFill>
-        <p:spPr>
-          <a:xfrm>
-            <a:off x="457200" y="1772863"/>
-            <a:ext cx="8229600" cy="4180636"/>
-          </a:xfrm>
-        </p:spPr>
-      </p:pic>
-    </p:spTree>
-    <p:extLst>
-      <p:ext uri="{BB962C8B-B14F-4D97-AF65-F5344CB8AC3E}">
-        <p14:creationId xmlns:p14="http://schemas.microsoft.com/office/powerpoint/2010/main" val="1126787470"/>
+        <p14:creationId xmlns:p14="http://schemas.microsoft.com/office/powerpoint/2010/main" val="3990933769"/>
       </p:ext>
     </p:extLst>
   </p:cSld>

</xml_diff>